<commit_message>
A little modification of slides.
</commit_message>
<xml_diff>
--- a/docs/FinalProjectPresentation.pptx
+++ b/docs/FinalProjectPresentation.pptx
@@ -9,21 +9,23 @@
     <p:sldId id="279" r:id="rId3"/>
     <p:sldId id="258" r:id="rId4"/>
     <p:sldId id="259" r:id="rId5"/>
-    <p:sldId id="264" r:id="rId6"/>
-    <p:sldId id="265" r:id="rId7"/>
-    <p:sldId id="277" r:id="rId8"/>
-    <p:sldId id="278" r:id="rId9"/>
-    <p:sldId id="266" r:id="rId10"/>
-    <p:sldId id="267" r:id="rId11"/>
-    <p:sldId id="268" r:id="rId12"/>
-    <p:sldId id="269" r:id="rId13"/>
-    <p:sldId id="270" r:id="rId14"/>
-    <p:sldId id="271" r:id="rId15"/>
-    <p:sldId id="272" r:id="rId16"/>
-    <p:sldId id="273" r:id="rId17"/>
-    <p:sldId id="274" r:id="rId18"/>
-    <p:sldId id="275" r:id="rId19"/>
-    <p:sldId id="262" r:id="rId20"/>
+    <p:sldId id="280" r:id="rId6"/>
+    <p:sldId id="281" r:id="rId7"/>
+    <p:sldId id="282" r:id="rId8"/>
+    <p:sldId id="283" r:id="rId9"/>
+    <p:sldId id="284" r:id="rId10"/>
+    <p:sldId id="285" r:id="rId11"/>
+    <p:sldId id="286" r:id="rId12"/>
+    <p:sldId id="287" r:id="rId13"/>
+    <p:sldId id="294" r:id="rId14"/>
+    <p:sldId id="295" r:id="rId15"/>
+    <p:sldId id="288" r:id="rId16"/>
+    <p:sldId id="289" r:id="rId17"/>
+    <p:sldId id="290" r:id="rId18"/>
+    <p:sldId id="291" r:id="rId19"/>
+    <p:sldId id="292" r:id="rId20"/>
+    <p:sldId id="293" r:id="rId21"/>
+    <p:sldId id="262" r:id="rId22"/>
   </p:sldIdLst>
   <p:sldSz cx="9144000" cy="6858000" type="screen4x3"/>
   <p:notesSz cx="6858000" cy="9144000"/>
@@ -3143,6 +3145,14 @@
 <file path=ppt/slides/slide10.xml><?xml version="1.0" encoding="utf-8"?>
 <p:sld xmlns:a="http://schemas.openxmlformats.org/drawingml/2006/main" xmlns:r="http://schemas.openxmlformats.org/officeDocument/2006/relationships" xmlns:p="http://schemas.openxmlformats.org/presentationml/2006/main">
   <p:cSld>
+    <p:bg>
+      <p:bgPr>
+        <a:solidFill>
+          <a:schemeClr val="tx1"/>
+        </a:solidFill>
+        <a:effectLst/>
+      </p:bgPr>
+    </p:bg>
     <p:spTree>
       <p:nvGrpSpPr>
         <p:cNvPr id="1" name=""/>
@@ -3169,7 +3179,9 @@
         </p:nvSpPr>
         <p:spPr/>
         <p:txBody>
-          <a:bodyPr lIns="0" tIns="0" rIns="0" bIns="0" anchor="t"/>
+          <a:bodyPr vert="horz" lIns="91440" tIns="45720" rIns="91440" bIns="45720" rtlCol="0" anchor="ctr">
+            <a:normAutofit/>
+          </a:bodyPr>
           <a:lstStyle/>
           <a:p>
             <a:pPr>
@@ -3178,32 +3190,26 @@
               </a:lnSpc>
             </a:pPr>
             <a:r>
-              <a:rPr lang="en-US" altLang="zh-CN" sz="3900" dirty="0">
-                <a:solidFill>
-                  <a:srgbClr val="000000"/>
-                </a:solidFill>
-                <a:latin typeface="Arial" charset="0"/>
-                <a:ea typeface="宋体" charset="-122"/>
+              <a:rPr lang="en-US" altLang="zh-CN" sz="4000" dirty="0">
+                <a:solidFill>
+                  <a:schemeClr val="bg1"/>
+                </a:solidFill>
               </a:rPr>
               <a:t>Don't Repeat </a:t>
             </a:r>
             <a:r>
-              <a:rPr lang="en-US" altLang="zh-CN" sz="3900" dirty="0" smtClean="0">
-                <a:solidFill>
-                  <a:srgbClr val="000000"/>
-                </a:solidFill>
-                <a:latin typeface="Arial" charset="0"/>
-                <a:ea typeface="宋体" charset="-122"/>
+              <a:rPr lang="en-US" altLang="zh-CN" sz="4000" dirty="0" smtClean="0">
+                <a:solidFill>
+                  <a:schemeClr val="bg1"/>
+                </a:solidFill>
               </a:rPr>
               <a:t>Yourself </a:t>
             </a:r>
             <a:r>
-              <a:rPr lang="en-US" altLang="zh-CN" sz="3900" dirty="0">
-                <a:solidFill>
-                  <a:srgbClr val="000000"/>
-                </a:solidFill>
-                <a:latin typeface="Arial" charset="0"/>
-                <a:ea typeface="宋体" charset="-122"/>
+              <a:rPr lang="en-US" altLang="zh-CN" sz="4000" dirty="0">
+                <a:solidFill>
+                  <a:schemeClr val="bg1"/>
+                </a:solidFill>
               </a:rPr>
               <a:t>Principle</a:t>
             </a:r>
@@ -3222,117 +3228,100 @@
         </p:nvSpPr>
         <p:spPr/>
         <p:txBody>
-          <a:bodyPr lIns="0" tIns="0" rIns="0" bIns="0"/>
-          <a:lstStyle/>
-          <a:p>
-            <a:pPr marL="411480" lvl="1" indent="-308610">
+          <a:bodyPr vert="horz" lIns="91440" tIns="45720" rIns="91440" bIns="45720" rtlCol="0">
+            <a:normAutofit/>
+          </a:bodyPr>
+          <a:lstStyle/>
+          <a:p>
+            <a:pPr marL="342900" lvl="1" indent="-342900">
               <a:lnSpc>
                 <a:spcPct val="95000"/>
               </a:lnSpc>
-              <a:spcBef>
-                <a:spcPct val="0"/>
-              </a:spcBef>
               <a:buClr>
-                <a:srgbClr val="000000"/>
+                <a:schemeClr val="bg1"/>
               </a:buClr>
-              <a:buFontTx/>
+              <a:buFont typeface="Arial" pitchFamily="34" charset="0"/>
               <a:buChar char="•"/>
             </a:pPr>
             <a:r>
-              <a:rPr lang="en-US" altLang="zh-CN" sz="2400" dirty="0" smtClean="0">
-                <a:solidFill>
-                  <a:srgbClr val="000000"/>
-                </a:solidFill>
-                <a:latin typeface="Arial" charset="0"/>
-                <a:ea typeface="宋体" charset="-122"/>
+              <a:rPr lang="en-US" altLang="zh-CN" sz="3200" dirty="0" smtClean="0">
+                <a:solidFill>
+                  <a:schemeClr val="bg1"/>
+                </a:solidFill>
               </a:rPr>
               <a:t>Our </a:t>
             </a:r>
             <a:r>
-              <a:rPr lang="en-US" altLang="zh-CN" sz="2400" dirty="0">
-                <a:solidFill>
-                  <a:srgbClr val="000000"/>
-                </a:solidFill>
-                <a:latin typeface="Arial" charset="0"/>
-                <a:ea typeface="宋体" charset="-122"/>
+              <a:rPr lang="en-US" altLang="zh-CN" sz="3200" dirty="0">
+                <a:solidFill>
+                  <a:schemeClr val="bg1"/>
+                </a:solidFill>
               </a:rPr>
               <a:t>framework is DRY</a:t>
             </a:r>
-            <a:endParaRPr lang="en-US" altLang="zh-CN" dirty="0">
-              <a:ea typeface="宋体" charset="-122"/>
-            </a:endParaRPr>
-          </a:p>
-          <a:p>
-            <a:pPr marL="411480" lvl="1" indent="-308610">
+          </a:p>
+          <a:p>
+            <a:pPr marL="342900" lvl="1" indent="-342900">
               <a:lnSpc>
                 <a:spcPct val="95000"/>
               </a:lnSpc>
-              <a:spcBef>
-                <a:spcPct val="0"/>
-              </a:spcBef>
               <a:buClr>
-                <a:srgbClr val="000000"/>
+                <a:schemeClr val="bg1"/>
               </a:buClr>
-              <a:buFontTx/>
+              <a:buFont typeface="Arial" pitchFamily="34" charset="0"/>
               <a:buChar char="•"/>
             </a:pPr>
             <a:r>
-              <a:rPr lang="en-US" altLang="zh-CN" sz="2400" dirty="0" smtClean="0">
-                <a:solidFill>
-                  <a:srgbClr val="000000"/>
-                </a:solidFill>
-                <a:latin typeface="Arial" charset="0"/>
-                <a:ea typeface="宋体" charset="-122"/>
+              <a:rPr lang="en-US" altLang="zh-CN" sz="3200" dirty="0" smtClean="0">
+                <a:solidFill>
+                  <a:schemeClr val="bg1"/>
+                </a:solidFill>
               </a:rPr>
               <a:t>Our </a:t>
             </a:r>
             <a:r>
-              <a:rPr lang="en-US" altLang="zh-CN" sz="2400" dirty="0">
-                <a:solidFill>
-                  <a:srgbClr val="000000"/>
-                </a:solidFill>
-                <a:latin typeface="Arial" charset="0"/>
-                <a:ea typeface="宋体" charset="-122"/>
+              <a:rPr lang="en-US" altLang="zh-CN" sz="3200" dirty="0">
+                <a:solidFill>
+                  <a:schemeClr val="bg1"/>
+                </a:solidFill>
               </a:rPr>
               <a:t>applications are DRY</a:t>
             </a:r>
-            <a:endParaRPr lang="en-US" altLang="zh-CN" dirty="0">
-              <a:ea typeface="宋体" charset="-122"/>
-            </a:endParaRPr>
-          </a:p>
-          <a:p>
-            <a:pPr marL="411480" lvl="1" indent="-308610">
+          </a:p>
+          <a:p>
+            <a:pPr marL="342900" lvl="1" indent="-342900">
               <a:lnSpc>
                 <a:spcPct val="95000"/>
               </a:lnSpc>
-              <a:spcBef>
-                <a:spcPct val="0"/>
-              </a:spcBef>
               <a:buClr>
-                <a:srgbClr val="000000"/>
+                <a:schemeClr val="bg1"/>
               </a:buClr>
-              <a:buFontTx/>
+              <a:buFont typeface="Arial" pitchFamily="34" charset="0"/>
               <a:buChar char="•"/>
             </a:pPr>
             <a:r>
-              <a:rPr lang="en-US" altLang="zh-CN" sz="2400" dirty="0" smtClean="0">
-                <a:solidFill>
-                  <a:srgbClr val="000000"/>
-                </a:solidFill>
-                <a:latin typeface="Arial" charset="0"/>
-                <a:ea typeface="宋体" charset="-122"/>
+              <a:rPr lang="en-US" altLang="zh-CN" sz="3200" dirty="0" smtClean="0">
+                <a:solidFill>
+                  <a:schemeClr val="bg1"/>
+                </a:solidFill>
               </a:rPr>
               <a:t>Our application deployment </a:t>
             </a:r>
             <a:r>
-              <a:rPr lang="en-US" altLang="zh-CN" sz="2400" dirty="0">
-                <a:solidFill>
-                  <a:srgbClr val="000000"/>
-                </a:solidFill>
-                <a:latin typeface="Arial" charset="0"/>
-                <a:ea typeface="宋体" charset="-122"/>
+              <a:rPr lang="en-US" altLang="zh-CN" sz="3200" dirty="0">
+                <a:solidFill>
+                  <a:schemeClr val="bg1"/>
+                </a:solidFill>
               </a:rPr>
-              <a:t>also is DRY </a:t>
+              <a:t>also is </a:t>
+            </a:r>
+            <a:r>
+              <a:rPr lang="en-US" altLang="zh-CN" sz="3200" dirty="0" smtClean="0">
+                <a:solidFill>
+                  <a:schemeClr val="bg1"/>
+                </a:solidFill>
+              </a:rPr>
+              <a:t>DRY</a:t>
             </a:r>
           </a:p>
         </p:txBody>
@@ -3342,12 +3331,27 @@
   <p:clrMapOvr>
     <a:masterClrMapping/>
   </p:clrMapOvr>
+  <p:timing>
+    <p:tnLst>
+      <p:par>
+        <p:cTn id="1" dur="indefinite" restart="never" nodeType="tmRoot"/>
+      </p:par>
+    </p:tnLst>
+  </p:timing>
 </p:sld>
 </file>
 
 <file path=ppt/slides/slide11.xml><?xml version="1.0" encoding="utf-8"?>
 <p:sld xmlns:a="http://schemas.openxmlformats.org/drawingml/2006/main" xmlns:r="http://schemas.openxmlformats.org/officeDocument/2006/relationships" xmlns:p="http://schemas.openxmlformats.org/presentationml/2006/main">
   <p:cSld>
+    <p:bg>
+      <p:bgPr>
+        <a:solidFill>
+          <a:schemeClr val="tx1"/>
+        </a:solidFill>
+        <a:effectLst/>
+      </p:bgPr>
+    </p:bg>
     <p:spTree>
       <p:nvGrpSpPr>
         <p:cNvPr id="1" name=""/>
@@ -3374,7 +3378,9 @@
         </p:nvSpPr>
         <p:spPr/>
         <p:txBody>
-          <a:bodyPr lIns="0" tIns="0" rIns="0" bIns="0" anchor="t"/>
+          <a:bodyPr vert="horz" lIns="91440" tIns="45720" rIns="91440" bIns="45720" rtlCol="0" anchor="ctr">
+            <a:normAutofit/>
+          </a:bodyPr>
           <a:lstStyle/>
           <a:p>
             <a:pPr>
@@ -3383,12 +3389,10 @@
               </a:lnSpc>
             </a:pPr>
             <a:r>
-              <a:rPr lang="en-US" altLang="zh-CN" sz="3900" dirty="0">
-                <a:solidFill>
-                  <a:srgbClr val="000000"/>
-                </a:solidFill>
-                <a:latin typeface="Arial" charset="0"/>
-                <a:ea typeface="宋体" charset="-122"/>
+              <a:rPr lang="en-US" altLang="zh-CN" sz="4000" dirty="0">
+                <a:solidFill>
+                  <a:schemeClr val="bg1"/>
+                </a:solidFill>
               </a:rPr>
               <a:t>Open-Closed Principle</a:t>
             </a:r>
@@ -3407,57 +3411,46 @@
         </p:nvSpPr>
         <p:spPr/>
         <p:txBody>
-          <a:bodyPr lIns="0" tIns="0" rIns="0" bIns="0"/>
-          <a:lstStyle/>
-          <a:p>
-            <a:pPr marL="411480" lvl="1" indent="-308610">
+          <a:bodyPr vert="horz" lIns="91440" tIns="45720" rIns="91440" bIns="45720" rtlCol="0">
+            <a:normAutofit/>
+          </a:bodyPr>
+          <a:lstStyle/>
+          <a:p>
+            <a:pPr marL="342900" lvl="1" indent="-342900">
               <a:lnSpc>
                 <a:spcPct val="95000"/>
               </a:lnSpc>
-              <a:spcBef>
-                <a:spcPct val="0"/>
-              </a:spcBef>
               <a:buClr>
-                <a:srgbClr val="000000"/>
+                <a:schemeClr val="bg1"/>
               </a:buClr>
-              <a:buFontTx/>
+              <a:buFont typeface="Arial" pitchFamily="34" charset="0"/>
               <a:buChar char="•"/>
             </a:pPr>
             <a:r>
-              <a:rPr lang="en-US" altLang="zh-CN" sz="2400" dirty="0">
-                <a:solidFill>
-                  <a:srgbClr val="000000"/>
-                </a:solidFill>
-                <a:latin typeface="Arial" charset="0"/>
-                <a:ea typeface="宋体" charset="-122"/>
+              <a:rPr lang="en-US" altLang="zh-CN" sz="3200" dirty="0">
+                <a:solidFill>
+                  <a:schemeClr val="bg1"/>
+                </a:solidFill>
               </a:rPr>
               <a:t>Applications</a:t>
             </a:r>
-            <a:endParaRPr lang="en-US" altLang="zh-CN" dirty="0">
-              <a:ea typeface="宋体" charset="-122"/>
-            </a:endParaRPr>
-          </a:p>
-          <a:p>
-            <a:pPr marL="411480" lvl="1" indent="-308610">
+          </a:p>
+          <a:p>
+            <a:pPr marL="342900" lvl="1" indent="-342900">
               <a:lnSpc>
                 <a:spcPct val="95000"/>
               </a:lnSpc>
-              <a:spcBef>
-                <a:spcPct val="0"/>
-              </a:spcBef>
               <a:buClr>
-                <a:srgbClr val="000000"/>
+                <a:schemeClr val="bg1"/>
               </a:buClr>
-              <a:buFontTx/>
+              <a:buFont typeface="Arial" pitchFamily="34" charset="0"/>
               <a:buChar char="•"/>
             </a:pPr>
             <a:r>
-              <a:rPr lang="en-US" altLang="zh-CN" sz="2400" dirty="0">
-                <a:solidFill>
-                  <a:srgbClr val="000000"/>
-                </a:solidFill>
-                <a:latin typeface="Arial" charset="0"/>
-                <a:ea typeface="宋体" charset="-122"/>
+              <a:rPr lang="en-US" altLang="zh-CN" sz="3200" dirty="0">
+                <a:solidFill>
+                  <a:schemeClr val="bg1"/>
+                </a:solidFill>
               </a:rPr>
               <a:t>Field type in framework</a:t>
             </a:r>
@@ -3469,12 +3462,27 @@
   <p:clrMapOvr>
     <a:masterClrMapping/>
   </p:clrMapOvr>
+  <p:timing>
+    <p:tnLst>
+      <p:par>
+        <p:cTn id="1" dur="indefinite" restart="never" nodeType="tmRoot"/>
+      </p:par>
+    </p:tnLst>
+  </p:timing>
 </p:sld>
 </file>
 
 <file path=ppt/slides/slide12.xml><?xml version="1.0" encoding="utf-8"?>
 <p:sld xmlns:a="http://schemas.openxmlformats.org/drawingml/2006/main" xmlns:r="http://schemas.openxmlformats.org/officeDocument/2006/relationships" xmlns:p="http://schemas.openxmlformats.org/presentationml/2006/main">
   <p:cSld>
+    <p:bg>
+      <p:bgPr>
+        <a:solidFill>
+          <a:schemeClr val="tx1"/>
+        </a:solidFill>
+        <a:effectLst/>
+      </p:bgPr>
+    </p:bg>
     <p:spTree>
       <p:nvGrpSpPr>
         <p:cNvPr id="1" name=""/>
@@ -3501,7 +3509,9 @@
         </p:nvSpPr>
         <p:spPr/>
         <p:txBody>
-          <a:bodyPr lIns="0" tIns="0" rIns="0" bIns="0" anchor="t"/>
+          <a:bodyPr vert="horz" lIns="91440" tIns="45720" rIns="91440" bIns="45720" rtlCol="0" anchor="ctr">
+            <a:normAutofit/>
+          </a:bodyPr>
           <a:lstStyle/>
           <a:p>
             <a:pPr>
@@ -3510,12 +3520,10 @@
               </a:lnSpc>
             </a:pPr>
             <a:r>
-              <a:rPr lang="en-US" altLang="zh-CN" sz="3900" dirty="0">
-                <a:solidFill>
-                  <a:srgbClr val="000000"/>
-                </a:solidFill>
-                <a:latin typeface="Arial" charset="0"/>
-                <a:ea typeface="宋体" charset="-122"/>
+              <a:rPr lang="en-US" altLang="zh-CN" sz="4000" dirty="0">
+                <a:solidFill>
+                  <a:schemeClr val="bg1"/>
+                </a:solidFill>
               </a:rPr>
               <a:t>Single Responsibility Principle</a:t>
             </a:r>
@@ -3534,69 +3542,73 @@
         </p:nvSpPr>
         <p:spPr/>
         <p:txBody>
-          <a:bodyPr lIns="0" tIns="0" rIns="0" bIns="0"/>
-          <a:lstStyle/>
-          <a:p>
-            <a:pPr marL="0" indent="0">
+          <a:bodyPr vert="horz" lIns="91440" tIns="45720" rIns="91440" bIns="45720" rtlCol="0">
+            <a:normAutofit/>
+          </a:bodyPr>
+          <a:lstStyle/>
+          <a:p>
+            <a:pPr>
               <a:lnSpc>
                 <a:spcPct val="95000"/>
               </a:lnSpc>
-              <a:spcBef>
-                <a:spcPct val="0"/>
-              </a:spcBef>
             </a:pPr>
             <a:r>
-              <a:rPr lang="en-US" sz="2400" dirty="0" smtClean="0"/>
+              <a:rPr lang="en-US" altLang="zh-CN" dirty="0" smtClean="0">
+                <a:solidFill>
+                  <a:schemeClr val="bg1"/>
+                </a:solidFill>
+              </a:rPr>
               <a:t>Method</a:t>
             </a:r>
           </a:p>
           <a:p>
-            <a:pPr marL="0" indent="0">
+            <a:pPr>
               <a:lnSpc>
                 <a:spcPct val="95000"/>
               </a:lnSpc>
-              <a:spcBef>
-                <a:spcPct val="0"/>
-              </a:spcBef>
             </a:pPr>
             <a:r>
-              <a:rPr lang="en-US" sz="2400" dirty="0" smtClean="0"/>
+              <a:rPr lang="en-US" altLang="zh-CN" dirty="0" smtClean="0">
+                <a:solidFill>
+                  <a:schemeClr val="bg1"/>
+                </a:solidFill>
+              </a:rPr>
               <a:t>Class</a:t>
             </a:r>
           </a:p>
           <a:p>
-            <a:pPr marL="0" indent="0">
+            <a:pPr>
               <a:lnSpc>
                 <a:spcPct val="95000"/>
               </a:lnSpc>
-              <a:spcBef>
-                <a:spcPct val="0"/>
-              </a:spcBef>
             </a:pPr>
             <a:r>
-              <a:rPr lang="en-US" sz="2400" dirty="0" smtClean="0"/>
+              <a:rPr lang="en-US" altLang="zh-CN" dirty="0" smtClean="0">
+                <a:solidFill>
+                  <a:schemeClr val="bg1"/>
+                </a:solidFill>
+              </a:rPr>
               <a:t>Package</a:t>
             </a:r>
           </a:p>
           <a:p>
-            <a:pPr marL="0" indent="0">
+            <a:pPr>
               <a:lnSpc>
                 <a:spcPct val="95000"/>
               </a:lnSpc>
-              <a:spcBef>
-                <a:spcPct val="0"/>
-              </a:spcBef>
             </a:pPr>
             <a:r>
-              <a:rPr lang="en-US" sz="2400" dirty="0" smtClean="0"/>
+              <a:rPr lang="en-US" altLang="zh-CN" dirty="0" smtClean="0">
+                <a:solidFill>
+                  <a:schemeClr val="bg1"/>
+                </a:solidFill>
+              </a:rPr>
               <a:t>Component</a:t>
             </a:r>
-            <a:endParaRPr lang="en-US" altLang="zh-CN" sz="2400" dirty="0">
+            <a:endParaRPr lang="en-US" altLang="zh-CN" dirty="0">
               <a:solidFill>
-                <a:srgbClr val="000000"/>
+                <a:schemeClr val="bg1"/>
               </a:solidFill>
-              <a:latin typeface="Arial" charset="0"/>
-              <a:ea typeface="宋体" charset="-122"/>
             </a:endParaRPr>
           </a:p>
         </p:txBody>
@@ -3606,12 +3618,27 @@
   <p:clrMapOvr>
     <a:masterClrMapping/>
   </p:clrMapOvr>
+  <p:timing>
+    <p:tnLst>
+      <p:par>
+        <p:cTn id="1" dur="indefinite" restart="never" nodeType="tmRoot"/>
+      </p:par>
+    </p:tnLst>
+  </p:timing>
 </p:sld>
 </file>
 
 <file path=ppt/slides/slide13.xml><?xml version="1.0" encoding="utf-8"?>
 <p:sld xmlns:a="http://schemas.openxmlformats.org/drawingml/2006/main" xmlns:r="http://schemas.openxmlformats.org/officeDocument/2006/relationships" xmlns:p="http://schemas.openxmlformats.org/presentationml/2006/main">
   <p:cSld>
+    <p:bg>
+      <p:bgPr>
+        <a:solidFill>
+          <a:schemeClr val="tx1"/>
+        </a:solidFill>
+        <a:effectLst/>
+      </p:bgPr>
+    </p:bg>
     <p:spTree>
       <p:nvGrpSpPr>
         <p:cNvPr id="1" name=""/>
@@ -3628,9 +3655,9 @@
       </p:grpSpPr>
       <p:sp>
         <p:nvSpPr>
-          <p:cNvPr id="9217" name="Rectangle 1"/>
-          <p:cNvSpPr>
-            <a:spLocks noGrp="1" noChangeArrowheads="1"/>
+          <p:cNvPr id="2" name="Title 1"/>
+          <p:cNvSpPr>
+            <a:spLocks noGrp="1"/>
           </p:cNvSpPr>
           <p:nvPr>
             <p:ph type="title"/>
@@ -3638,32 +3665,39 @@
         </p:nvSpPr>
         <p:spPr/>
         <p:txBody>
-          <a:bodyPr lIns="0" tIns="0" rIns="0" bIns="0" anchor="t"/>
-          <a:lstStyle/>
-          <a:p>
-            <a:pPr>
-              <a:lnSpc>
-                <a:spcPct val="95000"/>
-              </a:lnSpc>
-            </a:pPr>
-            <a:r>
-              <a:rPr lang="en-US" altLang="zh-CN" sz="3900" dirty="0">
-                <a:solidFill>
-                  <a:srgbClr val="000000"/>
-                </a:solidFill>
-                <a:latin typeface="Arial" charset="0"/>
-                <a:ea typeface="宋体" charset="-122"/>
+          <a:bodyPr>
+            <a:normAutofit fontScale="90000"/>
+          </a:bodyPr>
+          <a:lstStyle/>
+          <a:p>
+            <a:r>
+              <a:rPr lang="en-US" altLang="zh-CN" dirty="0" smtClean="0">
+                <a:solidFill>
+                  <a:schemeClr val="bg1"/>
+                </a:solidFill>
               </a:rPr>
-              <a:t>Design Patterns</a:t>
-            </a:r>
-          </a:p>
-        </p:txBody>
-      </p:sp>
-      <p:sp>
-        <p:nvSpPr>
-          <p:cNvPr id="9218" name="Rectangle 2"/>
-          <p:cNvSpPr>
-            <a:spLocks noGrp="1" noChangeArrowheads="1"/>
+              <a:t>Acyclic Dependence Principle</a:t>
+            </a:r>
+            <a:br>
+              <a:rPr lang="en-US" altLang="zh-CN" dirty="0" smtClean="0">
+                <a:solidFill>
+                  <a:schemeClr val="bg1"/>
+                </a:solidFill>
+              </a:rPr>
+            </a:br>
+            <a:endParaRPr lang="zh-CN" altLang="en-US" dirty="0">
+              <a:solidFill>
+                <a:schemeClr val="bg1"/>
+              </a:solidFill>
+            </a:endParaRPr>
+          </a:p>
+        </p:txBody>
+      </p:sp>
+      <p:sp>
+        <p:nvSpPr>
+          <p:cNvPr id="3" name="Content Placeholder 2"/>
+          <p:cNvSpPr>
+            <a:spLocks noGrp="1"/>
           </p:cNvSpPr>
           <p:nvPr>
             <p:ph idx="1"/>
@@ -3671,88 +3705,24 @@
         </p:nvSpPr>
         <p:spPr/>
         <p:txBody>
-          <a:bodyPr lIns="0" tIns="0" rIns="0" bIns="0"/>
-          <a:lstStyle/>
-          <a:p>
-            <a:pPr marL="411480" lvl="1" indent="-308610">
-              <a:lnSpc>
-                <a:spcPct val="95000"/>
-              </a:lnSpc>
-              <a:spcBef>
-                <a:spcPct val="0"/>
-              </a:spcBef>
-              <a:buClr>
-                <a:srgbClr val="000000"/>
-              </a:buClr>
-              <a:buFontTx/>
-              <a:buChar char="•"/>
-            </a:pPr>
-            <a:r>
-              <a:rPr lang="en-US" altLang="zh-CN" sz="2400" dirty="0">
-                <a:solidFill>
-                  <a:srgbClr val="000000"/>
-                </a:solidFill>
-                <a:latin typeface="Arial" charset="0"/>
-                <a:ea typeface="宋体" charset="-122"/>
+          <a:bodyPr vert="horz" lIns="91440" tIns="45720" rIns="91440" bIns="45720" rtlCol="0">
+            <a:normAutofit/>
+          </a:bodyPr>
+          <a:lstStyle/>
+          <a:p>
+            <a:r>
+              <a:rPr lang="en-US" altLang="zh-CN" dirty="0" smtClean="0">
+                <a:solidFill>
+                  <a:schemeClr val="bg1"/>
+                </a:solidFill>
               </a:rPr>
-              <a:t>MVC design pattern</a:t>
-            </a:r>
-            <a:endParaRPr lang="en-US" altLang="zh-CN" dirty="0">
-              <a:ea typeface="宋体" charset="-122"/>
+              <a:t>the dependency structure is a directed acyclic graphic without cycles </a:t>
+            </a:r>
+            <a:endParaRPr lang="zh-CN" altLang="en-US" dirty="0" smtClean="0">
+              <a:solidFill>
+                <a:schemeClr val="bg1"/>
+              </a:solidFill>
             </a:endParaRPr>
-          </a:p>
-          <a:p>
-            <a:pPr marL="411480" lvl="1" indent="-308610">
-              <a:lnSpc>
-                <a:spcPct val="95000"/>
-              </a:lnSpc>
-              <a:spcBef>
-                <a:spcPct val="0"/>
-              </a:spcBef>
-              <a:buClr>
-                <a:srgbClr val="000000"/>
-              </a:buClr>
-              <a:buFontTx/>
-              <a:buChar char="•"/>
-            </a:pPr>
-            <a:r>
-              <a:rPr lang="en-US" altLang="zh-CN" sz="2400" dirty="0">
-                <a:solidFill>
-                  <a:srgbClr val="000000"/>
-                </a:solidFill>
-                <a:latin typeface="Arial" charset="0"/>
-                <a:ea typeface="宋体" charset="-122"/>
-              </a:rPr>
-              <a:t>Observers pattern</a:t>
-            </a:r>
-            <a:endParaRPr lang="en-US" altLang="zh-CN" dirty="0">
-              <a:ea typeface="宋体" charset="-122"/>
-            </a:endParaRPr>
-          </a:p>
-          <a:p>
-            <a:pPr marL="411480" lvl="1" indent="-308610">
-              <a:lnSpc>
-                <a:spcPct val="95000"/>
-              </a:lnSpc>
-              <a:spcBef>
-                <a:spcPct val="0"/>
-              </a:spcBef>
-              <a:buClr>
-                <a:srgbClr val="000000"/>
-              </a:buClr>
-              <a:buFontTx/>
-              <a:buChar char="•"/>
-            </a:pPr>
-            <a:r>
-              <a:rPr lang="en-US" altLang="zh-CN" sz="2400" dirty="0">
-                <a:solidFill>
-                  <a:srgbClr val="000000"/>
-                </a:solidFill>
-                <a:latin typeface="Arial" charset="0"/>
-                <a:ea typeface="宋体" charset="-122"/>
-              </a:rPr>
-              <a:t>Object Adapter </a:t>
-            </a:r>
           </a:p>
         </p:txBody>
       </p:sp>
@@ -3761,12 +3731,27 @@
   <p:clrMapOvr>
     <a:masterClrMapping/>
   </p:clrMapOvr>
+  <p:timing>
+    <p:tnLst>
+      <p:par>
+        <p:cTn id="1" dur="indefinite" restart="never" nodeType="tmRoot"/>
+      </p:par>
+    </p:tnLst>
+  </p:timing>
 </p:sld>
 </file>
 
 <file path=ppt/slides/slide14.xml><?xml version="1.0" encoding="utf-8"?>
 <p:sld xmlns:a="http://schemas.openxmlformats.org/drawingml/2006/main" xmlns:r="http://schemas.openxmlformats.org/officeDocument/2006/relationships" xmlns:p="http://schemas.openxmlformats.org/presentationml/2006/main">
   <p:cSld>
+    <p:bg>
+      <p:bgPr>
+        <a:solidFill>
+          <a:schemeClr val="tx1"/>
+        </a:solidFill>
+        <a:effectLst/>
+      </p:bgPr>
+    </p:bg>
     <p:spTree>
       <p:nvGrpSpPr>
         <p:cNvPr id="1" name=""/>
@@ -3783,7 +3768,106 @@
       </p:grpSpPr>
       <p:sp>
         <p:nvSpPr>
-          <p:cNvPr id="10241" name="Rectangle 1"/>
+          <p:cNvPr id="2" name="Title 1"/>
+          <p:cNvSpPr>
+            <a:spLocks noGrp="1"/>
+          </p:cNvSpPr>
+          <p:nvPr>
+            <p:ph type="title"/>
+          </p:nvPr>
+        </p:nvSpPr>
+        <p:spPr/>
+        <p:txBody>
+          <a:bodyPr>
+            <a:normAutofit fontScale="90000"/>
+          </a:bodyPr>
+          <a:lstStyle/>
+          <a:p>
+            <a:r>
+              <a:rPr lang="en-US" altLang="zh-CN" dirty="0" smtClean="0">
+                <a:solidFill>
+                  <a:schemeClr val="bg1"/>
+                </a:solidFill>
+              </a:rPr>
+              <a:t>Stable Dependency Principle and Stable Abstraction Principle</a:t>
+            </a:r>
+          </a:p>
+        </p:txBody>
+      </p:sp>
+      <p:sp>
+        <p:nvSpPr>
+          <p:cNvPr id="3" name="Content Placeholder 2"/>
+          <p:cNvSpPr>
+            <a:spLocks noGrp="1"/>
+          </p:cNvSpPr>
+          <p:nvPr>
+            <p:ph idx="1"/>
+          </p:nvPr>
+        </p:nvSpPr>
+        <p:spPr/>
+        <p:txBody>
+          <a:bodyPr/>
+          <a:lstStyle/>
+          <a:p>
+            <a:r>
+              <a:rPr lang="en-US" altLang="zh-CN" dirty="0" smtClean="0">
+                <a:solidFill>
+                  <a:schemeClr val="bg1"/>
+                </a:solidFill>
+              </a:rPr>
+              <a:t>all components with high I metrics depend on the ones with low I metrics, and what's more, the result of our A, I and D' is great!</a:t>
+            </a:r>
+            <a:endParaRPr lang="zh-CN" altLang="en-US" dirty="0">
+              <a:solidFill>
+                <a:schemeClr val="bg1"/>
+              </a:solidFill>
+            </a:endParaRPr>
+          </a:p>
+        </p:txBody>
+      </p:sp>
+    </p:spTree>
+  </p:cSld>
+  <p:clrMapOvr>
+    <a:masterClrMapping/>
+  </p:clrMapOvr>
+  <p:timing>
+    <p:tnLst>
+      <p:par>
+        <p:cTn id="1" dur="indefinite" restart="never" nodeType="tmRoot"/>
+      </p:par>
+    </p:tnLst>
+  </p:timing>
+</p:sld>
+</file>
+
+<file path=ppt/slides/slide15.xml><?xml version="1.0" encoding="utf-8"?>
+<p:sld xmlns:a="http://schemas.openxmlformats.org/drawingml/2006/main" xmlns:r="http://schemas.openxmlformats.org/officeDocument/2006/relationships" xmlns:p="http://schemas.openxmlformats.org/presentationml/2006/main">
+  <p:cSld>
+    <p:bg>
+      <p:bgPr>
+        <a:solidFill>
+          <a:schemeClr val="tx1"/>
+        </a:solidFill>
+        <a:effectLst/>
+      </p:bgPr>
+    </p:bg>
+    <p:spTree>
+      <p:nvGrpSpPr>
+        <p:cNvPr id="1" name=""/>
+        <p:cNvGrpSpPr/>
+        <p:nvPr/>
+      </p:nvGrpSpPr>
+      <p:grpSpPr>
+        <a:xfrm>
+          <a:off x="0" y="0"/>
+          <a:ext cx="0" cy="0"/>
+          <a:chOff x="0" y="0"/>
+          <a:chExt cx="0" cy="0"/>
+        </a:xfrm>
+      </p:grpSpPr>
+      <p:sp>
+        <p:nvSpPr>
+          <p:cNvPr id="9217" name="Rectangle 1"/>
           <p:cNvSpPr>
             <a:spLocks noGrp="1" noChangeArrowheads="1"/>
           </p:cNvSpPr>
@@ -3793,7 +3877,7 @@
         </p:nvSpPr>
         <p:spPr/>
         <p:txBody>
-          <a:bodyPr lIns="0" tIns="0" rIns="0" bIns="0" anchor="t">
+          <a:bodyPr vert="horz" lIns="91440" tIns="45720" rIns="91440" bIns="45720" rtlCol="0" anchor="ctr">
             <a:normAutofit/>
           </a:bodyPr>
           <a:lstStyle/>
@@ -3804,12 +3888,161 @@
               </a:lnSpc>
             </a:pPr>
             <a:r>
-              <a:rPr lang="en-US" altLang="zh-CN" sz="3900" dirty="0">
-                <a:solidFill>
-                  <a:srgbClr val="000000"/>
-                </a:solidFill>
-                <a:latin typeface="Arial" charset="0"/>
-                <a:ea typeface="宋体" charset="-122"/>
+              <a:rPr lang="en-US" altLang="zh-CN" sz="4000" dirty="0">
+                <a:solidFill>
+                  <a:schemeClr val="bg1"/>
+                </a:solidFill>
+              </a:rPr>
+              <a:t>Design Patterns</a:t>
+            </a:r>
+          </a:p>
+        </p:txBody>
+      </p:sp>
+      <p:sp>
+        <p:nvSpPr>
+          <p:cNvPr id="9218" name="Rectangle 2"/>
+          <p:cNvSpPr>
+            <a:spLocks noGrp="1" noChangeArrowheads="1"/>
+          </p:cNvSpPr>
+          <p:nvPr>
+            <p:ph idx="1"/>
+          </p:nvPr>
+        </p:nvSpPr>
+        <p:spPr/>
+        <p:txBody>
+          <a:bodyPr vert="horz" lIns="91440" tIns="45720" rIns="91440" bIns="45720" rtlCol="0">
+            <a:normAutofit/>
+          </a:bodyPr>
+          <a:lstStyle/>
+          <a:p>
+            <a:pPr marL="342900" lvl="1" indent="-342900">
+              <a:lnSpc>
+                <a:spcPct val="95000"/>
+              </a:lnSpc>
+              <a:buClr>
+                <a:srgbClr val="000000"/>
+              </a:buClr>
+              <a:buFont typeface="Arial" pitchFamily="34" charset="0"/>
+              <a:buChar char="•"/>
+            </a:pPr>
+            <a:r>
+              <a:rPr lang="en-US" altLang="zh-CN" sz="3200" dirty="0">
+                <a:solidFill>
+                  <a:schemeClr val="bg1"/>
+                </a:solidFill>
+              </a:rPr>
+              <a:t>MVC design pattern</a:t>
+            </a:r>
+          </a:p>
+          <a:p>
+            <a:pPr marL="342900" lvl="1" indent="-342900">
+              <a:lnSpc>
+                <a:spcPct val="95000"/>
+              </a:lnSpc>
+              <a:buClr>
+                <a:srgbClr val="000000"/>
+              </a:buClr>
+              <a:buFont typeface="Arial" pitchFamily="34" charset="0"/>
+              <a:buChar char="•"/>
+            </a:pPr>
+            <a:r>
+              <a:rPr lang="en-US" altLang="zh-CN" sz="3200" dirty="0">
+                <a:solidFill>
+                  <a:schemeClr val="bg1"/>
+                </a:solidFill>
+              </a:rPr>
+              <a:t>Observers pattern</a:t>
+            </a:r>
+          </a:p>
+          <a:p>
+            <a:pPr marL="342900" lvl="1" indent="-342900">
+              <a:lnSpc>
+                <a:spcPct val="95000"/>
+              </a:lnSpc>
+              <a:buClr>
+                <a:srgbClr val="000000"/>
+              </a:buClr>
+              <a:buFont typeface="Arial" pitchFamily="34" charset="0"/>
+              <a:buChar char="•"/>
+            </a:pPr>
+            <a:r>
+              <a:rPr lang="en-US" altLang="zh-CN" sz="3200" dirty="0">
+                <a:solidFill>
+                  <a:schemeClr val="bg1"/>
+                </a:solidFill>
+              </a:rPr>
+              <a:t>Object Adapter </a:t>
+            </a:r>
+          </a:p>
+        </p:txBody>
+      </p:sp>
+    </p:spTree>
+  </p:cSld>
+  <p:clrMapOvr>
+    <a:masterClrMapping/>
+  </p:clrMapOvr>
+  <p:timing>
+    <p:tnLst>
+      <p:par>
+        <p:cTn id="1" dur="indefinite" restart="never" nodeType="tmRoot"/>
+      </p:par>
+    </p:tnLst>
+  </p:timing>
+</p:sld>
+</file>
+
+<file path=ppt/slides/slide16.xml><?xml version="1.0" encoding="utf-8"?>
+<p:sld xmlns:a="http://schemas.openxmlformats.org/drawingml/2006/main" xmlns:r="http://schemas.openxmlformats.org/officeDocument/2006/relationships" xmlns:p="http://schemas.openxmlformats.org/presentationml/2006/main">
+  <p:cSld>
+    <p:bg>
+      <p:bgPr>
+        <a:solidFill>
+          <a:schemeClr val="tx1"/>
+        </a:solidFill>
+        <a:effectLst/>
+      </p:bgPr>
+    </p:bg>
+    <p:spTree>
+      <p:nvGrpSpPr>
+        <p:cNvPr id="1" name=""/>
+        <p:cNvGrpSpPr/>
+        <p:nvPr/>
+      </p:nvGrpSpPr>
+      <p:grpSpPr>
+        <a:xfrm>
+          <a:off x="0" y="0"/>
+          <a:ext cx="0" cy="0"/>
+          <a:chOff x="0" y="0"/>
+          <a:chExt cx="0" cy="0"/>
+        </a:xfrm>
+      </p:grpSpPr>
+      <p:sp>
+        <p:nvSpPr>
+          <p:cNvPr id="10241" name="Rectangle 1"/>
+          <p:cNvSpPr>
+            <a:spLocks noGrp="1" noChangeArrowheads="1"/>
+          </p:cNvSpPr>
+          <p:nvPr>
+            <p:ph type="title"/>
+          </p:nvPr>
+        </p:nvSpPr>
+        <p:spPr/>
+        <p:txBody>
+          <a:bodyPr vert="horz" lIns="91440" tIns="45720" rIns="91440" bIns="45720" rtlCol="0" anchor="ctr">
+            <a:normAutofit/>
+          </a:bodyPr>
+          <a:lstStyle/>
+          <a:p>
+            <a:pPr>
+              <a:lnSpc>
+                <a:spcPct val="95000"/>
+              </a:lnSpc>
+            </a:pPr>
+            <a:r>
+              <a:rPr lang="en-US" altLang="zh-CN" sz="4000" dirty="0">
+                <a:solidFill>
+                  <a:schemeClr val="bg1"/>
+                </a:solidFill>
               </a:rPr>
               <a:t>Test Cases for Sensible PHP Framework</a:t>
             </a:r>
@@ -3866,9 +4099,17 @@
 </p:sld>
 </file>
 
-<file path=ppt/slides/slide15.xml><?xml version="1.0" encoding="utf-8"?>
+<file path=ppt/slides/slide17.xml><?xml version="1.0" encoding="utf-8"?>
 <p:sld xmlns:a="http://schemas.openxmlformats.org/drawingml/2006/main" xmlns:r="http://schemas.openxmlformats.org/officeDocument/2006/relationships" xmlns:p="http://schemas.openxmlformats.org/presentationml/2006/main">
   <p:cSld>
+    <p:bg>
+      <p:bgPr>
+        <a:solidFill>
+          <a:schemeClr val="tx1"/>
+        </a:solidFill>
+        <a:effectLst/>
+      </p:bgPr>
+    </p:bg>
     <p:spTree>
       <p:nvGrpSpPr>
         <p:cNvPr id="1" name=""/>
@@ -3895,7 +4136,9 @@
         </p:nvSpPr>
         <p:spPr/>
         <p:txBody>
-          <a:bodyPr lIns="0" tIns="0" rIns="0" bIns="0" anchor="t"/>
+          <a:bodyPr vert="horz" lIns="91440" tIns="45720" rIns="91440" bIns="45720" rtlCol="0" anchor="ctr">
+            <a:normAutofit fontScale="90000"/>
+          </a:bodyPr>
           <a:lstStyle/>
           <a:p>
             <a:pPr>
@@ -3904,12 +4147,10 @@
               </a:lnSpc>
             </a:pPr>
             <a:r>
-              <a:rPr lang="en-US" altLang="zh-CN" sz="3900" dirty="0">
-                <a:solidFill>
-                  <a:srgbClr val="000000"/>
-                </a:solidFill>
-                <a:latin typeface="Arial" charset="0"/>
-                <a:ea typeface="宋体" charset="-122"/>
+              <a:rPr lang="en-US" altLang="zh-CN" sz="4000" dirty="0">
+                <a:solidFill>
+                  <a:schemeClr val="bg1"/>
+                </a:solidFill>
               </a:rPr>
               <a:t>Test cases for Sensible Living Applications</a:t>
             </a:r>
@@ -3966,9 +4207,17 @@
 </p:sld>
 </file>
 
-<file path=ppt/slides/slide16.xml><?xml version="1.0" encoding="utf-8"?>
+<file path=ppt/slides/slide18.xml><?xml version="1.0" encoding="utf-8"?>
 <p:sld xmlns:a="http://schemas.openxmlformats.org/drawingml/2006/main" xmlns:r="http://schemas.openxmlformats.org/officeDocument/2006/relationships" xmlns:p="http://schemas.openxmlformats.org/presentationml/2006/main">
   <p:cSld>
+    <p:bg>
+      <p:bgPr>
+        <a:solidFill>
+          <a:schemeClr val="tx1"/>
+        </a:solidFill>
+        <a:effectLst/>
+      </p:bgPr>
+    </p:bg>
     <p:spTree>
       <p:nvGrpSpPr>
         <p:cNvPr id="1" name=""/>
@@ -3995,7 +4244,9 @@
         </p:nvSpPr>
         <p:spPr/>
         <p:txBody>
-          <a:bodyPr lIns="0" tIns="0" rIns="0" bIns="0" anchor="t"/>
+          <a:bodyPr vert="horz" lIns="91440" tIns="45720" rIns="91440" bIns="45720" rtlCol="0" anchor="ctr">
+            <a:normAutofit/>
+          </a:bodyPr>
           <a:lstStyle/>
           <a:p>
             <a:pPr>
@@ -4004,12 +4255,10 @@
               </a:lnSpc>
             </a:pPr>
             <a:r>
-              <a:rPr lang="en-US" altLang="zh-CN" sz="3900" dirty="0">
-                <a:solidFill>
-                  <a:srgbClr val="000000"/>
-                </a:solidFill>
-                <a:latin typeface="Arial" charset="0"/>
-                <a:ea typeface="宋体" charset="-122"/>
+              <a:rPr lang="en-US" altLang="zh-CN" sz="3600" dirty="0">
+                <a:solidFill>
+                  <a:schemeClr val="bg1"/>
+                </a:solidFill>
               </a:rPr>
               <a:t>Test cases for Sensible Living Applications</a:t>
             </a:r>
@@ -4102,9 +4351,17 @@
 </p:sld>
 </file>
 
-<file path=ppt/slides/slide17.xml><?xml version="1.0" encoding="utf-8"?>
+<file path=ppt/slides/slide19.xml><?xml version="1.0" encoding="utf-8"?>
 <p:sld xmlns:a="http://schemas.openxmlformats.org/drawingml/2006/main" xmlns:r="http://schemas.openxmlformats.org/officeDocument/2006/relationships" xmlns:p="http://schemas.openxmlformats.org/presentationml/2006/main">
   <p:cSld>
+    <p:bg>
+      <p:bgPr>
+        <a:solidFill>
+          <a:schemeClr val="tx1"/>
+        </a:solidFill>
+        <a:effectLst/>
+      </p:bgPr>
+    </p:bg>
     <p:spTree>
       <p:nvGrpSpPr>
         <p:cNvPr id="1" name=""/>
@@ -4131,7 +4388,9 @@
         </p:nvSpPr>
         <p:spPr/>
         <p:txBody>
-          <a:bodyPr lIns="0" tIns="0" rIns="0" bIns="0" anchor="t"/>
+          <a:bodyPr vert="horz" lIns="91440" tIns="45720" rIns="91440" bIns="45720" rtlCol="0" anchor="ctr">
+            <a:normAutofit/>
+          </a:bodyPr>
           <a:lstStyle/>
           <a:p>
             <a:pPr>
@@ -4140,12 +4399,10 @@
               </a:lnSpc>
             </a:pPr>
             <a:r>
-              <a:rPr lang="en-US" altLang="zh-CN" sz="3900" dirty="0">
-                <a:solidFill>
-                  <a:srgbClr val="000000"/>
-                </a:solidFill>
-                <a:latin typeface="Arial" charset="0"/>
-                <a:ea typeface="宋体" charset="-122"/>
+              <a:rPr lang="en-US" altLang="zh-CN" sz="3600" dirty="0">
+                <a:solidFill>
+                  <a:schemeClr val="bg1"/>
+                </a:solidFill>
               </a:rPr>
               <a:t>Proud</a:t>
             </a:r>
@@ -4164,132 +4421,101 @@
         </p:nvSpPr>
         <p:spPr/>
         <p:txBody>
-          <a:bodyPr lIns="0" tIns="0" rIns="0" bIns="0"/>
-          <a:lstStyle/>
-          <a:p>
-            <a:pPr marL="411480" lvl="1" indent="-308610">
+          <a:bodyPr vert="horz" lIns="91440" tIns="45720" rIns="91440" bIns="45720" rtlCol="0">
+            <a:normAutofit/>
+          </a:bodyPr>
+          <a:lstStyle/>
+          <a:p>
+            <a:pPr marL="342900" lvl="1" indent="-342900">
               <a:lnSpc>
                 <a:spcPct val="95000"/>
               </a:lnSpc>
-              <a:spcBef>
-                <a:spcPct val="0"/>
-              </a:spcBef>
               <a:buClr>
                 <a:srgbClr val="000000"/>
               </a:buClr>
-              <a:buFontTx/>
+              <a:buFont typeface="Arial" pitchFamily="34" charset="0"/>
               <a:buChar char="•"/>
             </a:pPr>
             <a:r>
-              <a:rPr lang="en-US" altLang="zh-CN" sz="2400" dirty="0">
-                <a:solidFill>
-                  <a:srgbClr val="000000"/>
-                </a:solidFill>
-                <a:latin typeface="Arial" charset="0"/>
-                <a:ea typeface="宋体" charset="-122"/>
+              <a:rPr lang="en-US" altLang="zh-CN" sz="3200" dirty="0">
+                <a:solidFill>
+                  <a:schemeClr val="bg1"/>
+                </a:solidFill>
               </a:rPr>
               <a:t>MVC Framework itself</a:t>
             </a:r>
-            <a:endParaRPr lang="en-US" altLang="zh-CN" dirty="0">
-              <a:ea typeface="宋体" charset="-122"/>
-            </a:endParaRPr>
-          </a:p>
-          <a:p>
-            <a:pPr marL="411480" lvl="1" indent="-308610">
+          </a:p>
+          <a:p>
+            <a:pPr marL="342900" lvl="1" indent="-342900">
               <a:lnSpc>
                 <a:spcPct val="95000"/>
               </a:lnSpc>
-              <a:spcBef>
-                <a:spcPct val="0"/>
-              </a:spcBef>
               <a:buClr>
                 <a:srgbClr val="000000"/>
               </a:buClr>
-              <a:buFontTx/>
+              <a:buFont typeface="Arial" pitchFamily="34" charset="0"/>
               <a:buChar char="•"/>
             </a:pPr>
             <a:r>
-              <a:rPr lang="en-US" altLang="zh-CN" sz="2400" dirty="0">
-                <a:solidFill>
-                  <a:srgbClr val="000000"/>
-                </a:solidFill>
-                <a:latin typeface="Arial" charset="0"/>
-                <a:ea typeface="宋体" charset="-122"/>
+              <a:rPr lang="en-US" altLang="zh-CN" sz="3200" dirty="0">
+                <a:solidFill>
+                  <a:schemeClr val="bg1"/>
+                </a:solidFill>
               </a:rPr>
               <a:t>DRY</a:t>
             </a:r>
-            <a:endParaRPr lang="en-US" altLang="zh-CN" dirty="0">
-              <a:ea typeface="宋体" charset="-122"/>
-            </a:endParaRPr>
-          </a:p>
-          <a:p>
-            <a:pPr marL="411480" lvl="1" indent="-308610">
+          </a:p>
+          <a:p>
+            <a:pPr marL="342900" lvl="1" indent="-342900">
               <a:lnSpc>
                 <a:spcPct val="95000"/>
               </a:lnSpc>
-              <a:spcBef>
-                <a:spcPct val="0"/>
-              </a:spcBef>
               <a:buClr>
                 <a:srgbClr val="000000"/>
               </a:buClr>
-              <a:buFontTx/>
+              <a:buFont typeface="Arial" pitchFamily="34" charset="0"/>
               <a:buChar char="•"/>
             </a:pPr>
             <a:r>
-              <a:rPr lang="en-US" altLang="zh-CN" sz="2400" dirty="0">
-                <a:solidFill>
-                  <a:srgbClr val="000000"/>
-                </a:solidFill>
-                <a:latin typeface="Arial" charset="0"/>
-                <a:ea typeface="宋体" charset="-122"/>
+              <a:rPr lang="en-US" altLang="zh-CN" sz="3200" dirty="0">
+                <a:solidFill>
+                  <a:schemeClr val="bg1"/>
+                </a:solidFill>
               </a:rPr>
               <a:t>OCP</a:t>
             </a:r>
-            <a:endParaRPr lang="en-US" altLang="zh-CN" dirty="0">
-              <a:ea typeface="宋体" charset="-122"/>
-            </a:endParaRPr>
-          </a:p>
-          <a:p>
-            <a:pPr marL="411480" lvl="1" indent="-308610">
+          </a:p>
+          <a:p>
+            <a:pPr marL="342900" lvl="1" indent="-342900">
               <a:lnSpc>
                 <a:spcPct val="95000"/>
               </a:lnSpc>
-              <a:spcBef>
-                <a:spcPct val="0"/>
-              </a:spcBef>
               <a:buClr>
                 <a:srgbClr val="000000"/>
               </a:buClr>
-              <a:buFontTx/>
+              <a:buFont typeface="Arial" pitchFamily="34" charset="0"/>
               <a:buChar char="•"/>
             </a:pPr>
             <a:r>
-              <a:rPr lang="en-US" altLang="zh-CN" sz="2400" dirty="0">
-                <a:solidFill>
-                  <a:srgbClr val="000000"/>
-                </a:solidFill>
-                <a:latin typeface="Arial" charset="0"/>
-                <a:ea typeface="宋体" charset="-122"/>
+              <a:rPr lang="en-US" altLang="zh-CN" sz="3200" dirty="0">
+                <a:solidFill>
+                  <a:schemeClr val="bg1"/>
+                </a:solidFill>
               </a:rPr>
               <a:t>Test code coverage and other </a:t>
             </a:r>
             <a:r>
-              <a:rPr lang="en-US" altLang="zh-CN" sz="2400" dirty="0" smtClean="0">
-                <a:solidFill>
-                  <a:srgbClr val="000000"/>
-                </a:solidFill>
-                <a:latin typeface="Arial" charset="0"/>
-                <a:ea typeface="宋体" charset="-122"/>
+              <a:rPr lang="en-US" altLang="zh-CN" sz="3200" dirty="0" smtClean="0">
+                <a:solidFill>
+                  <a:schemeClr val="bg1"/>
+                </a:solidFill>
               </a:rPr>
               <a:t>matrices</a:t>
             </a:r>
-            <a:endParaRPr lang="en-US" altLang="zh-CN" sz="2400" dirty="0">
+            <a:endParaRPr lang="en-US" altLang="zh-CN" sz="3200" dirty="0">
               <a:solidFill>
-                <a:srgbClr val="000000"/>
+                <a:schemeClr val="bg1"/>
               </a:solidFill>
-              <a:latin typeface="Arial" charset="0"/>
-              <a:ea typeface="宋体" charset="-122"/>
             </a:endParaRPr>
           </a:p>
         </p:txBody>
@@ -4299,220 +4525,13 @@
   <p:clrMapOvr>
     <a:masterClrMapping/>
   </p:clrMapOvr>
-</p:sld>
-</file>
-
-<file path=ppt/slides/slide18.xml><?xml version="1.0" encoding="utf-8"?>
-<p:sld xmlns:a="http://schemas.openxmlformats.org/drawingml/2006/main" xmlns:r="http://schemas.openxmlformats.org/officeDocument/2006/relationships" xmlns:p="http://schemas.openxmlformats.org/presentationml/2006/main">
-  <p:cSld>
-    <p:spTree>
-      <p:nvGrpSpPr>
-        <p:cNvPr id="1" name=""/>
-        <p:cNvGrpSpPr/>
-        <p:nvPr/>
-      </p:nvGrpSpPr>
-      <p:grpSpPr>
-        <a:xfrm>
-          <a:off x="0" y="0"/>
-          <a:ext cx="0" cy="0"/>
-          <a:chOff x="0" y="0"/>
-          <a:chExt cx="0" cy="0"/>
-        </a:xfrm>
-      </p:grpSpPr>
-      <p:sp>
-        <p:nvSpPr>
-          <p:cNvPr id="14337" name="Rectangle 1"/>
-          <p:cNvSpPr>
-            <a:spLocks noGrp="1" noChangeArrowheads="1"/>
-          </p:cNvSpPr>
-          <p:nvPr>
-            <p:ph type="title"/>
-          </p:nvPr>
-        </p:nvSpPr>
-        <p:spPr/>
-        <p:txBody>
-          <a:bodyPr lIns="0" tIns="0" rIns="0" bIns="0" anchor="t"/>
-          <a:lstStyle/>
-          <a:p>
-            <a:pPr>
-              <a:lnSpc>
-                <a:spcPct val="95000"/>
-              </a:lnSpc>
-            </a:pPr>
-            <a:r>
-              <a:rPr lang="en-US" altLang="zh-CN" sz="3900" dirty="0">
-                <a:solidFill>
-                  <a:srgbClr val="000000"/>
-                </a:solidFill>
-                <a:latin typeface="Arial" charset="0"/>
-                <a:ea typeface="宋体" charset="-122"/>
-              </a:rPr>
-              <a:t>Not proud</a:t>
-            </a:r>
-          </a:p>
-        </p:txBody>
-      </p:sp>
-      <p:sp>
-        <p:nvSpPr>
-          <p:cNvPr id="14338" name="Rectangle 2"/>
-          <p:cNvSpPr>
-            <a:spLocks noGrp="1" noChangeArrowheads="1"/>
-          </p:cNvSpPr>
-          <p:nvPr>
-            <p:ph idx="1"/>
-          </p:nvPr>
-        </p:nvSpPr>
-        <p:spPr/>
-        <p:txBody>
-          <a:bodyPr lIns="0" tIns="0" rIns="0" bIns="0"/>
-          <a:lstStyle/>
-          <a:p>
-            <a:pPr marL="411480" lvl="1" indent="-308610">
-              <a:lnSpc>
-                <a:spcPct val="95000"/>
-              </a:lnSpc>
-              <a:spcBef>
-                <a:spcPct val="0"/>
-              </a:spcBef>
-              <a:buClr>
-                <a:srgbClr val="000000"/>
-              </a:buClr>
-              <a:buFontTx/>
-              <a:buChar char="•"/>
-            </a:pPr>
-            <a:r>
-              <a:rPr lang="en-US" altLang="zh-CN" sz="2400" dirty="0">
-                <a:solidFill>
-                  <a:srgbClr val="000000"/>
-                </a:solidFill>
-                <a:latin typeface="Arial" charset="0"/>
-                <a:ea typeface="宋体" charset="-122"/>
-              </a:rPr>
-              <a:t>Some amazing features of sensible </a:t>
-            </a:r>
-            <a:r>
-              <a:rPr lang="en-US" altLang="zh-CN" sz="2400" dirty="0" err="1">
-                <a:solidFill>
-                  <a:srgbClr val="000000"/>
-                </a:solidFill>
-                <a:latin typeface="Arial" charset="0"/>
-                <a:ea typeface="宋体" charset="-122"/>
-              </a:rPr>
-              <a:t>php</a:t>
-            </a:r>
-            <a:r>
-              <a:rPr lang="en-US" altLang="zh-CN" sz="2400" dirty="0">
-                <a:solidFill>
-                  <a:srgbClr val="000000"/>
-                </a:solidFill>
-                <a:latin typeface="Arial" charset="0"/>
-                <a:ea typeface="宋体" charset="-122"/>
-              </a:rPr>
-              <a:t> left</a:t>
-            </a:r>
-            <a:endParaRPr lang="en-US" altLang="zh-CN" dirty="0">
-              <a:ea typeface="宋体" charset="-122"/>
-            </a:endParaRPr>
-          </a:p>
-          <a:p>
-            <a:pPr marL="411480" lvl="1" indent="-308610">
-              <a:lnSpc>
-                <a:spcPct val="95000"/>
-              </a:lnSpc>
-              <a:spcBef>
-                <a:spcPct val="0"/>
-              </a:spcBef>
-              <a:buClr>
-                <a:srgbClr val="000000"/>
-              </a:buClr>
-              <a:buFontTx/>
-              <a:buChar char="•"/>
-            </a:pPr>
-            <a:r>
-              <a:rPr lang="en-US" altLang="zh-CN" sz="2400" dirty="0">
-                <a:solidFill>
-                  <a:srgbClr val="000000"/>
-                </a:solidFill>
-                <a:latin typeface="Arial" charset="0"/>
-                <a:ea typeface="宋体" charset="-122"/>
-              </a:rPr>
-              <a:t>Some applications of sensible living left</a:t>
-            </a:r>
-          </a:p>
-        </p:txBody>
-      </p:sp>
-    </p:spTree>
-  </p:cSld>
-  <p:clrMapOvr>
-    <a:masterClrMapping/>
-  </p:clrMapOvr>
-</p:sld>
-</file>
-
-<file path=ppt/slides/slide19.xml><?xml version="1.0" encoding="utf-8"?>
-<p:sld xmlns:a="http://schemas.openxmlformats.org/drawingml/2006/main" xmlns:r="http://schemas.openxmlformats.org/officeDocument/2006/relationships" xmlns:p="http://schemas.openxmlformats.org/presentationml/2006/main">
-  <p:cSld>
-    <p:spTree>
-      <p:nvGrpSpPr>
-        <p:cNvPr id="1" name=""/>
-        <p:cNvGrpSpPr/>
-        <p:nvPr/>
-      </p:nvGrpSpPr>
-      <p:grpSpPr>
-        <a:xfrm>
-          <a:off x="0" y="0"/>
-          <a:ext cx="0" cy="0"/>
-          <a:chOff x="0" y="0"/>
-          <a:chExt cx="0" cy="0"/>
-        </a:xfrm>
-      </p:grpSpPr>
-      <p:sp>
-        <p:nvSpPr>
-          <p:cNvPr id="2" name="Title 1"/>
-          <p:cNvSpPr>
-            <a:spLocks noGrp="1"/>
-          </p:cNvSpPr>
-          <p:nvPr>
-            <p:ph type="title"/>
-          </p:nvPr>
-        </p:nvSpPr>
-        <p:spPr/>
-        <p:txBody>
-          <a:bodyPr/>
-          <a:lstStyle/>
-          <a:p>
-            <a:r>
-              <a:rPr lang="en-US" dirty="0" smtClean="0"/>
-              <a:t>Useful code metrics</a:t>
-            </a:r>
-            <a:endParaRPr lang="en-US" dirty="0"/>
-          </a:p>
-        </p:txBody>
-      </p:sp>
-      <p:sp>
-        <p:nvSpPr>
-          <p:cNvPr id="3" name="Content Placeholder 2"/>
-          <p:cNvSpPr>
-            <a:spLocks noGrp="1"/>
-          </p:cNvSpPr>
-          <p:nvPr>
-            <p:ph idx="1"/>
-          </p:nvPr>
-        </p:nvSpPr>
-        <p:spPr/>
-        <p:txBody>
-          <a:bodyPr/>
-          <a:lstStyle/>
-          <a:p>
-            <a:endParaRPr lang="en-US"/>
-          </a:p>
-        </p:txBody>
-      </p:sp>
-    </p:spTree>
-  </p:cSld>
-  <p:clrMapOvr>
-    <a:masterClrMapping/>
-  </p:clrMapOvr>
+  <p:timing>
+    <p:tnLst>
+      <p:par>
+        <p:cTn id="1" dur="indefinite" restart="never" nodeType="tmRoot"/>
+      </p:par>
+    </p:tnLst>
+  </p:timing>
 </p:sld>
 </file>
 
@@ -4762,6 +4781,238 @@
       </p:par>
     </p:tnLst>
   </p:timing>
+</p:sld>
+</file>
+
+<file path=ppt/slides/slide20.xml><?xml version="1.0" encoding="utf-8"?>
+<p:sld xmlns:a="http://schemas.openxmlformats.org/drawingml/2006/main" xmlns:r="http://schemas.openxmlformats.org/officeDocument/2006/relationships" xmlns:p="http://schemas.openxmlformats.org/presentationml/2006/main">
+  <p:cSld>
+    <p:bg>
+      <p:bgPr>
+        <a:solidFill>
+          <a:schemeClr val="tx1"/>
+        </a:solidFill>
+        <a:effectLst/>
+      </p:bgPr>
+    </p:bg>
+    <p:spTree>
+      <p:nvGrpSpPr>
+        <p:cNvPr id="1" name=""/>
+        <p:cNvGrpSpPr/>
+        <p:nvPr/>
+      </p:nvGrpSpPr>
+      <p:grpSpPr>
+        <a:xfrm>
+          <a:off x="0" y="0"/>
+          <a:ext cx="0" cy="0"/>
+          <a:chOff x="0" y="0"/>
+          <a:chExt cx="0" cy="0"/>
+        </a:xfrm>
+      </p:grpSpPr>
+      <p:sp>
+        <p:nvSpPr>
+          <p:cNvPr id="14337" name="Rectangle 1"/>
+          <p:cNvSpPr>
+            <a:spLocks noGrp="1" noChangeArrowheads="1"/>
+          </p:cNvSpPr>
+          <p:nvPr>
+            <p:ph type="title"/>
+          </p:nvPr>
+        </p:nvSpPr>
+        <p:spPr/>
+        <p:txBody>
+          <a:bodyPr vert="horz" lIns="91440" tIns="45720" rIns="91440" bIns="45720" rtlCol="0" anchor="ctr">
+            <a:normAutofit/>
+          </a:bodyPr>
+          <a:lstStyle/>
+          <a:p>
+            <a:pPr>
+              <a:lnSpc>
+                <a:spcPct val="95000"/>
+              </a:lnSpc>
+            </a:pPr>
+            <a:r>
+              <a:rPr lang="en-US" altLang="zh-CN" sz="3600" dirty="0">
+                <a:solidFill>
+                  <a:schemeClr val="bg1"/>
+                </a:solidFill>
+              </a:rPr>
+              <a:t>Not proud</a:t>
+            </a:r>
+          </a:p>
+        </p:txBody>
+      </p:sp>
+      <p:sp>
+        <p:nvSpPr>
+          <p:cNvPr id="14338" name="Rectangle 2"/>
+          <p:cNvSpPr>
+            <a:spLocks noGrp="1" noChangeArrowheads="1"/>
+          </p:cNvSpPr>
+          <p:nvPr>
+            <p:ph idx="1"/>
+          </p:nvPr>
+        </p:nvSpPr>
+        <p:spPr/>
+        <p:txBody>
+          <a:bodyPr vert="horz" lIns="91440" tIns="45720" rIns="91440" bIns="45720" rtlCol="0">
+            <a:normAutofit/>
+          </a:bodyPr>
+          <a:lstStyle/>
+          <a:p>
+            <a:pPr marL="342900" lvl="1" indent="-342900">
+              <a:lnSpc>
+                <a:spcPct val="95000"/>
+              </a:lnSpc>
+              <a:buClr>
+                <a:srgbClr val="000000"/>
+              </a:buClr>
+              <a:buFont typeface="Arial" pitchFamily="34" charset="0"/>
+              <a:buChar char="•"/>
+            </a:pPr>
+            <a:r>
+              <a:rPr lang="en-US" altLang="zh-CN" sz="3200" dirty="0">
+                <a:solidFill>
+                  <a:schemeClr val="bg1"/>
+                </a:solidFill>
+              </a:rPr>
+              <a:t>Some amazing features of sensible </a:t>
+            </a:r>
+            <a:r>
+              <a:rPr lang="en-US" altLang="zh-CN" sz="3200" dirty="0" err="1">
+                <a:solidFill>
+                  <a:schemeClr val="bg1"/>
+                </a:solidFill>
+              </a:rPr>
+              <a:t>php</a:t>
+            </a:r>
+            <a:r>
+              <a:rPr lang="en-US" altLang="zh-CN" sz="3200" dirty="0">
+                <a:solidFill>
+                  <a:schemeClr val="bg1"/>
+                </a:solidFill>
+              </a:rPr>
+              <a:t> </a:t>
+            </a:r>
+            <a:r>
+              <a:rPr lang="en-US" altLang="zh-CN" sz="3200" dirty="0" smtClean="0">
+                <a:solidFill>
+                  <a:schemeClr val="bg1"/>
+                </a:solidFill>
+              </a:rPr>
+              <a:t>left</a:t>
+            </a:r>
+          </a:p>
+          <a:p>
+            <a:pPr marL="342900" lvl="1" indent="-342900">
+              <a:lnSpc>
+                <a:spcPct val="95000"/>
+              </a:lnSpc>
+              <a:buClr>
+                <a:srgbClr val="000000"/>
+              </a:buClr>
+              <a:buFont typeface="Arial" pitchFamily="34" charset="0"/>
+              <a:buChar char="•"/>
+            </a:pPr>
+            <a:endParaRPr lang="en-US" altLang="zh-CN" sz="3200" dirty="0">
+              <a:solidFill>
+                <a:schemeClr val="bg1"/>
+              </a:solidFill>
+            </a:endParaRPr>
+          </a:p>
+          <a:p>
+            <a:pPr marL="342900" lvl="1" indent="-342900">
+              <a:lnSpc>
+                <a:spcPct val="95000"/>
+              </a:lnSpc>
+              <a:buClr>
+                <a:srgbClr val="000000"/>
+              </a:buClr>
+              <a:buFont typeface="Arial" pitchFamily="34" charset="0"/>
+              <a:buChar char="•"/>
+            </a:pPr>
+            <a:r>
+              <a:rPr lang="en-US" altLang="zh-CN" sz="3200" dirty="0">
+                <a:solidFill>
+                  <a:schemeClr val="bg1"/>
+                </a:solidFill>
+              </a:rPr>
+              <a:t>Some applications of sensible living left</a:t>
+            </a:r>
+          </a:p>
+        </p:txBody>
+      </p:sp>
+    </p:spTree>
+  </p:cSld>
+  <p:clrMapOvr>
+    <a:masterClrMapping/>
+  </p:clrMapOvr>
+</p:sld>
+</file>
+
+<file path=ppt/slides/slide21.xml><?xml version="1.0" encoding="utf-8"?>
+<p:sld xmlns:a="http://schemas.openxmlformats.org/drawingml/2006/main" xmlns:r="http://schemas.openxmlformats.org/officeDocument/2006/relationships" xmlns:p="http://schemas.openxmlformats.org/presentationml/2006/main">
+  <p:cSld>
+    <p:spTree>
+      <p:nvGrpSpPr>
+        <p:cNvPr id="1" name=""/>
+        <p:cNvGrpSpPr/>
+        <p:nvPr/>
+      </p:nvGrpSpPr>
+      <p:grpSpPr>
+        <a:xfrm>
+          <a:off x="0" y="0"/>
+          <a:ext cx="0" cy="0"/>
+          <a:chOff x="0" y="0"/>
+          <a:chExt cx="0" cy="0"/>
+        </a:xfrm>
+      </p:grpSpPr>
+      <p:sp>
+        <p:nvSpPr>
+          <p:cNvPr id="2" name="Title 1"/>
+          <p:cNvSpPr>
+            <a:spLocks noGrp="1"/>
+          </p:cNvSpPr>
+          <p:nvPr>
+            <p:ph type="title"/>
+          </p:nvPr>
+        </p:nvSpPr>
+        <p:spPr/>
+        <p:txBody>
+          <a:bodyPr/>
+          <a:lstStyle/>
+          <a:p>
+            <a:r>
+              <a:rPr lang="en-US" dirty="0" smtClean="0"/>
+              <a:t>Useful code metrics</a:t>
+            </a:r>
+            <a:endParaRPr lang="en-US" dirty="0"/>
+          </a:p>
+        </p:txBody>
+      </p:sp>
+      <p:sp>
+        <p:nvSpPr>
+          <p:cNvPr id="3" name="Content Placeholder 2"/>
+          <p:cNvSpPr>
+            <a:spLocks noGrp="1"/>
+          </p:cNvSpPr>
+          <p:nvPr>
+            <p:ph idx="1"/>
+          </p:nvPr>
+        </p:nvSpPr>
+        <p:spPr/>
+        <p:txBody>
+          <a:bodyPr/>
+          <a:lstStyle/>
+          <a:p>
+            <a:endParaRPr lang="en-US"/>
+          </a:p>
+        </p:txBody>
+      </p:sp>
+    </p:spTree>
+  </p:cSld>
+  <p:clrMapOvr>
+    <a:masterClrMapping/>
+  </p:clrMapOvr>
 </p:sld>
 </file>
 
@@ -5051,6 +5302,14 @@
 <file path=ppt/slides/slide5.xml><?xml version="1.0" encoding="utf-8"?>
 <p:sld xmlns:a="http://schemas.openxmlformats.org/drawingml/2006/main" xmlns:r="http://schemas.openxmlformats.org/officeDocument/2006/relationships" xmlns:p="http://schemas.openxmlformats.org/presentationml/2006/main">
   <p:cSld>
+    <p:bg>
+      <p:bgPr>
+        <a:solidFill>
+          <a:schemeClr val="tx1"/>
+        </a:solidFill>
+        <a:effectLst/>
+      </p:bgPr>
+    </p:bg>
     <p:spTree>
       <p:nvGrpSpPr>
         <p:cNvPr id="1" name=""/>
@@ -5077,32 +5336,28 @@
         </p:nvSpPr>
         <p:spPr/>
         <p:txBody>
-          <a:bodyPr lIns="0" tIns="0" rIns="0" bIns="0" anchor="t">
-            <a:normAutofit/>
+          <a:bodyPr vert="horz" lIns="91440" tIns="45720" rIns="91440" bIns="45720" rtlCol="0" anchor="ctr">
+            <a:normAutofit fontScale="90000"/>
           </a:bodyPr>
           <a:lstStyle/>
           <a:p>
-            <a:pPr algn="l">
+            <a:pPr>
               <a:lnSpc>
                 <a:spcPct val="95000"/>
               </a:lnSpc>
             </a:pPr>
             <a:r>
-              <a:rPr lang="en-US" altLang="zh-CN" sz="3900" dirty="0" smtClean="0">
-                <a:solidFill>
-                  <a:srgbClr val="000000"/>
-                </a:solidFill>
-                <a:latin typeface="Arial" charset="0"/>
-                <a:ea typeface="宋体" charset="-122"/>
+              <a:rPr lang="en-US" altLang="zh-CN" sz="4000" dirty="0" smtClean="0">
+                <a:solidFill>
+                  <a:schemeClr val="bg1"/>
+                </a:solidFill>
               </a:rPr>
               <a:t>Introduction to Sensible PHP and Sensible Living</a:t>
             </a:r>
-            <a:endParaRPr lang="en-US" altLang="zh-CN" sz="3900" dirty="0">
+            <a:endParaRPr lang="en-US" altLang="zh-CN" sz="4000" dirty="0">
               <a:solidFill>
-                <a:srgbClr val="000000"/>
+                <a:schemeClr val="bg1"/>
               </a:solidFill>
-              <a:latin typeface="Arial" charset="0"/>
-              <a:ea typeface="宋体" charset="-122"/>
             </a:endParaRPr>
           </a:p>
         </p:txBody>
@@ -5119,64 +5374,97 @@
         </p:nvSpPr>
         <p:spPr/>
         <p:txBody>
-          <a:bodyPr lIns="0" tIns="0" rIns="0" bIns="0"/>
-          <a:lstStyle/>
-          <a:p>
-            <a:pPr marL="0" indent="0">
+          <a:bodyPr vert="horz" lIns="91440" tIns="45720" rIns="91440" bIns="45720" rtlCol="0">
+            <a:normAutofit/>
+          </a:bodyPr>
+          <a:lstStyle/>
+          <a:p>
+            <a:pPr marL="342900" lvl="1" indent="-342900">
               <a:lnSpc>
-                <a:spcPct val="95000"/>
+                <a:spcPct val="75000"/>
               </a:lnSpc>
-              <a:spcBef>
-                <a:spcPct val="0"/>
-              </a:spcBef>
+              <a:buClr>
+                <a:schemeClr val="bg1"/>
+              </a:buClr>
+              <a:buFont typeface="Arial" pitchFamily="34" charset="0"/>
+              <a:buChar char="•"/>
             </a:pPr>
             <a:r>
-              <a:rPr lang="en-US" altLang="zh-CN" sz="2400" dirty="0" smtClean="0">
-                <a:solidFill>
-                  <a:srgbClr val="000000"/>
-                </a:solidFill>
-                <a:latin typeface="Arial" charset="0"/>
-                <a:ea typeface="宋体" charset="-122"/>
+              <a:rPr lang="en-US" altLang="zh-CN" sz="2700" dirty="0" smtClean="0">
+                <a:solidFill>
+                  <a:schemeClr val="bg1"/>
+                </a:solidFill>
               </a:rPr>
-              <a:t>Sensible PHP is a small, basic and simple framework, and it’s new and great!</a:t>
-            </a:r>
-          </a:p>
-          <a:p>
-            <a:pPr marL="0" indent="0">
+              <a:t>Sensible PHP is a </a:t>
+            </a:r>
+            <a:r>
+              <a:rPr lang="en-US" altLang="zh-CN" sz="2700" dirty="0" err="1" smtClean="0">
+                <a:solidFill>
+                  <a:schemeClr val="bg1"/>
+                </a:solidFill>
+              </a:rPr>
+              <a:t>php</a:t>
+            </a:r>
+            <a:r>
+              <a:rPr lang="en-US" altLang="zh-CN" sz="2700" dirty="0" smtClean="0">
+                <a:solidFill>
+                  <a:schemeClr val="bg1"/>
+                </a:solidFill>
+              </a:rPr>
+              <a:t> </a:t>
+            </a:r>
+            <a:r>
+              <a:rPr lang="en-US" altLang="zh-CN" sz="2700" dirty="0" err="1" smtClean="0">
+                <a:solidFill>
+                  <a:schemeClr val="bg1"/>
+                </a:solidFill>
+              </a:rPr>
+              <a:t>mvc</a:t>
+            </a:r>
+            <a:r>
+              <a:rPr lang="en-US" altLang="zh-CN" sz="2700" dirty="0" smtClean="0">
+                <a:solidFill>
+                  <a:schemeClr val="bg1"/>
+                </a:solidFill>
+              </a:rPr>
+              <a:t> framework.</a:t>
+            </a:r>
+          </a:p>
+          <a:p>
+            <a:pPr marL="342900" lvl="1" indent="-342900">
               <a:lnSpc>
-                <a:spcPct val="95000"/>
+                <a:spcPct val="75000"/>
               </a:lnSpc>
-              <a:spcBef>
-                <a:spcPct val="0"/>
-              </a:spcBef>
-              <a:buNone/>
+              <a:buClr>
+                <a:schemeClr val="bg1"/>
+              </a:buClr>
+              <a:buFont typeface="Arial" pitchFamily="34" charset="0"/>
+              <a:buChar char="•"/>
             </a:pPr>
-            <a:endParaRPr lang="en-US" altLang="zh-CN" sz="2400" dirty="0" smtClean="0">
+            <a:endParaRPr lang="en-US" altLang="zh-CN" sz="2700" dirty="0" smtClean="0">
               <a:solidFill>
-                <a:srgbClr val="000000"/>
+                <a:schemeClr val="bg1"/>
               </a:solidFill>
-              <a:latin typeface="Arial" charset="0"/>
-              <a:ea typeface="宋体" charset="-122"/>
             </a:endParaRPr>
           </a:p>
           <a:p>
-            <a:pPr marL="0" indent="0">
+            <a:pPr marL="342900" lvl="1" indent="-342900">
               <a:lnSpc>
-                <a:spcPct val="95000"/>
+                <a:spcPct val="75000"/>
               </a:lnSpc>
-              <a:spcBef>
-                <a:spcPct val="0"/>
-              </a:spcBef>
+              <a:buClr>
+                <a:schemeClr val="bg1"/>
+              </a:buClr>
+              <a:buFont typeface="Arial" pitchFamily="34" charset="0"/>
+              <a:buChar char="•"/>
             </a:pPr>
             <a:r>
-              <a:rPr lang="en-US" altLang="zh-CN" sz="2400" dirty="0" smtClean="0">
-                <a:solidFill>
-                  <a:srgbClr val="000000"/>
-                </a:solidFill>
-                <a:latin typeface="Arial" charset="0"/>
-                <a:ea typeface="宋体" charset="-122"/>
+              <a:rPr lang="en-US" altLang="zh-CN" sz="2700" dirty="0" smtClean="0">
+                <a:solidFill>
+                  <a:schemeClr val="bg1"/>
+                </a:solidFill>
               </a:rPr>
-              <a:t>Sensible Living is the first application of Sensible PHP, based on Sensible PHP, we made a blog and a dictionary to implement the features of Sensible PHP, to test how well Sensible PHP works and deploys in the real projects.</a:t>
+              <a:t>Sensible Living is the first application of Sensible PHP.</a:t>
             </a:r>
           </a:p>
         </p:txBody>
@@ -5192,6 +5480,14 @@
 <file path=ppt/slides/slide6.xml><?xml version="1.0" encoding="utf-8"?>
 <p:sld xmlns:a="http://schemas.openxmlformats.org/drawingml/2006/main" xmlns:r="http://schemas.openxmlformats.org/officeDocument/2006/relationships" xmlns:p="http://schemas.openxmlformats.org/presentationml/2006/main">
   <p:cSld>
+    <p:bg>
+      <p:bgPr>
+        <a:solidFill>
+          <a:schemeClr val="tx1"/>
+        </a:solidFill>
+        <a:effectLst/>
+      </p:bgPr>
+    </p:bg>
     <p:spTree>
       <p:nvGrpSpPr>
         <p:cNvPr id="1" name=""/>
@@ -5218,21 +5514,21 @@
         </p:nvSpPr>
         <p:spPr/>
         <p:txBody>
-          <a:bodyPr lIns="0" tIns="0" rIns="0" bIns="0" anchor="t"/>
-          <a:lstStyle/>
-          <a:p>
-            <a:pPr algn="l">
+          <a:bodyPr vert="horz" lIns="91440" tIns="45720" rIns="91440" bIns="45720" rtlCol="0" anchor="ctr">
+            <a:normAutofit/>
+          </a:bodyPr>
+          <a:lstStyle/>
+          <a:p>
+            <a:pPr>
               <a:lnSpc>
                 <a:spcPct val="95000"/>
               </a:lnSpc>
             </a:pPr>
             <a:r>
-              <a:rPr lang="en-US" altLang="zh-CN" sz="3900" dirty="0">
-                <a:solidFill>
-                  <a:srgbClr val="000000"/>
-                </a:solidFill>
-                <a:latin typeface="Arial" charset="0"/>
-                <a:ea typeface="宋体" charset="-122"/>
+              <a:rPr lang="en-US" altLang="zh-CN" sz="4000" dirty="0" smtClean="0">
+                <a:solidFill>
+                  <a:schemeClr val="bg1"/>
+                </a:solidFill>
               </a:rPr>
               <a:t>Features</a:t>
             </a:r>
@@ -5251,102 +5547,161 @@
         </p:nvSpPr>
         <p:spPr/>
         <p:txBody>
-          <a:bodyPr lIns="0" tIns="0" rIns="0" bIns="0"/>
-          <a:lstStyle/>
-          <a:p>
-            <a:pPr marL="411480" lvl="1" indent="-308610">
+          <a:bodyPr vert="horz" lIns="91440" tIns="45720" rIns="91440" bIns="45720" rtlCol="0">
+            <a:normAutofit fontScale="85000" lnSpcReduction="20000"/>
+          </a:bodyPr>
+          <a:lstStyle/>
+          <a:p>
+            <a:pPr marL="342900" lvl="1" indent="-342900">
               <a:lnSpc>
                 <a:spcPct val="95000"/>
               </a:lnSpc>
-              <a:spcBef>
-                <a:spcPct val="0"/>
-              </a:spcBef>
               <a:buClr>
-                <a:srgbClr val="000000"/>
+                <a:schemeClr val="bg1"/>
               </a:buClr>
-              <a:buFontTx/>
+              <a:buFont typeface="Arial" pitchFamily="34" charset="0"/>
               <a:buChar char="•"/>
             </a:pPr>
             <a:r>
-              <a:rPr lang="en-US" altLang="zh-CN" sz="2400" dirty="0" smtClean="0">
-                <a:solidFill>
-                  <a:srgbClr val="000000"/>
-                </a:solidFill>
-                <a:latin typeface="Arial" charset="0"/>
-                <a:ea typeface="宋体" charset="-122"/>
+              <a:rPr lang="en-US" altLang="zh-CN" sz="3200" dirty="0" smtClean="0">
+                <a:solidFill>
+                  <a:schemeClr val="bg1"/>
+                </a:solidFill>
               </a:rPr>
-              <a:t>Easily initialize the project, create applications and sync with database.</a:t>
-            </a:r>
-          </a:p>
-          <a:p>
-            <a:pPr marL="411480" lvl="1" indent="-308610">
+              <a:t>By using our management script, it's pretty easy to initialize the project, create applications and sync with database.</a:t>
+            </a:r>
+          </a:p>
+          <a:p>
+            <a:pPr marL="342900" lvl="1" indent="-342900">
               <a:lnSpc>
                 <a:spcPct val="95000"/>
               </a:lnSpc>
-              <a:spcBef>
-                <a:spcPct val="0"/>
-              </a:spcBef>
               <a:buClr>
-                <a:srgbClr val="000000"/>
+                <a:schemeClr val="bg1"/>
               </a:buClr>
-              <a:buFontTx/>
+              <a:buFont typeface="Arial" pitchFamily="34" charset="0"/>
               <a:buChar char="•"/>
             </a:pPr>
             <a:r>
-              <a:rPr lang="en-US" altLang="zh-CN" sz="2400" dirty="0" smtClean="0">
-                <a:solidFill>
-                  <a:srgbClr val="000000"/>
-                </a:solidFill>
-                <a:latin typeface="Arial" charset="0"/>
-                <a:ea typeface="宋体" charset="-122"/>
+              <a:rPr lang="en-US" altLang="zh-CN" sz="3200" dirty="0" smtClean="0">
+                <a:solidFill>
+                  <a:schemeClr val="bg1"/>
+                </a:solidFill>
               </a:rPr>
-              <a:t>Easily modify the models, and write controllers, additional database logics and views.</a:t>
-            </a:r>
-          </a:p>
-          <a:p>
-            <a:pPr marL="411480" lvl="1" indent="-308610">
+              <a:t>We focus on adhering to the DRY principle, so it's easy to modify the models, and write controllers, additional database logics and views.</a:t>
+            </a:r>
+          </a:p>
+          <a:p>
+            <a:pPr marL="342900" lvl="1" indent="-342900">
               <a:lnSpc>
                 <a:spcPct val="95000"/>
               </a:lnSpc>
-              <a:spcBef>
-                <a:spcPct val="0"/>
-              </a:spcBef>
               <a:buClr>
-                <a:srgbClr val="000000"/>
+                <a:schemeClr val="bg1"/>
               </a:buClr>
-              <a:buFontTx/>
+              <a:buFont typeface="Arial" pitchFamily="34" charset="0"/>
               <a:buChar char="•"/>
             </a:pPr>
             <a:r>
-              <a:rPr lang="en-US" altLang="zh-CN" sz="2400" dirty="0" smtClean="0">
-                <a:solidFill>
-                  <a:srgbClr val="000000"/>
-                </a:solidFill>
-                <a:latin typeface="Arial" charset="0"/>
-                <a:ea typeface="宋体" charset="-122"/>
+              <a:rPr lang="en-US" altLang="zh-CN" sz="3200" dirty="0" smtClean="0">
+                <a:solidFill>
+                  <a:schemeClr val="bg1"/>
+                </a:solidFill>
               </a:rPr>
               <a:t>Flexible in coding, reuse and deployment.</a:t>
             </a:r>
           </a:p>
           <a:p>
-            <a:pPr marL="411480" lvl="1" indent="-308610">
+            <a:pPr marL="342900" lvl="1" indent="-342900">
               <a:lnSpc>
                 <a:spcPct val="95000"/>
               </a:lnSpc>
-              <a:spcBef>
-                <a:spcPct val="0"/>
-              </a:spcBef>
               <a:buClr>
-                <a:srgbClr val="000000"/>
+                <a:schemeClr val="bg1"/>
               </a:buClr>
-              <a:buNone/>
+              <a:buFont typeface="Arial" pitchFamily="34" charset="0"/>
+              <a:buChar char="•"/>
             </a:pPr>
-            <a:endParaRPr lang="en-US" altLang="zh-CN" sz="2400" dirty="0">
+            <a:r>
+              <a:rPr lang="en-US" altLang="zh-CN" sz="3200" dirty="0" smtClean="0">
+                <a:solidFill>
+                  <a:schemeClr val="bg1"/>
+                </a:solidFill>
+              </a:rPr>
+              <a:t>Easy to handle static media files, like </a:t>
+            </a:r>
+            <a:r>
+              <a:rPr lang="en-US" altLang="zh-CN" sz="3200" dirty="0" err="1" smtClean="0">
+                <a:solidFill>
+                  <a:schemeClr val="bg1"/>
+                </a:solidFill>
+              </a:rPr>
+              <a:t>Javascript</a:t>
+            </a:r>
+            <a:r>
+              <a:rPr lang="en-US" altLang="zh-CN" sz="3200" dirty="0" smtClean="0">
+                <a:solidFill>
+                  <a:schemeClr val="bg1"/>
+                </a:solidFill>
+              </a:rPr>
+              <a:t>, cascade style sheet, images, audios and videos.</a:t>
+            </a:r>
+          </a:p>
+          <a:p>
+            <a:pPr marL="342900" lvl="1" indent="-342900">
+              <a:lnSpc>
+                <a:spcPct val="95000"/>
+              </a:lnSpc>
+              <a:buClr>
+                <a:schemeClr val="bg1"/>
+              </a:buClr>
+              <a:buFont typeface="Arial" pitchFamily="34" charset="0"/>
+              <a:buChar char="•"/>
+            </a:pPr>
+            <a:r>
+              <a:rPr lang="en-US" altLang="zh-CN" sz="3200" dirty="0" smtClean="0">
+                <a:solidFill>
+                  <a:schemeClr val="bg1"/>
+                </a:solidFill>
+              </a:rPr>
+              <a:t>Easy for modification and extension as we adhere OCP principle.</a:t>
+            </a:r>
+          </a:p>
+          <a:p>
+            <a:pPr marL="342900" lvl="1" indent="-342900">
+              <a:lnSpc>
+                <a:spcPct val="95000"/>
+              </a:lnSpc>
+              <a:buClr>
+                <a:schemeClr val="bg1"/>
+              </a:buClr>
+              <a:buFont typeface="Arial" pitchFamily="34" charset="0"/>
+              <a:buChar char="•"/>
+            </a:pPr>
+            <a:r>
+              <a:rPr lang="en-US" altLang="zh-CN" sz="3200" dirty="0" smtClean="0">
+                <a:solidFill>
+                  <a:schemeClr val="bg1"/>
+                </a:solidFill>
+              </a:rPr>
+              <a:t>No worry on URL address, simply use the application name and the action name, user can get the result.</a:t>
+            </a:r>
+          </a:p>
+          <a:p>
+            <a:pPr marL="342900" lvl="1" indent="-342900">
+              <a:lnSpc>
+                <a:spcPct val="95000"/>
+              </a:lnSpc>
+              <a:buClr>
+                <a:schemeClr val="bg1"/>
+              </a:buClr>
+              <a:buFont typeface="Arial" pitchFamily="34" charset="0"/>
+              <a:buChar char="•"/>
+            </a:pPr>
+            <a:endParaRPr lang="en-US" altLang="zh-CN" sz="3200" dirty="0">
               <a:solidFill>
-                <a:srgbClr val="000000"/>
+                <a:schemeClr val="bg1"/>
               </a:solidFill>
-              <a:latin typeface="Arial" charset="0"/>
-              <a:ea typeface="宋体" charset="-122"/>
             </a:endParaRPr>
           </a:p>
         </p:txBody>
@@ -5362,6 +5717,14 @@
 <file path=ppt/slides/slide7.xml><?xml version="1.0" encoding="utf-8"?>
 <p:sld xmlns:a="http://schemas.openxmlformats.org/drawingml/2006/main" xmlns:r="http://schemas.openxmlformats.org/officeDocument/2006/relationships" xmlns:p="http://schemas.openxmlformats.org/presentationml/2006/main">
   <p:cSld>
+    <p:bg>
+      <p:bgPr>
+        <a:solidFill>
+          <a:schemeClr val="tx1"/>
+        </a:solidFill>
+        <a:effectLst/>
+      </p:bgPr>
+    </p:bg>
     <p:spTree>
       <p:nvGrpSpPr>
         <p:cNvPr id="1" name=""/>
@@ -5388,16 +5751,29 @@
         </p:nvSpPr>
         <p:spPr/>
         <p:txBody>
-          <a:bodyPr>
+          <a:bodyPr vert="horz" lIns="91440" tIns="45720" rIns="91440" bIns="45720" rtlCol="0" anchor="ctr">
             <a:normAutofit/>
           </a:bodyPr>
           <a:lstStyle/>
           <a:p>
-            <a:r>
-              <a:rPr lang="en-US" altLang="zh-CN" dirty="0" smtClean="0"/>
+            <a:pPr>
+              <a:lnSpc>
+                <a:spcPct val="95000"/>
+              </a:lnSpc>
+            </a:pPr>
+            <a:r>
+              <a:rPr lang="en-US" altLang="zh-CN" sz="4000" dirty="0" smtClean="0">
+                <a:solidFill>
+                  <a:schemeClr val="bg1"/>
+                </a:solidFill>
+              </a:rPr>
               <a:t>Class Diagram</a:t>
             </a:r>
-            <a:endParaRPr lang="zh-CN" altLang="en-US" dirty="0"/>
+            <a:endParaRPr lang="zh-CN" altLang="en-US" sz="4000" dirty="0">
+              <a:solidFill>
+                <a:schemeClr val="bg1"/>
+              </a:solidFill>
+            </a:endParaRPr>
           </a:p>
         </p:txBody>
       </p:sp>
@@ -5435,6 +5811,14 @@
 <file path=ppt/slides/slide8.xml><?xml version="1.0" encoding="utf-8"?>
 <p:sld xmlns:a="http://schemas.openxmlformats.org/drawingml/2006/main" xmlns:r="http://schemas.openxmlformats.org/officeDocument/2006/relationships" xmlns:p="http://schemas.openxmlformats.org/presentationml/2006/main">
   <p:cSld>
+    <p:bg>
+      <p:bgPr>
+        <a:solidFill>
+          <a:schemeClr val="tx1"/>
+        </a:solidFill>
+        <a:effectLst/>
+      </p:bgPr>
+    </p:bg>
     <p:spTree>
       <p:nvGrpSpPr>
         <p:cNvPr id="1" name=""/>
@@ -5461,53 +5845,93 @@
         </p:nvSpPr>
         <p:spPr/>
         <p:txBody>
-          <a:bodyPr>
+          <a:bodyPr vert="horz" lIns="91440" tIns="45720" rIns="91440" bIns="45720" rtlCol="0" anchor="ctr">
             <a:normAutofit/>
           </a:bodyPr>
           <a:lstStyle/>
           <a:p>
-            <a:r>
-              <a:rPr lang="en-US" altLang="zh-CN" dirty="0" smtClean="0"/>
+            <a:pPr>
+              <a:lnSpc>
+                <a:spcPct val="95000"/>
+              </a:lnSpc>
+            </a:pPr>
+            <a:r>
+              <a:rPr lang="en-US" altLang="zh-CN" sz="4000" dirty="0" smtClean="0">
+                <a:solidFill>
+                  <a:schemeClr val="bg1"/>
+                </a:solidFill>
+              </a:rPr>
               <a:t>Action Flow Diagram</a:t>
             </a:r>
-            <a:endParaRPr lang="zh-CN" altLang="en-US" dirty="0"/>
-          </a:p>
-        </p:txBody>
-      </p:sp>
-      <p:sp>
-        <p:nvSpPr>
-          <p:cNvPr id="3" name="Content Placeholder 2"/>
-          <p:cNvSpPr>
-            <a:spLocks noGrp="1"/>
-          </p:cNvSpPr>
+            <a:endParaRPr lang="zh-CN" altLang="en-US" sz="4000" dirty="0">
+              <a:solidFill>
+                <a:schemeClr val="bg1"/>
+              </a:solidFill>
+            </a:endParaRPr>
+          </a:p>
+        </p:txBody>
+      </p:sp>
+      <p:pic>
+        <p:nvPicPr>
+          <p:cNvPr id="1027" name="Picture 3"/>
+          <p:cNvPicPr>
+            <a:picLocks noGrp="1" noChangeAspect="1" noChangeArrowheads="1"/>
+          </p:cNvPicPr>
           <p:nvPr>
             <p:ph idx="1"/>
           </p:nvPr>
-        </p:nvSpPr>
-        <p:spPr/>
-        <p:txBody>
-          <a:bodyPr/>
-          <a:lstStyle/>
-          <a:p>
-            <a:r>
-              <a:rPr lang="en-US" altLang="zh-CN" dirty="0" smtClean="0"/>
-              <a:t>&lt;image needed&gt;</a:t>
-            </a:r>
-            <a:endParaRPr lang="zh-CN" altLang="en-US" dirty="0"/>
-          </a:p>
-        </p:txBody>
-      </p:sp>
+        </p:nvPicPr>
+        <p:blipFill>
+          <a:blip r:embed="rId2"/>
+          <a:srcRect/>
+          <a:stretch>
+            <a:fillRect/>
+          </a:stretch>
+        </p:blipFill>
+        <p:spPr bwMode="auto">
+          <a:xfrm>
+            <a:off x="1099154" y="1524000"/>
+            <a:ext cx="7014040" cy="4724399"/>
+          </a:xfrm>
+          <a:prstGeom prst="rect">
+            <a:avLst/>
+          </a:prstGeom>
+          <a:noFill/>
+          <a:ln w="9525">
+            <a:noFill/>
+            <a:miter lim="800000"/>
+            <a:headEnd/>
+            <a:tailEnd/>
+          </a:ln>
+          <a:effectLst/>
+        </p:spPr>
+      </p:pic>
     </p:spTree>
   </p:cSld>
   <p:clrMapOvr>
     <a:masterClrMapping/>
   </p:clrMapOvr>
+  <p:timing>
+    <p:tnLst>
+      <p:par>
+        <p:cTn id="1" dur="indefinite" restart="never" nodeType="tmRoot"/>
+      </p:par>
+    </p:tnLst>
+  </p:timing>
 </p:sld>
 </file>
 
 <file path=ppt/slides/slide9.xml><?xml version="1.0" encoding="utf-8"?>
 <p:sld xmlns:a="http://schemas.openxmlformats.org/drawingml/2006/main" xmlns:r="http://schemas.openxmlformats.org/officeDocument/2006/relationships" xmlns:p="http://schemas.openxmlformats.org/presentationml/2006/main">
   <p:cSld>
+    <p:bg>
+      <p:bgPr>
+        <a:solidFill>
+          <a:schemeClr val="tx1"/>
+        </a:solidFill>
+        <a:effectLst/>
+      </p:bgPr>
+    </p:bg>
     <p:spTree>
       <p:nvGrpSpPr>
         <p:cNvPr id="1" name=""/>
@@ -5534,7 +5958,9 @@
         </p:nvSpPr>
         <p:spPr/>
         <p:txBody>
-          <a:bodyPr lIns="0" tIns="0" rIns="0" bIns="0" anchor="t"/>
+          <a:bodyPr vert="horz" lIns="91440" tIns="45720" rIns="91440" bIns="45720" rtlCol="0" anchor="ctr">
+            <a:normAutofit/>
+          </a:bodyPr>
           <a:lstStyle/>
           <a:p>
             <a:pPr>
@@ -5543,12 +5969,10 @@
               </a:lnSpc>
             </a:pPr>
             <a:r>
-              <a:rPr lang="en-US" altLang="zh-CN" sz="3900" dirty="0">
-                <a:solidFill>
-                  <a:srgbClr val="000000"/>
-                </a:solidFill>
-                <a:latin typeface="Arial" charset="0"/>
-                <a:ea typeface="宋体" charset="-122"/>
+              <a:rPr lang="en-US" altLang="zh-CN" sz="4000" dirty="0">
+                <a:solidFill>
+                  <a:schemeClr val="bg1"/>
+                </a:solidFill>
               </a:rPr>
               <a:t>Design Principles</a:t>
             </a:r>
@@ -5582,7 +6006,7 @@
             <a:r>
               <a:rPr lang="en-US" altLang="zh-CN" sz="2400" dirty="0">
                 <a:solidFill>
-                  <a:srgbClr val="000000"/>
+                  <a:schemeClr val="bg1"/>
                 </a:solidFill>
                 <a:latin typeface="Arial" charset="0"/>
                 <a:ea typeface="宋体" charset="-122"/>
@@ -5597,6 +6021,13 @@
   <p:clrMapOvr>
     <a:masterClrMapping/>
   </p:clrMapOvr>
+  <p:timing>
+    <p:tnLst>
+      <p:par>
+        <p:cTn id="1" dur="indefinite" restart="never" nodeType="tmRoot"/>
+      </p:par>
+    </p:tnLst>
+  </p:timing>
 </p:sld>
 </file>
 

</xml_diff>

<commit_message>
Updated project ppt. Added slides on tools used, more agile, and uml. also updated uml to reflect current state for database schema.
</commit_message>
<xml_diff>
--- a/docs/FinalProjectPresentation.pptx
+++ b/docs/FinalProjectPresentation.pptx
@@ -7,26 +7,27 @@
   <p:sldIdLst>
     <p:sldId id="256" r:id="rId2"/>
     <p:sldId id="279" r:id="rId3"/>
-    <p:sldId id="258" r:id="rId4"/>
-    <p:sldId id="259" r:id="rId5"/>
-    <p:sldId id="280" r:id="rId6"/>
-    <p:sldId id="281" r:id="rId7"/>
-    <p:sldId id="296" r:id="rId8"/>
-    <p:sldId id="282" r:id="rId9"/>
-    <p:sldId id="283" r:id="rId10"/>
-    <p:sldId id="284" r:id="rId11"/>
-    <p:sldId id="285" r:id="rId12"/>
-    <p:sldId id="286" r:id="rId13"/>
-    <p:sldId id="287" r:id="rId14"/>
-    <p:sldId id="294" r:id="rId15"/>
-    <p:sldId id="295" r:id="rId16"/>
-    <p:sldId id="288" r:id="rId17"/>
-    <p:sldId id="289" r:id="rId18"/>
-    <p:sldId id="290" r:id="rId19"/>
-    <p:sldId id="291" r:id="rId20"/>
-    <p:sldId id="292" r:id="rId21"/>
-    <p:sldId id="293" r:id="rId22"/>
-    <p:sldId id="262" r:id="rId23"/>
+    <p:sldId id="298" r:id="rId4"/>
+    <p:sldId id="258" r:id="rId5"/>
+    <p:sldId id="297" r:id="rId6"/>
+    <p:sldId id="280" r:id="rId7"/>
+    <p:sldId id="281" r:id="rId8"/>
+    <p:sldId id="296" r:id="rId9"/>
+    <p:sldId id="282" r:id="rId10"/>
+    <p:sldId id="283" r:id="rId11"/>
+    <p:sldId id="284" r:id="rId12"/>
+    <p:sldId id="285" r:id="rId13"/>
+    <p:sldId id="286" r:id="rId14"/>
+    <p:sldId id="287" r:id="rId15"/>
+    <p:sldId id="294" r:id="rId16"/>
+    <p:sldId id="295" r:id="rId17"/>
+    <p:sldId id="288" r:id="rId18"/>
+    <p:sldId id="289" r:id="rId19"/>
+    <p:sldId id="290" r:id="rId20"/>
+    <p:sldId id="291" r:id="rId21"/>
+    <p:sldId id="292" r:id="rId22"/>
+    <p:sldId id="293" r:id="rId23"/>
+    <p:sldId id="262" r:id="rId24"/>
   </p:sldIdLst>
   <p:sldSz cx="9144000" cy="6858000" type="screen4x3"/>
   <p:notesSz cx="6858000" cy="9144000"/>
@@ -3097,7 +3098,7 @@
           <a:p>
             <a:r>
               <a:rPr lang="en-US" dirty="0" err="1" smtClean="0"/>
-              <a:t>CensableLiving</a:t>
+              <a:t>SensibleLiving</a:t>
             </a:r>
             <a:r>
               <a:rPr lang="en-US" dirty="0" smtClean="0"/>
@@ -3105,11 +3106,7 @@
             </a:r>
             <a:r>
               <a:rPr lang="en-US" dirty="0" smtClean="0"/>
-              <a:t>in </a:t>
-            </a:r>
-            <a:r>
-              <a:rPr lang="en-US" dirty="0" smtClean="0"/>
-              <a:t>php with MVC framework</a:t>
+              <a:t>in php with MVC framework</a:t>
             </a:r>
             <a:endParaRPr lang="en-US" dirty="0"/>
           </a:p>
@@ -3182,9 +3179,9 @@
       </p:grpSpPr>
       <p:sp>
         <p:nvSpPr>
-          <p:cNvPr id="5121" name="Rectangle 1"/>
-          <p:cNvSpPr>
-            <a:spLocks noGrp="1" noChangeArrowheads="1"/>
+          <p:cNvPr id="2" name="Title 1"/>
+          <p:cNvSpPr>
+            <a:spLocks noGrp="1"/>
           </p:cNvSpPr>
           <p:nvPr>
             <p:ph type="title"/>
@@ -3203,53 +3200,56 @@
               </a:lnSpc>
             </a:pPr>
             <a:r>
-              <a:rPr lang="en-US" altLang="zh-CN" sz="4000" dirty="0">
-                <a:solidFill>
-                  <a:schemeClr val="bg1"/>
-                </a:solidFill>
-              </a:rPr>
-              <a:t>Design Principles</a:t>
-            </a:r>
-          </a:p>
-        </p:txBody>
-      </p:sp>
-      <p:sp>
-        <p:nvSpPr>
-          <p:cNvPr id="5122" name="Rectangle 2"/>
-          <p:cNvSpPr>
-            <a:spLocks noGrp="1" noChangeArrowheads="1"/>
-          </p:cNvSpPr>
+              <a:rPr lang="en-US" altLang="zh-CN" sz="4000" dirty="0" smtClean="0">
+                <a:solidFill>
+                  <a:schemeClr val="bg1"/>
+                </a:solidFill>
+              </a:rPr>
+              <a:t>Action Flow Diagram</a:t>
+            </a:r>
+            <a:endParaRPr lang="zh-CN" altLang="en-US" sz="4000" dirty="0">
+              <a:solidFill>
+                <a:schemeClr val="bg1"/>
+              </a:solidFill>
+            </a:endParaRPr>
+          </a:p>
+        </p:txBody>
+      </p:sp>
+      <p:pic>
+        <p:nvPicPr>
+          <p:cNvPr id="1026" name="Picture 2"/>
+          <p:cNvPicPr>
+            <a:picLocks noGrp="1" noChangeAspect="1" noChangeArrowheads="1"/>
+          </p:cNvPicPr>
           <p:nvPr>
             <p:ph idx="1"/>
           </p:nvPr>
-        </p:nvSpPr>
-        <p:spPr/>
-        <p:txBody>
-          <a:bodyPr lIns="0" tIns="0" rIns="0" bIns="0"/>
-          <a:lstStyle/>
-          <a:p>
-            <a:pPr marL="0" indent="0">
-              <a:lnSpc>
-                <a:spcPct val="95000"/>
-              </a:lnSpc>
-              <a:spcBef>
-                <a:spcPct val="0"/>
-              </a:spcBef>
-              <a:buNone/>
-            </a:pPr>
-            <a:r>
-              <a:rPr lang="en-US" altLang="zh-CN" sz="2400" dirty="0">
-                <a:solidFill>
-                  <a:schemeClr val="bg1"/>
-                </a:solidFill>
-                <a:latin typeface="Arial" charset="0"/>
-                <a:ea typeface="宋体" charset="-122"/>
-              </a:rPr>
-              <a:t> </a:t>
-            </a:r>
-          </a:p>
-        </p:txBody>
-      </p:sp>
+        </p:nvPicPr>
+        <p:blipFill>
+          <a:blip r:embed="rId2" cstate="print"/>
+          <a:srcRect/>
+          <a:stretch>
+            <a:fillRect/>
+          </a:stretch>
+        </p:blipFill>
+        <p:spPr bwMode="auto">
+          <a:xfrm>
+            <a:off x="609600" y="1676400"/>
+            <a:ext cx="7963963" cy="4414044"/>
+          </a:xfrm>
+          <a:prstGeom prst="rect">
+            <a:avLst/>
+          </a:prstGeom>
+          <a:noFill/>
+          <a:ln w="9525">
+            <a:noFill/>
+            <a:miter lim="800000"/>
+            <a:headEnd/>
+            <a:tailEnd/>
+          </a:ln>
+          <a:effectLst/>
+        </p:spPr>
+      </p:pic>
     </p:spTree>
   </p:cSld>
   <p:clrMapOvr>
@@ -3292,7 +3292,7 @@
       </p:grpSpPr>
       <p:sp>
         <p:nvSpPr>
-          <p:cNvPr id="6145" name="Rectangle 1"/>
+          <p:cNvPr id="5121" name="Rectangle 1"/>
           <p:cNvSpPr>
             <a:spLocks noGrp="1" noChangeArrowheads="1"/>
           </p:cNvSpPr>
@@ -3318,30 +3318,14 @@
                   <a:schemeClr val="bg1"/>
                 </a:solidFill>
               </a:rPr>
-              <a:t>Don't Repeat </a:t>
-            </a:r>
-            <a:r>
-              <a:rPr lang="en-US" altLang="zh-CN" sz="4000" dirty="0" smtClean="0">
-                <a:solidFill>
-                  <a:schemeClr val="bg1"/>
-                </a:solidFill>
-              </a:rPr>
-              <a:t>Yourself </a:t>
-            </a:r>
-            <a:r>
-              <a:rPr lang="en-US" altLang="zh-CN" sz="4000" dirty="0">
-                <a:solidFill>
-                  <a:schemeClr val="bg1"/>
-                </a:solidFill>
-              </a:rPr>
-              <a:t>Principle</a:t>
-            </a:r>
-          </a:p>
-        </p:txBody>
-      </p:sp>
-      <p:sp>
-        <p:nvSpPr>
-          <p:cNvPr id="6146" name="Rectangle 2"/>
+              <a:t>Design Principles</a:t>
+            </a:r>
+          </a:p>
+        </p:txBody>
+      </p:sp>
+      <p:sp>
+        <p:nvSpPr>
+          <p:cNvPr id="5122" name="Rectangle 2"/>
           <p:cNvSpPr>
             <a:spLocks noGrp="1" noChangeArrowheads="1"/>
           </p:cNvSpPr>
@@ -3351,100 +3335,27 @@
         </p:nvSpPr>
         <p:spPr/>
         <p:txBody>
-          <a:bodyPr vert="horz" lIns="91440" tIns="45720" rIns="91440" bIns="45720" rtlCol="0">
-            <a:normAutofit/>
-          </a:bodyPr>
-          <a:lstStyle/>
-          <a:p>
-            <a:pPr marL="342900" lvl="1" indent="-342900">
+          <a:bodyPr lIns="0" tIns="0" rIns="0" bIns="0"/>
+          <a:lstStyle/>
+          <a:p>
+            <a:pPr marL="0" indent="0">
               <a:lnSpc>
                 <a:spcPct val="95000"/>
               </a:lnSpc>
-              <a:buClr>
-                <a:schemeClr val="bg1"/>
-              </a:buClr>
-              <a:buFont typeface="Arial" pitchFamily="34" charset="0"/>
-              <a:buChar char="•"/>
+              <a:spcBef>
+                <a:spcPct val="0"/>
+              </a:spcBef>
+              <a:buNone/>
             </a:pPr>
             <a:r>
-              <a:rPr lang="en-US" altLang="zh-CN" sz="3200" dirty="0" smtClean="0">
-                <a:solidFill>
-                  <a:schemeClr val="bg1"/>
-                </a:solidFill>
-              </a:rPr>
-              <a:t>Our </a:t>
-            </a:r>
-            <a:r>
-              <a:rPr lang="en-US" altLang="zh-CN" sz="3200" dirty="0">
-                <a:solidFill>
-                  <a:schemeClr val="bg1"/>
-                </a:solidFill>
-              </a:rPr>
-              <a:t>framework is DRY</a:t>
-            </a:r>
-          </a:p>
-          <a:p>
-            <a:pPr marL="342900" lvl="1" indent="-342900">
-              <a:lnSpc>
-                <a:spcPct val="95000"/>
-              </a:lnSpc>
-              <a:buClr>
-                <a:schemeClr val="bg1"/>
-              </a:buClr>
-              <a:buFont typeface="Arial" pitchFamily="34" charset="0"/>
-              <a:buChar char="•"/>
-            </a:pPr>
-            <a:r>
-              <a:rPr lang="en-US" altLang="zh-CN" sz="3200" dirty="0" smtClean="0">
-                <a:solidFill>
-                  <a:schemeClr val="bg1"/>
-                </a:solidFill>
-              </a:rPr>
-              <a:t>Our </a:t>
-            </a:r>
-            <a:r>
-              <a:rPr lang="en-US" altLang="zh-CN" sz="3200" dirty="0">
-                <a:solidFill>
-                  <a:schemeClr val="bg1"/>
-                </a:solidFill>
-              </a:rPr>
-              <a:t>applications are DRY</a:t>
-            </a:r>
-          </a:p>
-          <a:p>
-            <a:pPr marL="342900" lvl="1" indent="-342900">
-              <a:lnSpc>
-                <a:spcPct val="95000"/>
-              </a:lnSpc>
-              <a:buClr>
-                <a:schemeClr val="bg1"/>
-              </a:buClr>
-              <a:buFont typeface="Arial" pitchFamily="34" charset="0"/>
-              <a:buChar char="•"/>
-            </a:pPr>
-            <a:r>
-              <a:rPr lang="en-US" altLang="zh-CN" sz="3200" dirty="0" smtClean="0">
-                <a:solidFill>
-                  <a:schemeClr val="bg1"/>
-                </a:solidFill>
-              </a:rPr>
-              <a:t>Our application deployment </a:t>
-            </a:r>
-            <a:r>
-              <a:rPr lang="en-US" altLang="zh-CN" sz="3200" dirty="0">
-                <a:solidFill>
-                  <a:schemeClr val="bg1"/>
-                </a:solidFill>
-              </a:rPr>
-              <a:t>also is </a:t>
-            </a:r>
-            <a:r>
-              <a:rPr lang="en-US" altLang="zh-CN" sz="3200" dirty="0" smtClean="0">
-                <a:solidFill>
-                  <a:schemeClr val="bg1"/>
-                </a:solidFill>
-              </a:rPr>
-              <a:t>DRY</a:t>
+              <a:rPr lang="en-US" altLang="zh-CN" sz="2400" dirty="0">
+                <a:solidFill>
+                  <a:schemeClr val="bg1"/>
+                </a:solidFill>
+                <a:latin typeface="Arial" charset="0"/>
+                <a:ea typeface="宋体" charset="-122"/>
+              </a:rPr>
+              <a:t> </a:t>
             </a:r>
           </a:p>
         </p:txBody>
@@ -3491,7 +3402,7 @@
       </p:grpSpPr>
       <p:sp>
         <p:nvSpPr>
-          <p:cNvPr id="7169" name="Rectangle 1"/>
+          <p:cNvPr id="6145" name="Rectangle 1"/>
           <p:cNvSpPr>
             <a:spLocks noGrp="1" noChangeArrowheads="1"/>
           </p:cNvSpPr>
@@ -3517,14 +3428,30 @@
                   <a:schemeClr val="bg1"/>
                 </a:solidFill>
               </a:rPr>
-              <a:t>Open-Closed Principle</a:t>
-            </a:r>
-          </a:p>
-        </p:txBody>
-      </p:sp>
-      <p:sp>
-        <p:nvSpPr>
-          <p:cNvPr id="7170" name="Rectangle 2"/>
+              <a:t>Don't Repeat </a:t>
+            </a:r>
+            <a:r>
+              <a:rPr lang="en-US" altLang="zh-CN" sz="4000" dirty="0" smtClean="0">
+                <a:solidFill>
+                  <a:schemeClr val="bg1"/>
+                </a:solidFill>
+              </a:rPr>
+              <a:t>Yourself </a:t>
+            </a:r>
+            <a:r>
+              <a:rPr lang="en-US" altLang="zh-CN" sz="4000" dirty="0">
+                <a:solidFill>
+                  <a:schemeClr val="bg1"/>
+                </a:solidFill>
+              </a:rPr>
+              <a:t>Principle</a:t>
+            </a:r>
+          </a:p>
+        </p:txBody>
+      </p:sp>
+      <p:sp>
+        <p:nvSpPr>
+          <p:cNvPr id="6146" name="Rectangle 2"/>
           <p:cNvSpPr>
             <a:spLocks noGrp="1" noChangeArrowheads="1"/>
           </p:cNvSpPr>
@@ -3550,12 +3477,20 @@
               <a:buChar char="•"/>
             </a:pPr>
             <a:r>
+              <a:rPr lang="en-US" altLang="zh-CN" sz="3200" dirty="0" smtClean="0">
+                <a:solidFill>
+                  <a:schemeClr val="bg1"/>
+                </a:solidFill>
+              </a:rPr>
+              <a:t>Our </a:t>
+            </a:r>
+            <a:r>
               <a:rPr lang="en-US" altLang="zh-CN" sz="3200" dirty="0">
                 <a:solidFill>
                   <a:schemeClr val="bg1"/>
                 </a:solidFill>
               </a:rPr>
-              <a:t>Applications</a:t>
+              <a:t>framework is DRY</a:t>
             </a:r>
           </a:p>
           <a:p>
@@ -3570,12 +3505,56 @@
               <a:buChar char="•"/>
             </a:pPr>
             <a:r>
+              <a:rPr lang="en-US" altLang="zh-CN" sz="3200" dirty="0" smtClean="0">
+                <a:solidFill>
+                  <a:schemeClr val="bg1"/>
+                </a:solidFill>
+              </a:rPr>
+              <a:t>Our </a:t>
+            </a:r>
+            <a:r>
               <a:rPr lang="en-US" altLang="zh-CN" sz="3200" dirty="0">
                 <a:solidFill>
                   <a:schemeClr val="bg1"/>
                 </a:solidFill>
               </a:rPr>
-              <a:t>Field type in framework</a:t>
+              <a:t>applications are DRY</a:t>
+            </a:r>
+          </a:p>
+          <a:p>
+            <a:pPr marL="342900" lvl="1" indent="-342900">
+              <a:lnSpc>
+                <a:spcPct val="95000"/>
+              </a:lnSpc>
+              <a:buClr>
+                <a:schemeClr val="bg1"/>
+              </a:buClr>
+              <a:buFont typeface="Arial" pitchFamily="34" charset="0"/>
+              <a:buChar char="•"/>
+            </a:pPr>
+            <a:r>
+              <a:rPr lang="en-US" altLang="zh-CN" sz="3200" dirty="0" smtClean="0">
+                <a:solidFill>
+                  <a:schemeClr val="bg1"/>
+                </a:solidFill>
+              </a:rPr>
+              <a:t>Our application deployment </a:t>
+            </a:r>
+            <a:r>
+              <a:rPr lang="en-US" altLang="zh-CN" sz="3200" dirty="0">
+                <a:solidFill>
+                  <a:schemeClr val="bg1"/>
+                </a:solidFill>
+              </a:rPr>
+              <a:t>also is </a:t>
+            </a:r>
+            <a:r>
+              <a:rPr lang="en-US" altLang="zh-CN" sz="3200" dirty="0" smtClean="0">
+                <a:solidFill>
+                  <a:schemeClr val="bg1"/>
+                </a:solidFill>
+              </a:rPr>
+              <a:t>DRY</a:t>
             </a:r>
           </a:p>
         </p:txBody>
@@ -3622,7 +3601,7 @@
       </p:grpSpPr>
       <p:sp>
         <p:nvSpPr>
-          <p:cNvPr id="8193" name="Rectangle 1"/>
+          <p:cNvPr id="7169" name="Rectangle 1"/>
           <p:cNvSpPr>
             <a:spLocks noGrp="1" noChangeArrowheads="1"/>
           </p:cNvSpPr>
@@ -3648,14 +3627,14 @@
                   <a:schemeClr val="bg1"/>
                 </a:solidFill>
               </a:rPr>
-              <a:t>Single Responsibility Principle</a:t>
-            </a:r>
-          </a:p>
-        </p:txBody>
-      </p:sp>
-      <p:sp>
-        <p:nvSpPr>
-          <p:cNvPr id="8194" name="Rectangle 2"/>
+              <a:t>Open-Closed Principle</a:t>
+            </a:r>
+          </a:p>
+        </p:txBody>
+      </p:sp>
+      <p:sp>
+        <p:nvSpPr>
+          <p:cNvPr id="7170" name="Rectangle 2"/>
           <p:cNvSpPr>
             <a:spLocks noGrp="1" noChangeArrowheads="1"/>
           </p:cNvSpPr>
@@ -3670,69 +3649,44 @@
           </a:bodyPr>
           <a:lstStyle/>
           <a:p>
-            <a:pPr>
+            <a:pPr marL="342900" lvl="1" indent="-342900">
               <a:lnSpc>
                 <a:spcPct val="95000"/>
               </a:lnSpc>
+              <a:buClr>
+                <a:schemeClr val="bg1"/>
+              </a:buClr>
+              <a:buFont typeface="Arial" pitchFamily="34" charset="0"/>
+              <a:buChar char="•"/>
             </a:pPr>
             <a:r>
-              <a:rPr lang="en-US" altLang="zh-CN" dirty="0" smtClean="0">
-                <a:solidFill>
-                  <a:schemeClr val="bg1"/>
-                </a:solidFill>
-              </a:rPr>
-              <a:t>Method</a:t>
-            </a:r>
-          </a:p>
-          <a:p>
-            <a:pPr>
+              <a:rPr lang="en-US" altLang="zh-CN" sz="3200" dirty="0">
+                <a:solidFill>
+                  <a:schemeClr val="bg1"/>
+                </a:solidFill>
+              </a:rPr>
+              <a:t>Applications</a:t>
+            </a:r>
+          </a:p>
+          <a:p>
+            <a:pPr marL="342900" lvl="1" indent="-342900">
               <a:lnSpc>
                 <a:spcPct val="95000"/>
               </a:lnSpc>
+              <a:buClr>
+                <a:schemeClr val="bg1"/>
+              </a:buClr>
+              <a:buFont typeface="Arial" pitchFamily="34" charset="0"/>
+              <a:buChar char="•"/>
             </a:pPr>
             <a:r>
-              <a:rPr lang="en-US" altLang="zh-CN" dirty="0" smtClean="0">
-                <a:solidFill>
-                  <a:schemeClr val="bg1"/>
-                </a:solidFill>
-              </a:rPr>
-              <a:t>Class</a:t>
-            </a:r>
-          </a:p>
-          <a:p>
-            <a:pPr>
-              <a:lnSpc>
-                <a:spcPct val="95000"/>
-              </a:lnSpc>
-            </a:pPr>
-            <a:r>
-              <a:rPr lang="en-US" altLang="zh-CN" dirty="0" smtClean="0">
-                <a:solidFill>
-                  <a:schemeClr val="bg1"/>
-                </a:solidFill>
-              </a:rPr>
-              <a:t>Package</a:t>
-            </a:r>
-          </a:p>
-          <a:p>
-            <a:pPr>
-              <a:lnSpc>
-                <a:spcPct val="95000"/>
-              </a:lnSpc>
-            </a:pPr>
-            <a:r>
-              <a:rPr lang="en-US" altLang="zh-CN" dirty="0" smtClean="0">
-                <a:solidFill>
-                  <a:schemeClr val="bg1"/>
-                </a:solidFill>
-              </a:rPr>
-              <a:t>Component</a:t>
-            </a:r>
-            <a:endParaRPr lang="en-US" altLang="zh-CN" dirty="0">
-              <a:solidFill>
-                <a:schemeClr val="bg1"/>
-              </a:solidFill>
-            </a:endParaRPr>
+              <a:rPr lang="en-US" altLang="zh-CN" sz="3200" dirty="0">
+                <a:solidFill>
+                  <a:schemeClr val="bg1"/>
+                </a:solidFill>
+              </a:rPr>
+              <a:t>Field type in framework</a:t>
+            </a:r>
           </a:p>
         </p:txBody>
       </p:sp>
@@ -3778,9 +3732,9 @@
       </p:grpSpPr>
       <p:sp>
         <p:nvSpPr>
-          <p:cNvPr id="2" name="Title 1"/>
-          <p:cNvSpPr>
-            <a:spLocks noGrp="1"/>
+          <p:cNvPr id="8193" name="Rectangle 1"/>
+          <p:cNvSpPr>
+            <a:spLocks noGrp="1" noChangeArrowheads="1"/>
           </p:cNvSpPr>
           <p:nvPr>
             <p:ph type="title"/>
@@ -3788,39 +3742,32 @@
         </p:nvSpPr>
         <p:spPr/>
         <p:txBody>
-          <a:bodyPr>
-            <a:normAutofit fontScale="90000"/>
+          <a:bodyPr vert="horz" lIns="91440" tIns="45720" rIns="91440" bIns="45720" rtlCol="0" anchor="ctr">
+            <a:normAutofit/>
           </a:bodyPr>
           <a:lstStyle/>
           <a:p>
-            <a:r>
-              <a:rPr lang="en-US" altLang="zh-CN" dirty="0" smtClean="0">
-                <a:solidFill>
-                  <a:schemeClr val="bg1"/>
-                </a:solidFill>
-              </a:rPr>
-              <a:t>Acyclic Dependence Principle</a:t>
-            </a:r>
-            <a:br>
-              <a:rPr lang="en-US" altLang="zh-CN" dirty="0" smtClean="0">
-                <a:solidFill>
-                  <a:schemeClr val="bg1"/>
-                </a:solidFill>
-              </a:rPr>
-            </a:br>
-            <a:endParaRPr lang="zh-CN" altLang="en-US" dirty="0">
-              <a:solidFill>
-                <a:schemeClr val="bg1"/>
-              </a:solidFill>
-            </a:endParaRPr>
-          </a:p>
-        </p:txBody>
-      </p:sp>
-      <p:sp>
-        <p:nvSpPr>
-          <p:cNvPr id="3" name="Content Placeholder 2"/>
-          <p:cNvSpPr>
-            <a:spLocks noGrp="1"/>
+            <a:pPr>
+              <a:lnSpc>
+                <a:spcPct val="95000"/>
+              </a:lnSpc>
+            </a:pPr>
+            <a:r>
+              <a:rPr lang="en-US" altLang="zh-CN" sz="4000" dirty="0">
+                <a:solidFill>
+                  <a:schemeClr val="bg1"/>
+                </a:solidFill>
+              </a:rPr>
+              <a:t>Single Responsibility Principle</a:t>
+            </a:r>
+          </a:p>
+        </p:txBody>
+      </p:sp>
+      <p:sp>
+        <p:nvSpPr>
+          <p:cNvPr id="8194" name="Rectangle 2"/>
+          <p:cNvSpPr>
+            <a:spLocks noGrp="1" noChangeArrowheads="1"/>
           </p:cNvSpPr>
           <p:nvPr>
             <p:ph idx="1"/>
@@ -3833,15 +3780,65 @@
           </a:bodyPr>
           <a:lstStyle/>
           <a:p>
+            <a:pPr>
+              <a:lnSpc>
+                <a:spcPct val="95000"/>
+              </a:lnSpc>
+            </a:pPr>
             <a:r>
               <a:rPr lang="en-US" altLang="zh-CN" dirty="0" smtClean="0">
                 <a:solidFill>
                   <a:schemeClr val="bg1"/>
                 </a:solidFill>
               </a:rPr>
-              <a:t>the dependency structure is a directed acyclic graphic without cycles </a:t>
-            </a:r>
-            <a:endParaRPr lang="zh-CN" altLang="en-US" dirty="0" smtClean="0">
+              <a:t>Method</a:t>
+            </a:r>
+          </a:p>
+          <a:p>
+            <a:pPr>
+              <a:lnSpc>
+                <a:spcPct val="95000"/>
+              </a:lnSpc>
+            </a:pPr>
+            <a:r>
+              <a:rPr lang="en-US" altLang="zh-CN" dirty="0" smtClean="0">
+                <a:solidFill>
+                  <a:schemeClr val="bg1"/>
+                </a:solidFill>
+              </a:rPr>
+              <a:t>Class</a:t>
+            </a:r>
+          </a:p>
+          <a:p>
+            <a:pPr>
+              <a:lnSpc>
+                <a:spcPct val="95000"/>
+              </a:lnSpc>
+            </a:pPr>
+            <a:r>
+              <a:rPr lang="en-US" altLang="zh-CN" dirty="0" smtClean="0">
+                <a:solidFill>
+                  <a:schemeClr val="bg1"/>
+                </a:solidFill>
+              </a:rPr>
+              <a:t>Package</a:t>
+            </a:r>
+          </a:p>
+          <a:p>
+            <a:pPr>
+              <a:lnSpc>
+                <a:spcPct val="95000"/>
+              </a:lnSpc>
+            </a:pPr>
+            <a:r>
+              <a:rPr lang="en-US" altLang="zh-CN" dirty="0" smtClean="0">
+                <a:solidFill>
+                  <a:schemeClr val="bg1"/>
+                </a:solidFill>
+              </a:rPr>
+              <a:t>Component</a:t>
+            </a:r>
+            <a:endParaRPr lang="en-US" altLang="zh-CN" dirty="0">
               <a:solidFill>
                 <a:schemeClr val="bg1"/>
               </a:solidFill>
@@ -3912,8 +3909,20 @@
                   <a:schemeClr val="bg1"/>
                 </a:solidFill>
               </a:rPr>
-              <a:t>Stable Dependency Principle and Stable Abstraction Principle</a:t>
-            </a:r>
+              <a:t>Acyclic Dependence Principle</a:t>
+            </a:r>
+            <a:br>
+              <a:rPr lang="en-US" altLang="zh-CN" dirty="0" smtClean="0">
+                <a:solidFill>
+                  <a:schemeClr val="bg1"/>
+                </a:solidFill>
+              </a:rPr>
+            </a:br>
+            <a:endParaRPr lang="zh-CN" altLang="en-US" dirty="0">
+              <a:solidFill>
+                <a:schemeClr val="bg1"/>
+              </a:solidFill>
+            </a:endParaRPr>
           </a:p>
         </p:txBody>
       </p:sp>
@@ -3929,7 +3938,9 @@
         </p:nvSpPr>
         <p:spPr/>
         <p:txBody>
-          <a:bodyPr/>
+          <a:bodyPr vert="horz" lIns="91440" tIns="45720" rIns="91440" bIns="45720" rtlCol="0">
+            <a:normAutofit/>
+          </a:bodyPr>
           <a:lstStyle/>
           <a:p>
             <a:r>
@@ -3938,9 +3949,9 @@
                   <a:schemeClr val="bg1"/>
                 </a:solidFill>
               </a:rPr>
-              <a:t>all components with high I metrics depend on the ones with low I metrics, and what's more, the result of our A, I and D' is great!</a:t>
-            </a:r>
-            <a:endParaRPr lang="zh-CN" altLang="en-US" dirty="0">
+              <a:t>the dependency structure is a directed acyclic graphic without cycles </a:t>
+            </a:r>
+            <a:endParaRPr lang="zh-CN" altLang="en-US" dirty="0" smtClean="0">
               <a:solidFill>
                 <a:schemeClr val="bg1"/>
               </a:solidFill>
@@ -3990,9 +4001,9 @@
       </p:grpSpPr>
       <p:sp>
         <p:nvSpPr>
-          <p:cNvPr id="9217" name="Rectangle 1"/>
-          <p:cNvSpPr>
-            <a:spLocks noGrp="1" noChangeArrowheads="1"/>
+          <p:cNvPr id="2" name="Title 1"/>
+          <p:cNvSpPr>
+            <a:spLocks noGrp="1"/>
           </p:cNvSpPr>
           <p:nvPr>
             <p:ph type="title"/>
@@ -4000,32 +4011,27 @@
         </p:nvSpPr>
         <p:spPr/>
         <p:txBody>
-          <a:bodyPr vert="horz" lIns="91440" tIns="45720" rIns="91440" bIns="45720" rtlCol="0" anchor="ctr">
-            <a:normAutofit/>
+          <a:bodyPr>
+            <a:normAutofit fontScale="90000"/>
           </a:bodyPr>
           <a:lstStyle/>
           <a:p>
-            <a:pPr>
-              <a:lnSpc>
-                <a:spcPct val="95000"/>
-              </a:lnSpc>
-            </a:pPr>
-            <a:r>
-              <a:rPr lang="en-US" altLang="zh-CN" sz="4000" dirty="0">
-                <a:solidFill>
-                  <a:schemeClr val="bg1"/>
-                </a:solidFill>
-              </a:rPr>
-              <a:t>Design Patterns</a:t>
-            </a:r>
-          </a:p>
-        </p:txBody>
-      </p:sp>
-      <p:sp>
-        <p:nvSpPr>
-          <p:cNvPr id="9218" name="Rectangle 2"/>
-          <p:cNvSpPr>
-            <a:spLocks noGrp="1" noChangeArrowheads="1"/>
+            <a:r>
+              <a:rPr lang="en-US" altLang="zh-CN" dirty="0" smtClean="0">
+                <a:solidFill>
+                  <a:schemeClr val="bg1"/>
+                </a:solidFill>
+              </a:rPr>
+              <a:t>Stable Dependency Principle and Stable Abstraction Principle</a:t>
+            </a:r>
+          </a:p>
+        </p:txBody>
+      </p:sp>
+      <p:sp>
+        <p:nvSpPr>
+          <p:cNvPr id="3" name="Content Placeholder 2"/>
+          <p:cNvSpPr>
+            <a:spLocks noGrp="1"/>
           </p:cNvSpPr>
           <p:nvPr>
             <p:ph idx="1"/>
@@ -4033,69 +4039,22 @@
         </p:nvSpPr>
         <p:spPr/>
         <p:txBody>
-          <a:bodyPr vert="horz" lIns="91440" tIns="45720" rIns="91440" bIns="45720" rtlCol="0">
-            <a:normAutofit/>
-          </a:bodyPr>
-          <a:lstStyle/>
-          <a:p>
-            <a:pPr marL="342900" lvl="1" indent="-342900">
-              <a:lnSpc>
-                <a:spcPct val="95000"/>
-              </a:lnSpc>
-              <a:buClr>
-                <a:srgbClr val="000000"/>
-              </a:buClr>
-              <a:buFont typeface="Arial" pitchFamily="34" charset="0"/>
-              <a:buChar char="•"/>
-            </a:pPr>
-            <a:r>
-              <a:rPr lang="en-US" altLang="zh-CN" sz="3200" dirty="0">
-                <a:solidFill>
-                  <a:schemeClr val="bg1"/>
-                </a:solidFill>
-              </a:rPr>
-              <a:t>MVC design pattern</a:t>
-            </a:r>
-          </a:p>
-          <a:p>
-            <a:pPr marL="342900" lvl="1" indent="-342900">
-              <a:lnSpc>
-                <a:spcPct val="95000"/>
-              </a:lnSpc>
-              <a:buClr>
-                <a:srgbClr val="000000"/>
-              </a:buClr>
-              <a:buFont typeface="Arial" pitchFamily="34" charset="0"/>
-              <a:buChar char="•"/>
-            </a:pPr>
-            <a:r>
-              <a:rPr lang="en-US" altLang="zh-CN" sz="3200" dirty="0">
-                <a:solidFill>
-                  <a:schemeClr val="bg1"/>
-                </a:solidFill>
-              </a:rPr>
-              <a:t>Observers pattern</a:t>
-            </a:r>
-          </a:p>
-          <a:p>
-            <a:pPr marL="342900" lvl="1" indent="-342900">
-              <a:lnSpc>
-                <a:spcPct val="95000"/>
-              </a:lnSpc>
-              <a:buClr>
-                <a:srgbClr val="000000"/>
-              </a:buClr>
-              <a:buFont typeface="Arial" pitchFamily="34" charset="0"/>
-              <a:buChar char="•"/>
-            </a:pPr>
-            <a:r>
-              <a:rPr lang="en-US" altLang="zh-CN" sz="3200" dirty="0">
-                <a:solidFill>
-                  <a:schemeClr val="bg1"/>
-                </a:solidFill>
-              </a:rPr>
-              <a:t>Object Adapter </a:t>
-            </a:r>
+          <a:bodyPr/>
+          <a:lstStyle/>
+          <a:p>
+            <a:r>
+              <a:rPr lang="en-US" altLang="zh-CN" dirty="0" smtClean="0">
+                <a:solidFill>
+                  <a:schemeClr val="bg1"/>
+                </a:solidFill>
+              </a:rPr>
+              <a:t>all components with high I metrics depend on the ones with low I metrics, and what's more, the result of our A, I and D' is great!</a:t>
+            </a:r>
+            <a:endParaRPr lang="zh-CN" altLang="en-US" dirty="0">
+              <a:solidFill>
+                <a:schemeClr val="bg1"/>
+              </a:solidFill>
+            </a:endParaRPr>
           </a:p>
         </p:txBody>
       </p:sp>
@@ -4115,6 +4074,157 @@
 </file>
 
 <file path=ppt/slides/slide17.xml><?xml version="1.0" encoding="utf-8"?>
+<p:sld xmlns:a="http://schemas.openxmlformats.org/drawingml/2006/main" xmlns:r="http://schemas.openxmlformats.org/officeDocument/2006/relationships" xmlns:p="http://schemas.openxmlformats.org/presentationml/2006/main">
+  <p:cSld>
+    <p:bg>
+      <p:bgPr>
+        <a:solidFill>
+          <a:schemeClr val="tx1"/>
+        </a:solidFill>
+        <a:effectLst/>
+      </p:bgPr>
+    </p:bg>
+    <p:spTree>
+      <p:nvGrpSpPr>
+        <p:cNvPr id="1" name=""/>
+        <p:cNvGrpSpPr/>
+        <p:nvPr/>
+      </p:nvGrpSpPr>
+      <p:grpSpPr>
+        <a:xfrm>
+          <a:off x="0" y="0"/>
+          <a:ext cx="0" cy="0"/>
+          <a:chOff x="0" y="0"/>
+          <a:chExt cx="0" cy="0"/>
+        </a:xfrm>
+      </p:grpSpPr>
+      <p:sp>
+        <p:nvSpPr>
+          <p:cNvPr id="9217" name="Rectangle 1"/>
+          <p:cNvSpPr>
+            <a:spLocks noGrp="1" noChangeArrowheads="1"/>
+          </p:cNvSpPr>
+          <p:nvPr>
+            <p:ph type="title"/>
+          </p:nvPr>
+        </p:nvSpPr>
+        <p:spPr/>
+        <p:txBody>
+          <a:bodyPr vert="horz" lIns="91440" tIns="45720" rIns="91440" bIns="45720" rtlCol="0" anchor="ctr">
+            <a:normAutofit/>
+          </a:bodyPr>
+          <a:lstStyle/>
+          <a:p>
+            <a:pPr>
+              <a:lnSpc>
+                <a:spcPct val="95000"/>
+              </a:lnSpc>
+            </a:pPr>
+            <a:r>
+              <a:rPr lang="en-US" altLang="zh-CN" sz="4000" dirty="0">
+                <a:solidFill>
+                  <a:schemeClr val="bg1"/>
+                </a:solidFill>
+              </a:rPr>
+              <a:t>Design Patterns</a:t>
+            </a:r>
+          </a:p>
+        </p:txBody>
+      </p:sp>
+      <p:sp>
+        <p:nvSpPr>
+          <p:cNvPr id="9218" name="Rectangle 2"/>
+          <p:cNvSpPr>
+            <a:spLocks noGrp="1" noChangeArrowheads="1"/>
+          </p:cNvSpPr>
+          <p:nvPr>
+            <p:ph idx="1"/>
+          </p:nvPr>
+        </p:nvSpPr>
+        <p:spPr/>
+        <p:txBody>
+          <a:bodyPr vert="horz" lIns="91440" tIns="45720" rIns="91440" bIns="45720" rtlCol="0">
+            <a:normAutofit/>
+          </a:bodyPr>
+          <a:lstStyle/>
+          <a:p>
+            <a:pPr marL="342900" lvl="1" indent="-342900">
+              <a:lnSpc>
+                <a:spcPct val="95000"/>
+              </a:lnSpc>
+              <a:buClr>
+                <a:srgbClr val="000000"/>
+              </a:buClr>
+              <a:buFont typeface="Arial" pitchFamily="34" charset="0"/>
+              <a:buChar char="•"/>
+            </a:pPr>
+            <a:r>
+              <a:rPr lang="en-US" altLang="zh-CN" sz="3200" dirty="0">
+                <a:solidFill>
+                  <a:schemeClr val="bg1"/>
+                </a:solidFill>
+              </a:rPr>
+              <a:t>MVC design pattern</a:t>
+            </a:r>
+          </a:p>
+          <a:p>
+            <a:pPr marL="342900" lvl="1" indent="-342900">
+              <a:lnSpc>
+                <a:spcPct val="95000"/>
+              </a:lnSpc>
+              <a:buClr>
+                <a:srgbClr val="000000"/>
+              </a:buClr>
+              <a:buFont typeface="Arial" pitchFamily="34" charset="0"/>
+              <a:buChar char="•"/>
+            </a:pPr>
+            <a:r>
+              <a:rPr lang="en-US" altLang="zh-CN" sz="3200" dirty="0">
+                <a:solidFill>
+                  <a:schemeClr val="bg1"/>
+                </a:solidFill>
+              </a:rPr>
+              <a:t>Observers pattern</a:t>
+            </a:r>
+          </a:p>
+          <a:p>
+            <a:pPr marL="342900" lvl="1" indent="-342900">
+              <a:lnSpc>
+                <a:spcPct val="95000"/>
+              </a:lnSpc>
+              <a:buClr>
+                <a:srgbClr val="000000"/>
+              </a:buClr>
+              <a:buFont typeface="Arial" pitchFamily="34" charset="0"/>
+              <a:buChar char="•"/>
+            </a:pPr>
+            <a:r>
+              <a:rPr lang="en-US" altLang="zh-CN" sz="3200" dirty="0">
+                <a:solidFill>
+                  <a:schemeClr val="bg1"/>
+                </a:solidFill>
+              </a:rPr>
+              <a:t>Object Adapter </a:t>
+            </a:r>
+          </a:p>
+        </p:txBody>
+      </p:sp>
+    </p:spTree>
+  </p:cSld>
+  <p:clrMapOvr>
+    <a:masterClrMapping/>
+  </p:clrMapOvr>
+  <p:timing>
+    <p:tnLst>
+      <p:par>
+        <p:cTn id="1" dur="indefinite" restart="never" nodeType="tmRoot"/>
+      </p:par>
+    </p:tnLst>
+  </p:timing>
+</p:sld>
+</file>
+
+<file path=ppt/slides/slide18.xml><?xml version="1.0" encoding="utf-8"?>
 <p:sld xmlns:a="http://schemas.openxmlformats.org/drawingml/2006/main" xmlns:r="http://schemas.openxmlformats.org/officeDocument/2006/relationships" xmlns:p="http://schemas.openxmlformats.org/presentationml/2006/main">
   <p:cSld>
     <p:bg>
@@ -4222,7 +4332,7 @@
 </p:sld>
 </file>
 
-<file path=ppt/slides/slide18.xml><?xml version="1.0" encoding="utf-8"?>
+<file path=ppt/slides/slide19.xml><?xml version="1.0" encoding="utf-8"?>
 <p:sld xmlns:a="http://schemas.openxmlformats.org/drawingml/2006/main" xmlns:r="http://schemas.openxmlformats.org/officeDocument/2006/relationships" xmlns:p="http://schemas.openxmlformats.org/presentationml/2006/main">
   <p:cSld>
     <p:bg>
@@ -4330,7 +4440,256 @@
 </p:sld>
 </file>
 
-<file path=ppt/slides/slide19.xml><?xml version="1.0" encoding="utf-8"?>
+<file path=ppt/slides/slide2.xml><?xml version="1.0" encoding="utf-8"?>
+<p:sld xmlns:a="http://schemas.openxmlformats.org/drawingml/2006/main" xmlns:r="http://schemas.openxmlformats.org/officeDocument/2006/relationships" xmlns:p="http://schemas.openxmlformats.org/presentationml/2006/main">
+  <p:cSld>
+    <p:spTree>
+      <p:nvGrpSpPr>
+        <p:cNvPr id="1" name=""/>
+        <p:cNvGrpSpPr/>
+        <p:nvPr/>
+      </p:nvGrpSpPr>
+      <p:grpSpPr>
+        <a:xfrm>
+          <a:off x="0" y="0"/>
+          <a:ext cx="0" cy="0"/>
+          <a:chOff x="0" y="0"/>
+          <a:chExt cx="0" cy="0"/>
+        </a:xfrm>
+      </p:grpSpPr>
+      <p:sp>
+        <p:nvSpPr>
+          <p:cNvPr id="2" name="Title 1"/>
+          <p:cNvSpPr>
+            <a:spLocks noGrp="1"/>
+          </p:cNvSpPr>
+          <p:nvPr>
+            <p:ph type="title"/>
+          </p:nvPr>
+        </p:nvSpPr>
+        <p:spPr/>
+        <p:txBody>
+          <a:bodyPr/>
+          <a:lstStyle/>
+          <a:p>
+            <a:r>
+              <a:rPr lang="en-US" dirty="0" smtClean="0"/>
+              <a:t>Why we used AGILE</a:t>
+            </a:r>
+            <a:endParaRPr lang="en-US" dirty="0"/>
+          </a:p>
+        </p:txBody>
+      </p:sp>
+      <p:sp>
+        <p:nvSpPr>
+          <p:cNvPr id="4" name="Text Placeholder 3"/>
+          <p:cNvSpPr>
+            <a:spLocks noGrp="1"/>
+          </p:cNvSpPr>
+          <p:nvPr>
+            <p:ph type="body" idx="1"/>
+          </p:nvPr>
+        </p:nvSpPr>
+        <p:spPr/>
+        <p:txBody>
+          <a:bodyPr/>
+          <a:lstStyle/>
+          <a:p>
+            <a:endParaRPr lang="en-US"/>
+          </a:p>
+        </p:txBody>
+      </p:sp>
+      <p:sp>
+        <p:nvSpPr>
+          <p:cNvPr id="5" name="Content Placeholder 4"/>
+          <p:cNvSpPr>
+            <a:spLocks noGrp="1"/>
+          </p:cNvSpPr>
+          <p:nvPr>
+            <p:ph sz="half" idx="2"/>
+          </p:nvPr>
+        </p:nvSpPr>
+        <p:spPr/>
+        <p:txBody>
+          <a:bodyPr>
+            <a:normAutofit lnSpcReduction="10000"/>
+          </a:bodyPr>
+          <a:lstStyle/>
+          <a:p>
+            <a:r>
+              <a:rPr lang="en-US" dirty="0" smtClean="0"/>
+              <a:t>Agile has less limitations than traditional plan-driven methodologies</a:t>
+            </a:r>
+          </a:p>
+          <a:p>
+            <a:r>
+              <a:rPr lang="en-US" dirty="0" smtClean="0"/>
+              <a:t>We favor:</a:t>
+            </a:r>
+          </a:p>
+          <a:p>
+            <a:pPr lvl="1" eaLnBrk="0" hangingPunct="0">
+              <a:lnSpc>
+                <a:spcPct val="90000"/>
+              </a:lnSpc>
+              <a:spcBef>
+                <a:spcPts val="300"/>
+              </a:spcBef>
+              <a:buFontTx/>
+              <a:buChar char="•"/>
+            </a:pPr>
+            <a:r>
+              <a:rPr lang="en-US" dirty="0" smtClean="0"/>
+              <a:t>Individuals and interactions over processes and tools </a:t>
+            </a:r>
+          </a:p>
+          <a:p>
+            <a:pPr lvl="1" eaLnBrk="0" hangingPunct="0">
+              <a:lnSpc>
+                <a:spcPct val="90000"/>
+              </a:lnSpc>
+              <a:spcBef>
+                <a:spcPts val="300"/>
+              </a:spcBef>
+              <a:buFontTx/>
+              <a:buChar char="•"/>
+            </a:pPr>
+            <a:r>
+              <a:rPr lang="en-US" dirty="0" smtClean="0"/>
+              <a:t>Working software over comprehensive documentation </a:t>
+            </a:r>
+          </a:p>
+          <a:p>
+            <a:pPr lvl="1" eaLnBrk="0" hangingPunct="0">
+              <a:lnSpc>
+                <a:spcPct val="90000"/>
+              </a:lnSpc>
+              <a:spcBef>
+                <a:spcPts val="300"/>
+              </a:spcBef>
+              <a:buFontTx/>
+              <a:buChar char="•"/>
+            </a:pPr>
+            <a:r>
+              <a:rPr lang="en-US" dirty="0" smtClean="0"/>
+              <a:t>Customer collaboration over contract negotiation </a:t>
+            </a:r>
+          </a:p>
+          <a:p>
+            <a:pPr lvl="1" eaLnBrk="0" hangingPunct="0">
+              <a:lnSpc>
+                <a:spcPct val="90000"/>
+              </a:lnSpc>
+              <a:spcBef>
+                <a:spcPts val="300"/>
+              </a:spcBef>
+              <a:buFontTx/>
+              <a:buChar char="•"/>
+            </a:pPr>
+            <a:r>
+              <a:rPr lang="en-US" dirty="0" smtClean="0"/>
+              <a:t>Responding to change over following a plan </a:t>
+            </a:r>
+          </a:p>
+          <a:p>
+            <a:endParaRPr lang="en-US" dirty="0" smtClean="0"/>
+          </a:p>
+        </p:txBody>
+      </p:sp>
+      <p:sp>
+        <p:nvSpPr>
+          <p:cNvPr id="6" name="Text Placeholder 5"/>
+          <p:cNvSpPr>
+            <a:spLocks noGrp="1"/>
+          </p:cNvSpPr>
+          <p:nvPr>
+            <p:ph type="body" sz="quarter" idx="3"/>
+          </p:nvPr>
+        </p:nvSpPr>
+        <p:spPr/>
+        <p:txBody>
+          <a:bodyPr/>
+          <a:lstStyle/>
+          <a:p>
+            <a:endParaRPr lang="en-US"/>
+          </a:p>
+        </p:txBody>
+      </p:sp>
+      <p:sp>
+        <p:nvSpPr>
+          <p:cNvPr id="7" name="Content Placeholder 6"/>
+          <p:cNvSpPr>
+            <a:spLocks noGrp="1"/>
+          </p:cNvSpPr>
+          <p:nvPr>
+            <p:ph sz="quarter" idx="4"/>
+          </p:nvPr>
+        </p:nvSpPr>
+        <p:spPr/>
+        <p:txBody>
+          <a:bodyPr>
+            <a:normAutofit/>
+          </a:bodyPr>
+          <a:lstStyle/>
+          <a:p>
+            <a:endParaRPr lang="en-US" dirty="0" smtClean="0"/>
+          </a:p>
+          <a:p>
+            <a:endParaRPr lang="en-US" dirty="0" smtClean="0"/>
+          </a:p>
+          <a:p>
+            <a:endParaRPr lang="en-US" sz="2000" dirty="0" smtClean="0"/>
+          </a:p>
+          <a:p>
+            <a:r>
+              <a:rPr lang="en-US" sz="2000" dirty="0" smtClean="0"/>
+              <a:t>We collaborated thru our google group, google wave, redmine</a:t>
+            </a:r>
+          </a:p>
+          <a:p>
+            <a:r>
+              <a:rPr lang="en-US" sz="2000" dirty="0" smtClean="0"/>
+              <a:t>Self-documenting code</a:t>
+            </a:r>
+          </a:p>
+          <a:p>
+            <a:r>
+              <a:rPr lang="en-US" sz="2000" dirty="0" smtClean="0"/>
+              <a:t>Made SRS at start of semester,  responded to clients' requests</a:t>
+            </a:r>
+          </a:p>
+          <a:p>
+            <a:r>
+              <a:rPr lang="en-US" sz="2000" dirty="0" smtClean="0"/>
+              <a:t>Instead of using a </a:t>
+            </a:r>
+            <a:r>
+              <a:rPr lang="en-US" sz="2000" dirty="0" err="1" smtClean="0"/>
+              <a:t>ghant</a:t>
+            </a:r>
+            <a:r>
+              <a:rPr lang="en-US" sz="2000" dirty="0" smtClean="0"/>
+              <a:t> chart, we based what to do off of key importance</a:t>
+            </a:r>
+          </a:p>
+        </p:txBody>
+      </p:sp>
+    </p:spTree>
+  </p:cSld>
+  <p:clrMapOvr>
+    <a:masterClrMapping/>
+  </p:clrMapOvr>
+  <p:timing>
+    <p:tnLst>
+      <p:par>
+        <p:cTn id="1" dur="indefinite" restart="never" nodeType="tmRoot"/>
+      </p:par>
+    </p:tnLst>
+  </p:timing>
+</p:sld>
+</file>
+
+<file path=ppt/slides/slide20.xml><?xml version="1.0" encoding="utf-8"?>
 <p:sld xmlns:a="http://schemas.openxmlformats.org/drawingml/2006/main" xmlns:r="http://schemas.openxmlformats.org/officeDocument/2006/relationships" xmlns:p="http://schemas.openxmlformats.org/presentationml/2006/main">
   <p:cSld>
     <p:bg>
@@ -4474,439 +4833,6 @@
 </p:sld>
 </file>
 
-<file path=ppt/slides/slide2.xml><?xml version="1.0" encoding="utf-8"?>
-<p:sld xmlns:a="http://schemas.openxmlformats.org/drawingml/2006/main" xmlns:r="http://schemas.openxmlformats.org/officeDocument/2006/relationships" xmlns:p="http://schemas.openxmlformats.org/presentationml/2006/main">
-  <p:cSld>
-    <p:spTree>
-      <p:nvGrpSpPr>
-        <p:cNvPr id="1" name=""/>
-        <p:cNvGrpSpPr/>
-        <p:nvPr/>
-      </p:nvGrpSpPr>
-      <p:grpSpPr>
-        <a:xfrm>
-          <a:off x="0" y="0"/>
-          <a:ext cx="0" cy="0"/>
-          <a:chOff x="0" y="0"/>
-          <a:chExt cx="0" cy="0"/>
-        </a:xfrm>
-      </p:grpSpPr>
-      <p:sp>
-        <p:nvSpPr>
-          <p:cNvPr id="2" name="Title 1"/>
-          <p:cNvSpPr>
-            <a:spLocks noGrp="1"/>
-          </p:cNvSpPr>
-          <p:nvPr>
-            <p:ph type="title"/>
-          </p:nvPr>
-        </p:nvSpPr>
-        <p:spPr/>
-        <p:txBody>
-          <a:bodyPr/>
-          <a:lstStyle/>
-          <a:p>
-            <a:r>
-              <a:rPr lang="en-US" dirty="0" smtClean="0"/>
-              <a:t>Why we used AGILE</a:t>
-            </a:r>
-            <a:endParaRPr lang="en-US" dirty="0"/>
-          </a:p>
-        </p:txBody>
-      </p:sp>
-      <p:sp>
-        <p:nvSpPr>
-          <p:cNvPr id="4" name="Text Placeholder 3"/>
-          <p:cNvSpPr>
-            <a:spLocks noGrp="1"/>
-          </p:cNvSpPr>
-          <p:nvPr>
-            <p:ph type="body" idx="1"/>
-          </p:nvPr>
-        </p:nvSpPr>
-        <p:spPr/>
-        <p:txBody>
-          <a:bodyPr/>
-          <a:lstStyle/>
-          <a:p>
-            <a:endParaRPr lang="en-US"/>
-          </a:p>
-        </p:txBody>
-      </p:sp>
-      <p:sp>
-        <p:nvSpPr>
-          <p:cNvPr id="5" name="Content Placeholder 4"/>
-          <p:cNvSpPr>
-            <a:spLocks noGrp="1"/>
-          </p:cNvSpPr>
-          <p:nvPr>
-            <p:ph sz="half" idx="2"/>
-          </p:nvPr>
-        </p:nvSpPr>
-        <p:spPr/>
-        <p:txBody>
-          <a:bodyPr>
-            <a:normAutofit lnSpcReduction="10000"/>
-          </a:bodyPr>
-          <a:lstStyle/>
-          <a:p>
-            <a:r>
-              <a:rPr lang="en-US" dirty="0" smtClean="0"/>
-              <a:t>Agile has less limitations than traditional plan-driven methodologies</a:t>
-            </a:r>
-          </a:p>
-          <a:p>
-            <a:r>
-              <a:rPr lang="en-US" dirty="0" smtClean="0"/>
-              <a:t>We favor:</a:t>
-            </a:r>
-          </a:p>
-          <a:p>
-            <a:pPr lvl="1" eaLnBrk="0" hangingPunct="0">
-              <a:lnSpc>
-                <a:spcPct val="90000"/>
-              </a:lnSpc>
-              <a:spcBef>
-                <a:spcPts val="300"/>
-              </a:spcBef>
-              <a:buFontTx/>
-              <a:buChar char="•"/>
-            </a:pPr>
-            <a:r>
-              <a:rPr lang="en-US" dirty="0" smtClean="0"/>
-              <a:t>Individuals and interactions over processes and tools </a:t>
-            </a:r>
-          </a:p>
-          <a:p>
-            <a:pPr lvl="1" eaLnBrk="0" hangingPunct="0">
-              <a:lnSpc>
-                <a:spcPct val="90000"/>
-              </a:lnSpc>
-              <a:spcBef>
-                <a:spcPts val="300"/>
-              </a:spcBef>
-              <a:buFontTx/>
-              <a:buChar char="•"/>
-            </a:pPr>
-            <a:r>
-              <a:rPr lang="en-US" dirty="0" smtClean="0"/>
-              <a:t>Working software over comprehensive documentation </a:t>
-            </a:r>
-          </a:p>
-          <a:p>
-            <a:pPr lvl="1" eaLnBrk="0" hangingPunct="0">
-              <a:lnSpc>
-                <a:spcPct val="90000"/>
-              </a:lnSpc>
-              <a:spcBef>
-                <a:spcPts val="300"/>
-              </a:spcBef>
-              <a:buFontTx/>
-              <a:buChar char="•"/>
-            </a:pPr>
-            <a:r>
-              <a:rPr lang="en-US" dirty="0" smtClean="0"/>
-              <a:t>Customer collaboration over contract negotiation </a:t>
-            </a:r>
-          </a:p>
-          <a:p>
-            <a:pPr lvl="1" eaLnBrk="0" hangingPunct="0">
-              <a:lnSpc>
-                <a:spcPct val="90000"/>
-              </a:lnSpc>
-              <a:spcBef>
-                <a:spcPts val="300"/>
-              </a:spcBef>
-              <a:buFontTx/>
-              <a:buChar char="•"/>
-            </a:pPr>
-            <a:r>
-              <a:rPr lang="en-US" dirty="0" smtClean="0"/>
-              <a:t>Responding to change over following a plan </a:t>
-            </a:r>
-          </a:p>
-          <a:p>
-            <a:endParaRPr lang="en-US" dirty="0" smtClean="0"/>
-          </a:p>
-        </p:txBody>
-      </p:sp>
-      <p:sp>
-        <p:nvSpPr>
-          <p:cNvPr id="6" name="Text Placeholder 5"/>
-          <p:cNvSpPr>
-            <a:spLocks noGrp="1"/>
-          </p:cNvSpPr>
-          <p:nvPr>
-            <p:ph type="body" sz="quarter" idx="3"/>
-          </p:nvPr>
-        </p:nvSpPr>
-        <p:spPr/>
-        <p:txBody>
-          <a:bodyPr/>
-          <a:lstStyle/>
-          <a:p>
-            <a:endParaRPr lang="en-US"/>
-          </a:p>
-        </p:txBody>
-      </p:sp>
-      <p:sp>
-        <p:nvSpPr>
-          <p:cNvPr id="7" name="Content Placeholder 6"/>
-          <p:cNvSpPr>
-            <a:spLocks noGrp="1"/>
-          </p:cNvSpPr>
-          <p:nvPr>
-            <p:ph sz="quarter" idx="4"/>
-          </p:nvPr>
-        </p:nvSpPr>
-        <p:spPr/>
-        <p:txBody>
-          <a:bodyPr>
-            <a:normAutofit/>
-          </a:bodyPr>
-          <a:lstStyle/>
-          <a:p>
-            <a:endParaRPr lang="en-US" dirty="0" smtClean="0"/>
-          </a:p>
-          <a:p>
-            <a:endParaRPr lang="en-US" dirty="0" smtClean="0"/>
-          </a:p>
-          <a:p>
-            <a:endParaRPr lang="en-US" sz="2000" dirty="0" smtClean="0"/>
-          </a:p>
-          <a:p>
-            <a:r>
-              <a:rPr lang="en-US" sz="2000" dirty="0" smtClean="0"/>
-              <a:t>We collaborated thru our google group, google wave, redmine</a:t>
-            </a:r>
-          </a:p>
-          <a:p>
-            <a:r>
-              <a:rPr lang="en-US" sz="2000" dirty="0" smtClean="0"/>
-              <a:t>Self-documenting code</a:t>
-            </a:r>
-          </a:p>
-          <a:p>
-            <a:r>
-              <a:rPr lang="en-US" sz="2000" dirty="0" smtClean="0"/>
-              <a:t>Made SRS at start of semester,  responded to clients' requests</a:t>
-            </a:r>
-          </a:p>
-          <a:p>
-            <a:r>
-              <a:rPr lang="en-US" sz="2000" dirty="0" smtClean="0"/>
-              <a:t>Instead of using a </a:t>
-            </a:r>
-            <a:r>
-              <a:rPr lang="en-US" sz="2000" dirty="0" err="1" smtClean="0"/>
-              <a:t>ghant</a:t>
-            </a:r>
-            <a:r>
-              <a:rPr lang="en-US" sz="2000" dirty="0" smtClean="0"/>
-              <a:t> chart, we based what to do off of key importance</a:t>
-            </a:r>
-          </a:p>
-        </p:txBody>
-      </p:sp>
-    </p:spTree>
-  </p:cSld>
-  <p:clrMapOvr>
-    <a:masterClrMapping/>
-  </p:clrMapOvr>
-  <p:timing>
-    <p:tnLst>
-      <p:par>
-        <p:cTn id="1" dur="indefinite" restart="never" nodeType="tmRoot"/>
-      </p:par>
-    </p:tnLst>
-  </p:timing>
-</p:sld>
-</file>
-
-<file path=ppt/slides/slide20.xml><?xml version="1.0" encoding="utf-8"?>
-<p:sld xmlns:a="http://schemas.openxmlformats.org/drawingml/2006/main" xmlns:r="http://schemas.openxmlformats.org/officeDocument/2006/relationships" xmlns:p="http://schemas.openxmlformats.org/presentationml/2006/main">
-  <p:cSld>
-    <p:bg>
-      <p:bgPr>
-        <a:solidFill>
-          <a:schemeClr val="tx1"/>
-        </a:solidFill>
-        <a:effectLst/>
-      </p:bgPr>
-    </p:bg>
-    <p:spTree>
-      <p:nvGrpSpPr>
-        <p:cNvPr id="1" name=""/>
-        <p:cNvGrpSpPr/>
-        <p:nvPr/>
-      </p:nvGrpSpPr>
-      <p:grpSpPr>
-        <a:xfrm>
-          <a:off x="0" y="0"/>
-          <a:ext cx="0" cy="0"/>
-          <a:chOff x="0" y="0"/>
-          <a:chExt cx="0" cy="0"/>
-        </a:xfrm>
-      </p:grpSpPr>
-      <p:sp>
-        <p:nvSpPr>
-          <p:cNvPr id="13313" name="Rectangle 1"/>
-          <p:cNvSpPr>
-            <a:spLocks noGrp="1" noChangeArrowheads="1"/>
-          </p:cNvSpPr>
-          <p:nvPr>
-            <p:ph type="title"/>
-          </p:nvPr>
-        </p:nvSpPr>
-        <p:spPr/>
-        <p:txBody>
-          <a:bodyPr vert="horz" lIns="91440" tIns="45720" rIns="91440" bIns="45720" rtlCol="0" anchor="ctr">
-            <a:normAutofit/>
-          </a:bodyPr>
-          <a:lstStyle/>
-          <a:p>
-            <a:pPr>
-              <a:lnSpc>
-                <a:spcPct val="95000"/>
-              </a:lnSpc>
-            </a:pPr>
-            <a:r>
-              <a:rPr lang="en-US" altLang="zh-CN" sz="3600" dirty="0">
-                <a:solidFill>
-                  <a:schemeClr val="bg1"/>
-                </a:solidFill>
-              </a:rPr>
-              <a:t>Proud</a:t>
-            </a:r>
-          </a:p>
-        </p:txBody>
-      </p:sp>
-      <p:sp>
-        <p:nvSpPr>
-          <p:cNvPr id="13314" name="Rectangle 2"/>
-          <p:cNvSpPr>
-            <a:spLocks noGrp="1" noChangeArrowheads="1"/>
-          </p:cNvSpPr>
-          <p:nvPr>
-            <p:ph idx="1"/>
-          </p:nvPr>
-        </p:nvSpPr>
-        <p:spPr/>
-        <p:txBody>
-          <a:bodyPr vert="horz" lIns="91440" tIns="45720" rIns="91440" bIns="45720" rtlCol="0">
-            <a:normAutofit/>
-          </a:bodyPr>
-          <a:lstStyle/>
-          <a:p>
-            <a:pPr marL="342900" lvl="1" indent="-342900">
-              <a:lnSpc>
-                <a:spcPct val="95000"/>
-              </a:lnSpc>
-              <a:buClr>
-                <a:srgbClr val="000000"/>
-              </a:buClr>
-              <a:buFont typeface="Arial" pitchFamily="34" charset="0"/>
-              <a:buChar char="•"/>
-            </a:pPr>
-            <a:r>
-              <a:rPr lang="en-US" altLang="zh-CN" sz="3200" dirty="0">
-                <a:solidFill>
-                  <a:schemeClr val="bg1"/>
-                </a:solidFill>
-              </a:rPr>
-              <a:t>MVC Framework itself</a:t>
-            </a:r>
-          </a:p>
-          <a:p>
-            <a:pPr marL="342900" lvl="1" indent="-342900">
-              <a:lnSpc>
-                <a:spcPct val="95000"/>
-              </a:lnSpc>
-              <a:buClr>
-                <a:srgbClr val="000000"/>
-              </a:buClr>
-              <a:buFont typeface="Arial" pitchFamily="34" charset="0"/>
-              <a:buChar char="•"/>
-            </a:pPr>
-            <a:r>
-              <a:rPr lang="en-US" altLang="zh-CN" sz="3200" dirty="0">
-                <a:solidFill>
-                  <a:schemeClr val="bg1"/>
-                </a:solidFill>
-              </a:rPr>
-              <a:t>DRY</a:t>
-            </a:r>
-          </a:p>
-          <a:p>
-            <a:pPr marL="342900" lvl="1" indent="-342900">
-              <a:lnSpc>
-                <a:spcPct val="95000"/>
-              </a:lnSpc>
-              <a:buClr>
-                <a:srgbClr val="000000"/>
-              </a:buClr>
-              <a:buFont typeface="Arial" pitchFamily="34" charset="0"/>
-              <a:buChar char="•"/>
-            </a:pPr>
-            <a:r>
-              <a:rPr lang="en-US" altLang="zh-CN" sz="3200" dirty="0">
-                <a:solidFill>
-                  <a:schemeClr val="bg1"/>
-                </a:solidFill>
-              </a:rPr>
-              <a:t>OCP</a:t>
-            </a:r>
-          </a:p>
-          <a:p>
-            <a:pPr marL="342900" lvl="1" indent="-342900">
-              <a:lnSpc>
-                <a:spcPct val="95000"/>
-              </a:lnSpc>
-              <a:buClr>
-                <a:srgbClr val="000000"/>
-              </a:buClr>
-              <a:buFont typeface="Arial" pitchFamily="34" charset="0"/>
-              <a:buChar char="•"/>
-            </a:pPr>
-            <a:r>
-              <a:rPr lang="en-US" altLang="zh-CN" sz="3200" dirty="0">
-                <a:solidFill>
-                  <a:schemeClr val="bg1"/>
-                </a:solidFill>
-              </a:rPr>
-              <a:t>Test code coverage and other </a:t>
-            </a:r>
-            <a:r>
-              <a:rPr lang="en-US" altLang="zh-CN" sz="3200" dirty="0" smtClean="0">
-                <a:solidFill>
-                  <a:schemeClr val="bg1"/>
-                </a:solidFill>
-              </a:rPr>
-              <a:t>matrices</a:t>
-            </a:r>
-            <a:endParaRPr lang="en-US" altLang="zh-CN" sz="3200" dirty="0">
-              <a:solidFill>
-                <a:schemeClr val="bg1"/>
-              </a:solidFill>
-            </a:endParaRPr>
-          </a:p>
-        </p:txBody>
-      </p:sp>
-    </p:spTree>
-  </p:cSld>
-  <p:clrMapOvr>
-    <a:masterClrMapping/>
-  </p:clrMapOvr>
-  <p:timing>
-    <p:tnLst>
-      <p:par>
-        <p:cTn id="1" dur="indefinite" restart="never" nodeType="tmRoot"/>
-      </p:par>
-    </p:tnLst>
-  </p:timing>
-</p:sld>
-</file>
-
 <file path=ppt/slides/slide21.xml><?xml version="1.0" encoding="utf-8"?>
 <p:sld xmlns:a="http://schemas.openxmlformats.org/drawingml/2006/main" xmlns:r="http://schemas.openxmlformats.org/officeDocument/2006/relationships" xmlns:p="http://schemas.openxmlformats.org/presentationml/2006/main">
   <p:cSld>
@@ -4934,6 +4860,190 @@
       </p:grpSpPr>
       <p:sp>
         <p:nvSpPr>
+          <p:cNvPr id="13313" name="Rectangle 1"/>
+          <p:cNvSpPr>
+            <a:spLocks noGrp="1" noChangeArrowheads="1"/>
+          </p:cNvSpPr>
+          <p:nvPr>
+            <p:ph type="title"/>
+          </p:nvPr>
+        </p:nvSpPr>
+        <p:spPr/>
+        <p:txBody>
+          <a:bodyPr vert="horz" lIns="91440" tIns="45720" rIns="91440" bIns="45720" rtlCol="0" anchor="ctr">
+            <a:normAutofit/>
+          </a:bodyPr>
+          <a:lstStyle/>
+          <a:p>
+            <a:pPr>
+              <a:lnSpc>
+                <a:spcPct val="95000"/>
+              </a:lnSpc>
+            </a:pPr>
+            <a:r>
+              <a:rPr lang="en-US" altLang="zh-CN" sz="3600" dirty="0">
+                <a:solidFill>
+                  <a:schemeClr val="bg1"/>
+                </a:solidFill>
+              </a:rPr>
+              <a:t>Proud</a:t>
+            </a:r>
+          </a:p>
+        </p:txBody>
+      </p:sp>
+      <p:sp>
+        <p:nvSpPr>
+          <p:cNvPr id="13314" name="Rectangle 2"/>
+          <p:cNvSpPr>
+            <a:spLocks noGrp="1" noChangeArrowheads="1"/>
+          </p:cNvSpPr>
+          <p:nvPr>
+            <p:ph idx="1"/>
+          </p:nvPr>
+        </p:nvSpPr>
+        <p:spPr/>
+        <p:txBody>
+          <a:bodyPr vert="horz" lIns="91440" tIns="45720" rIns="91440" bIns="45720" rtlCol="0">
+            <a:normAutofit/>
+          </a:bodyPr>
+          <a:lstStyle/>
+          <a:p>
+            <a:pPr marL="342900" lvl="1" indent="-342900">
+              <a:lnSpc>
+                <a:spcPct val="95000"/>
+              </a:lnSpc>
+              <a:buClr>
+                <a:srgbClr val="000000"/>
+              </a:buClr>
+              <a:buFont typeface="Arial" pitchFamily="34" charset="0"/>
+              <a:buChar char="•"/>
+            </a:pPr>
+            <a:r>
+              <a:rPr lang="en-US" altLang="zh-CN" sz="3200" dirty="0">
+                <a:solidFill>
+                  <a:schemeClr val="bg1"/>
+                </a:solidFill>
+              </a:rPr>
+              <a:t>MVC Framework itself</a:t>
+            </a:r>
+          </a:p>
+          <a:p>
+            <a:pPr marL="342900" lvl="1" indent="-342900">
+              <a:lnSpc>
+                <a:spcPct val="95000"/>
+              </a:lnSpc>
+              <a:buClr>
+                <a:srgbClr val="000000"/>
+              </a:buClr>
+              <a:buFont typeface="Arial" pitchFamily="34" charset="0"/>
+              <a:buChar char="•"/>
+            </a:pPr>
+            <a:r>
+              <a:rPr lang="en-US" altLang="zh-CN" sz="3200" dirty="0">
+                <a:solidFill>
+                  <a:schemeClr val="bg1"/>
+                </a:solidFill>
+              </a:rPr>
+              <a:t>DRY</a:t>
+            </a:r>
+          </a:p>
+          <a:p>
+            <a:pPr marL="342900" lvl="1" indent="-342900">
+              <a:lnSpc>
+                <a:spcPct val="95000"/>
+              </a:lnSpc>
+              <a:buClr>
+                <a:srgbClr val="000000"/>
+              </a:buClr>
+              <a:buFont typeface="Arial" pitchFamily="34" charset="0"/>
+              <a:buChar char="•"/>
+            </a:pPr>
+            <a:r>
+              <a:rPr lang="en-US" altLang="zh-CN" sz="3200" dirty="0">
+                <a:solidFill>
+                  <a:schemeClr val="bg1"/>
+                </a:solidFill>
+              </a:rPr>
+              <a:t>OCP</a:t>
+            </a:r>
+          </a:p>
+          <a:p>
+            <a:pPr marL="342900" lvl="1" indent="-342900">
+              <a:lnSpc>
+                <a:spcPct val="95000"/>
+              </a:lnSpc>
+              <a:buClr>
+                <a:srgbClr val="000000"/>
+              </a:buClr>
+              <a:buFont typeface="Arial" pitchFamily="34" charset="0"/>
+              <a:buChar char="•"/>
+            </a:pPr>
+            <a:r>
+              <a:rPr lang="en-US" altLang="zh-CN" sz="3200" dirty="0">
+                <a:solidFill>
+                  <a:schemeClr val="bg1"/>
+                </a:solidFill>
+              </a:rPr>
+              <a:t>Test code coverage and other </a:t>
+            </a:r>
+            <a:r>
+              <a:rPr lang="en-US" altLang="zh-CN" sz="3200" dirty="0" smtClean="0">
+                <a:solidFill>
+                  <a:schemeClr val="bg1"/>
+                </a:solidFill>
+              </a:rPr>
+              <a:t>matrices</a:t>
+            </a:r>
+            <a:endParaRPr lang="en-US" altLang="zh-CN" sz="3200" dirty="0">
+              <a:solidFill>
+                <a:schemeClr val="bg1"/>
+              </a:solidFill>
+            </a:endParaRPr>
+          </a:p>
+        </p:txBody>
+      </p:sp>
+    </p:spTree>
+  </p:cSld>
+  <p:clrMapOvr>
+    <a:masterClrMapping/>
+  </p:clrMapOvr>
+  <p:timing>
+    <p:tnLst>
+      <p:par>
+        <p:cTn id="1" dur="indefinite" restart="never" nodeType="tmRoot"/>
+      </p:par>
+    </p:tnLst>
+  </p:timing>
+</p:sld>
+</file>
+
+<file path=ppt/slides/slide22.xml><?xml version="1.0" encoding="utf-8"?>
+<p:sld xmlns:a="http://schemas.openxmlformats.org/drawingml/2006/main" xmlns:r="http://schemas.openxmlformats.org/officeDocument/2006/relationships" xmlns:p="http://schemas.openxmlformats.org/presentationml/2006/main">
+  <p:cSld>
+    <p:bg>
+      <p:bgPr>
+        <a:solidFill>
+          <a:schemeClr val="tx1"/>
+        </a:solidFill>
+        <a:effectLst/>
+      </p:bgPr>
+    </p:bg>
+    <p:spTree>
+      <p:nvGrpSpPr>
+        <p:cNvPr id="1" name=""/>
+        <p:cNvGrpSpPr/>
+        <p:nvPr/>
+      </p:nvGrpSpPr>
+      <p:grpSpPr>
+        <a:xfrm>
+          <a:off x="0" y="0"/>
+          <a:ext cx="0" cy="0"/>
+          <a:chOff x="0" y="0"/>
+          <a:chExt cx="0" cy="0"/>
+        </a:xfrm>
+      </p:grpSpPr>
+      <p:sp>
+        <p:nvSpPr>
           <p:cNvPr id="14337" name="Rectangle 1"/>
           <p:cNvSpPr>
             <a:spLocks noGrp="1" noChangeArrowheads="1"/>
@@ -5072,7 +5182,7 @@
 </p:sld>
 </file>
 
-<file path=ppt/slides/slide22.xml><?xml version="1.0" encoding="utf-8"?>
+<file path=ppt/slides/slide23.xml><?xml version="1.0" encoding="utf-8"?>
 <p:sld xmlns:a="http://schemas.openxmlformats.org/drawingml/2006/main" xmlns:r="http://schemas.openxmlformats.org/officeDocument/2006/relationships" xmlns:p="http://schemas.openxmlformats.org/presentationml/2006/main">
   <p:cSld>
     <p:spTree>
@@ -5140,6 +5250,115 @@
 </file>
 
 <file path=ppt/slides/slide3.xml><?xml version="1.0" encoding="utf-8"?>
+<p:sld xmlns:a="http://schemas.openxmlformats.org/drawingml/2006/main" xmlns:r="http://schemas.openxmlformats.org/officeDocument/2006/relationships" xmlns:p="http://schemas.openxmlformats.org/presentationml/2006/main">
+  <p:cSld>
+    <p:spTree>
+      <p:nvGrpSpPr>
+        <p:cNvPr id="1" name=""/>
+        <p:cNvGrpSpPr/>
+        <p:nvPr/>
+      </p:nvGrpSpPr>
+      <p:grpSpPr>
+        <a:xfrm>
+          <a:off x="0" y="0"/>
+          <a:ext cx="0" cy="0"/>
+          <a:chOff x="0" y="0"/>
+          <a:chExt cx="0" cy="0"/>
+        </a:xfrm>
+      </p:grpSpPr>
+      <p:sp>
+        <p:nvSpPr>
+          <p:cNvPr id="2" name="Title 1"/>
+          <p:cNvSpPr>
+            <a:spLocks noGrp="1"/>
+          </p:cNvSpPr>
+          <p:nvPr>
+            <p:ph type="title"/>
+          </p:nvPr>
+        </p:nvSpPr>
+        <p:spPr/>
+        <p:txBody>
+          <a:bodyPr/>
+          <a:lstStyle/>
+          <a:p>
+            <a:r>
+              <a:rPr lang="en-US" dirty="0" smtClean="0"/>
+              <a:t>Technology and Tools we used:</a:t>
+            </a:r>
+            <a:endParaRPr lang="en-US" dirty="0"/>
+          </a:p>
+        </p:txBody>
+      </p:sp>
+      <p:sp>
+        <p:nvSpPr>
+          <p:cNvPr id="4" name="Content Placeholder 3"/>
+          <p:cNvSpPr>
+            <a:spLocks noGrp="1"/>
+          </p:cNvSpPr>
+          <p:nvPr>
+            <p:ph idx="1"/>
+          </p:nvPr>
+        </p:nvSpPr>
+        <p:spPr/>
+        <p:txBody>
+          <a:bodyPr>
+            <a:normAutofit fontScale="92500" lnSpcReduction="10000"/>
+          </a:bodyPr>
+          <a:lstStyle/>
+          <a:p>
+            <a:r>
+              <a:rPr lang="en-US" dirty="0" smtClean="0"/>
+              <a:t>Programming language: PHP 5</a:t>
+            </a:r>
+          </a:p>
+          <a:p>
+            <a:r>
+              <a:rPr lang="en-US" dirty="0" smtClean="0"/>
+              <a:t>Libraries: PhpUnit(for tests), Xdebug(for code coverage), Pdepend(for program metrics)</a:t>
+            </a:r>
+          </a:p>
+          <a:p>
+            <a:r>
+              <a:rPr lang="en-US" dirty="0" smtClean="0"/>
+              <a:t>Database: MySQL</a:t>
+            </a:r>
+          </a:p>
+          <a:p>
+            <a:r>
+              <a:rPr lang="en-US" dirty="0" smtClean="0"/>
+              <a:t>Editor: TextMate, vim and notepad</a:t>
+            </a:r>
+          </a:p>
+          <a:p>
+            <a:r>
+              <a:rPr lang="en-US" dirty="0" smtClean="0"/>
+              <a:t>Web technology: HTML 4</a:t>
+            </a:r>
+          </a:p>
+          <a:p>
+            <a:r>
+              <a:rPr lang="en-US" dirty="0" smtClean="0"/>
+              <a:t>Server: Apache httpd</a:t>
+            </a:r>
+          </a:p>
+          <a:p>
+            <a:r>
+              <a:rPr lang="en-US" dirty="0" smtClean="0"/>
+              <a:t>Agile development practice: Redmine, Google Group mailing list, Google docs and Google Wave</a:t>
+            </a:r>
+            <a:endParaRPr lang="en-US" dirty="0"/>
+          </a:p>
+        </p:txBody>
+      </p:sp>
+    </p:spTree>
+  </p:cSld>
+  <p:clrMapOvr>
+    <a:masterClrMapping/>
+  </p:clrMapOvr>
+</p:sld>
+</file>
+
+<file path=ppt/slides/slide4.xml><?xml version="1.0" encoding="utf-8"?>
 <p:sld xmlns:a="http://schemas.openxmlformats.org/drawingml/2006/main" xmlns:r="http://schemas.openxmlformats.org/officeDocument/2006/relationships" xmlns:p="http://schemas.openxmlformats.org/presentationml/2006/main">
   <p:cSld>
     <p:spTree>
@@ -5348,7 +5567,7 @@
 </p:sld>
 </file>
 
-<file path=ppt/slides/slide4.xml><?xml version="1.0" encoding="utf-8"?>
+<file path=ppt/slides/slide5.xml><?xml version="1.0" encoding="utf-8"?>
 <p:sld xmlns:a="http://schemas.openxmlformats.org/drawingml/2006/main" xmlns:r="http://schemas.openxmlformats.org/officeDocument/2006/relationships" xmlns:p="http://schemas.openxmlformats.org/presentationml/2006/main">
   <p:cSld>
     <p:spTree>
@@ -5407,6 +5626,32 @@
           </a:p>
         </p:txBody>
       </p:sp>
+      <p:pic>
+        <p:nvPicPr>
+          <p:cNvPr id="1026" name="Picture 2" descr="C:\Users\Aaron\Desktop\databaseSchema.png"/>
+          <p:cNvPicPr>
+            <a:picLocks noChangeAspect="1" noChangeArrowheads="1"/>
+          </p:cNvPicPr>
+          <p:nvPr/>
+        </p:nvPicPr>
+        <p:blipFill>
+          <a:blip r:embed="rId2" cstate="print"/>
+          <a:srcRect/>
+          <a:stretch>
+            <a:fillRect/>
+          </a:stretch>
+        </p:blipFill>
+        <p:spPr bwMode="auto">
+          <a:xfrm>
+            <a:off x="1371600" y="1371600"/>
+            <a:ext cx="5867400" cy="5179142"/>
+          </a:xfrm>
+          <a:prstGeom prst="rect">
+            <a:avLst/>
+          </a:prstGeom>
+          <a:noFill/>
+        </p:spPr>
+      </p:pic>
     </p:spTree>
   </p:cSld>
   <p:clrMapOvr>
@@ -5419,184 +5664,6 @@
       </p:par>
     </p:tnLst>
   </p:timing>
-</p:sld>
-</file>
-
-<file path=ppt/slides/slide5.xml><?xml version="1.0" encoding="utf-8"?>
-<p:sld xmlns:a="http://schemas.openxmlformats.org/drawingml/2006/main" xmlns:r="http://schemas.openxmlformats.org/officeDocument/2006/relationships" xmlns:p="http://schemas.openxmlformats.org/presentationml/2006/main">
-  <p:cSld>
-    <p:bg>
-      <p:bgPr>
-        <a:solidFill>
-          <a:schemeClr val="tx1"/>
-        </a:solidFill>
-        <a:effectLst/>
-      </p:bgPr>
-    </p:bg>
-    <p:spTree>
-      <p:nvGrpSpPr>
-        <p:cNvPr id="1" name=""/>
-        <p:cNvGrpSpPr/>
-        <p:nvPr/>
-      </p:nvGrpSpPr>
-      <p:grpSpPr>
-        <a:xfrm>
-          <a:off x="0" y="0"/>
-          <a:ext cx="0" cy="0"/>
-          <a:chOff x="0" y="0"/>
-          <a:chExt cx="0" cy="0"/>
-        </a:xfrm>
-      </p:grpSpPr>
-      <p:sp>
-        <p:nvSpPr>
-          <p:cNvPr id="3073" name="Rectangle 1"/>
-          <p:cNvSpPr>
-            <a:spLocks noGrp="1" noChangeArrowheads="1"/>
-          </p:cNvSpPr>
-          <p:nvPr>
-            <p:ph type="title"/>
-          </p:nvPr>
-        </p:nvSpPr>
-        <p:spPr/>
-        <p:txBody>
-          <a:bodyPr vert="horz" lIns="91440" tIns="45720" rIns="91440" bIns="45720" rtlCol="0" anchor="ctr">
-            <a:normAutofit fontScale="90000"/>
-          </a:bodyPr>
-          <a:lstStyle/>
-          <a:p>
-            <a:pPr>
-              <a:lnSpc>
-                <a:spcPct val="95000"/>
-              </a:lnSpc>
-            </a:pPr>
-            <a:r>
-              <a:rPr lang="en-US" altLang="zh-CN" sz="4000" dirty="0" smtClean="0">
-                <a:solidFill>
-                  <a:schemeClr val="bg1"/>
-                </a:solidFill>
-              </a:rPr>
-              <a:t>Introduction to Sensible PHP and Sensible Living</a:t>
-            </a:r>
-            <a:endParaRPr lang="en-US" altLang="zh-CN" sz="4000" dirty="0">
-              <a:solidFill>
-                <a:schemeClr val="bg1"/>
-              </a:solidFill>
-            </a:endParaRPr>
-          </a:p>
-        </p:txBody>
-      </p:sp>
-      <p:sp>
-        <p:nvSpPr>
-          <p:cNvPr id="3074" name="Rectangle 2"/>
-          <p:cNvSpPr>
-            <a:spLocks noGrp="1" noChangeArrowheads="1"/>
-          </p:cNvSpPr>
-          <p:nvPr>
-            <p:ph idx="1"/>
-          </p:nvPr>
-        </p:nvSpPr>
-        <p:spPr/>
-        <p:txBody>
-          <a:bodyPr vert="horz" lIns="91440" tIns="45720" rIns="91440" bIns="45720" rtlCol="0">
-            <a:normAutofit/>
-          </a:bodyPr>
-          <a:lstStyle/>
-          <a:p>
-            <a:pPr marL="342900" lvl="1" indent="-342900">
-              <a:lnSpc>
-                <a:spcPct val="75000"/>
-              </a:lnSpc>
-              <a:buClr>
-                <a:schemeClr val="bg1"/>
-              </a:buClr>
-              <a:buFont typeface="Arial" pitchFamily="34" charset="0"/>
-              <a:buChar char="•"/>
-            </a:pPr>
-            <a:r>
-              <a:rPr lang="en-US" altLang="zh-CN" sz="2700" dirty="0" smtClean="0">
-                <a:solidFill>
-                  <a:schemeClr val="bg1"/>
-                </a:solidFill>
-              </a:rPr>
-              <a:t>Sensible PHP is a </a:t>
-            </a:r>
-            <a:r>
-              <a:rPr lang="en-US" altLang="zh-CN" sz="2700" dirty="0" err="1" smtClean="0">
-                <a:solidFill>
-                  <a:schemeClr val="bg1"/>
-                </a:solidFill>
-              </a:rPr>
-              <a:t>php</a:t>
-            </a:r>
-            <a:r>
-              <a:rPr lang="en-US" altLang="zh-CN" sz="2700" dirty="0" smtClean="0">
-                <a:solidFill>
-                  <a:schemeClr val="bg1"/>
-                </a:solidFill>
-              </a:rPr>
-              <a:t> </a:t>
-            </a:r>
-            <a:r>
-              <a:rPr lang="en-US" altLang="zh-CN" sz="2700" dirty="0" err="1" smtClean="0">
-                <a:solidFill>
-                  <a:schemeClr val="bg1"/>
-                </a:solidFill>
-              </a:rPr>
-              <a:t>mvc</a:t>
-            </a:r>
-            <a:r>
-              <a:rPr lang="en-US" altLang="zh-CN" sz="2700" dirty="0" smtClean="0">
-                <a:solidFill>
-                  <a:schemeClr val="bg1"/>
-                </a:solidFill>
-              </a:rPr>
-              <a:t> framework.</a:t>
-            </a:r>
-          </a:p>
-          <a:p>
-            <a:pPr marL="342900" lvl="1" indent="-342900">
-              <a:lnSpc>
-                <a:spcPct val="75000"/>
-              </a:lnSpc>
-              <a:buClr>
-                <a:schemeClr val="bg1"/>
-              </a:buClr>
-              <a:buFont typeface="Arial" pitchFamily="34" charset="0"/>
-              <a:buChar char="•"/>
-            </a:pPr>
-            <a:endParaRPr lang="en-US" altLang="zh-CN" sz="2700" dirty="0" smtClean="0">
-              <a:solidFill>
-                <a:schemeClr val="bg1"/>
-              </a:solidFill>
-            </a:endParaRPr>
-          </a:p>
-          <a:p>
-            <a:pPr marL="342900" lvl="1" indent="-342900">
-              <a:lnSpc>
-                <a:spcPct val="75000"/>
-              </a:lnSpc>
-              <a:buClr>
-                <a:schemeClr val="bg1"/>
-              </a:buClr>
-              <a:buFont typeface="Arial" pitchFamily="34" charset="0"/>
-              <a:buChar char="•"/>
-            </a:pPr>
-            <a:r>
-              <a:rPr lang="en-US" altLang="zh-CN" sz="2700" dirty="0" smtClean="0">
-                <a:solidFill>
-                  <a:schemeClr val="bg1"/>
-                </a:solidFill>
-              </a:rPr>
-              <a:t>Sensible Living is the first application of Sensible PHP.</a:t>
-            </a:r>
-          </a:p>
-        </p:txBody>
-      </p:sp>
-    </p:spTree>
-  </p:cSld>
-  <p:clrMapOvr>
-    <a:masterClrMapping/>
-  </p:clrMapOvr>
 </p:sld>
 </file>
 
@@ -5627,7 +5694,7 @@
       </p:grpSpPr>
       <p:sp>
         <p:nvSpPr>
-          <p:cNvPr id="4097" name="Rectangle 1"/>
+          <p:cNvPr id="3073" name="Rectangle 1"/>
           <p:cNvSpPr>
             <a:spLocks noGrp="1" noChangeArrowheads="1"/>
           </p:cNvSpPr>
@@ -5638,7 +5705,7 @@
         <p:spPr/>
         <p:txBody>
           <a:bodyPr vert="horz" lIns="91440" tIns="45720" rIns="91440" bIns="45720" rtlCol="0" anchor="ctr">
-            <a:normAutofit/>
+            <a:normAutofit fontScale="90000"/>
           </a:bodyPr>
           <a:lstStyle/>
           <a:p>
@@ -5653,9 +5720,9 @@
                   <a:schemeClr val="bg1"/>
                 </a:solidFill>
               </a:rPr>
-              <a:t>Features (done)</a:t>
-            </a:r>
-            <a:endParaRPr lang="en-US" altLang="zh-CN" sz="4000" dirty="0" smtClean="0">
+              <a:t>Introduction to Sensible PHP and Sensible Living</a:t>
+            </a:r>
+            <a:endParaRPr lang="en-US" altLang="zh-CN" sz="4000" dirty="0">
               <a:solidFill>
                 <a:schemeClr val="bg1"/>
               </a:solidFill>
@@ -5665,7 +5732,7 @@
       </p:sp>
       <p:sp>
         <p:nvSpPr>
-          <p:cNvPr id="4098" name="Rectangle 2"/>
+          <p:cNvPr id="3074" name="Rectangle 2"/>
           <p:cNvSpPr>
             <a:spLocks noGrp="1" noChangeArrowheads="1"/>
           </p:cNvSpPr>
@@ -5676,13 +5743,13 @@
         <p:spPr/>
         <p:txBody>
           <a:bodyPr vert="horz" lIns="91440" tIns="45720" rIns="91440" bIns="45720" rtlCol="0">
-            <a:normAutofit fontScale="85000" lnSpcReduction="10000"/>
+            <a:normAutofit/>
           </a:bodyPr>
           <a:lstStyle/>
           <a:p>
             <a:pPr marL="342900" lvl="1" indent="-342900">
               <a:lnSpc>
-                <a:spcPct val="95000"/>
+                <a:spcPct val="75000"/>
               </a:lnSpc>
               <a:buClr>
                 <a:schemeClr val="bg1"/>
@@ -5696,13 +5763,45 @@
                   <a:schemeClr val="bg1"/>
                 </a:solidFill>
               </a:rPr>
-              <a:t>By using our management script, it's pretty easy to initialize the project, create applications and sync with database.</a:t>
+              <a:t>Sensible PHP is a </a:t>
+            </a:r>
+            <a:r>
+              <a:rPr lang="en-US" altLang="zh-CN" sz="2700" dirty="0" err="1" smtClean="0">
+                <a:solidFill>
+                  <a:schemeClr val="bg1"/>
+                </a:solidFill>
+              </a:rPr>
+              <a:t>php</a:t>
+            </a:r>
+            <a:r>
+              <a:rPr lang="en-US" altLang="zh-CN" sz="2700" dirty="0" smtClean="0">
+                <a:solidFill>
+                  <a:schemeClr val="bg1"/>
+                </a:solidFill>
+              </a:rPr>
+              <a:t> </a:t>
+            </a:r>
+            <a:r>
+              <a:rPr lang="en-US" altLang="zh-CN" sz="2700" dirty="0" err="1" smtClean="0">
+                <a:solidFill>
+                  <a:schemeClr val="bg1"/>
+                </a:solidFill>
+              </a:rPr>
+              <a:t>mvc</a:t>
+            </a:r>
+            <a:r>
+              <a:rPr lang="en-US" altLang="zh-CN" sz="2700" dirty="0" smtClean="0">
+                <a:solidFill>
+                  <a:schemeClr val="bg1"/>
+                </a:solidFill>
+              </a:rPr>
+              <a:t> framework.</a:t>
             </a:r>
           </a:p>
           <a:p>
             <a:pPr marL="342900" lvl="1" indent="-342900">
               <a:lnSpc>
-                <a:spcPct val="95000"/>
+                <a:spcPct val="75000"/>
               </a:lnSpc>
               <a:buClr>
                 <a:schemeClr val="bg1"/>
@@ -5710,19 +5809,16 @@
               <a:buFont typeface="Arial" pitchFamily="34" charset="0"/>
               <a:buChar char="•"/>
             </a:pPr>
-            <a:r>
-              <a:rPr lang="en-US" altLang="zh-CN" sz="2700" dirty="0" smtClean="0">
-                <a:solidFill>
-                  <a:schemeClr val="bg1"/>
-                </a:solidFill>
-              </a:rPr>
-              <a:t>We focus on adhering to the DRY principle, so it's easy to modify the models, and write controllers, additional database logics and views.</a:t>
-            </a:r>
+            <a:endParaRPr lang="en-US" altLang="zh-CN" sz="2700" dirty="0" smtClean="0">
+              <a:solidFill>
+                <a:schemeClr val="bg1"/>
+              </a:solidFill>
+            </a:endParaRPr>
           </a:p>
           <a:p>
             <a:pPr marL="342900" lvl="1" indent="-342900">
               <a:lnSpc>
-                <a:spcPct val="95000"/>
+                <a:spcPct val="75000"/>
               </a:lnSpc>
               <a:buClr>
                 <a:schemeClr val="bg1"/>
@@ -5736,121 +5832,8 @@
                   <a:schemeClr val="bg1"/>
                 </a:solidFill>
               </a:rPr>
-              <a:t>Flexible in coding, reuse and deployment.</a:t>
-            </a:r>
-          </a:p>
-          <a:p>
-            <a:pPr marL="342900" lvl="1" indent="-342900">
-              <a:lnSpc>
-                <a:spcPct val="95000"/>
-              </a:lnSpc>
-              <a:buClr>
-                <a:schemeClr val="bg1"/>
-              </a:buClr>
-              <a:buFont typeface="Arial" pitchFamily="34" charset="0"/>
-              <a:buChar char="•"/>
-            </a:pPr>
-            <a:r>
-              <a:rPr lang="en-US" altLang="zh-CN" sz="2700" dirty="0" smtClean="0">
-                <a:solidFill>
-                  <a:schemeClr val="bg1"/>
-                </a:solidFill>
-              </a:rPr>
-              <a:t>Easy to handle static media files, like </a:t>
-            </a:r>
-            <a:r>
-              <a:rPr lang="en-US" altLang="zh-CN" sz="2700" dirty="0" err="1" smtClean="0">
-                <a:solidFill>
-                  <a:schemeClr val="bg1"/>
-                </a:solidFill>
-              </a:rPr>
-              <a:t>Javascript</a:t>
-            </a:r>
-            <a:r>
-              <a:rPr lang="en-US" altLang="zh-CN" sz="2700" dirty="0" smtClean="0">
-                <a:solidFill>
-                  <a:schemeClr val="bg1"/>
-                </a:solidFill>
-              </a:rPr>
-              <a:t>, cascade style sheet, images, audios and videos.</a:t>
-            </a:r>
-          </a:p>
-          <a:p>
-            <a:pPr marL="342900" lvl="1" indent="-342900">
-              <a:lnSpc>
-                <a:spcPct val="95000"/>
-              </a:lnSpc>
-              <a:buClr>
-                <a:schemeClr val="bg1"/>
-              </a:buClr>
-              <a:buFont typeface="Arial" pitchFamily="34" charset="0"/>
-              <a:buChar char="•"/>
-            </a:pPr>
-            <a:r>
-              <a:rPr lang="en-US" altLang="zh-CN" sz="2700" dirty="0" smtClean="0">
-                <a:solidFill>
-                  <a:schemeClr val="bg1"/>
-                </a:solidFill>
-              </a:rPr>
-              <a:t>Easy for modification and extension as we adhere OCP principle.</a:t>
-            </a:r>
-          </a:p>
-          <a:p>
-            <a:pPr marL="342900" lvl="1" indent="-342900">
-              <a:lnSpc>
-                <a:spcPct val="95000"/>
-              </a:lnSpc>
-              <a:buClr>
-                <a:schemeClr val="bg1"/>
-              </a:buClr>
-              <a:buFont typeface="Arial" pitchFamily="34" charset="0"/>
-              <a:buChar char="•"/>
-            </a:pPr>
-            <a:r>
-              <a:rPr lang="en-US" altLang="zh-CN" sz="2700" dirty="0" smtClean="0">
-                <a:solidFill>
-                  <a:schemeClr val="bg1"/>
-                </a:solidFill>
-              </a:rPr>
-              <a:t>No worry on URL address, simply use the application name and the action name, user can get the result.</a:t>
-            </a:r>
-          </a:p>
-          <a:p>
-            <a:pPr marL="342900" lvl="1" indent="-342900">
-              <a:lnSpc>
-                <a:spcPct val="95000"/>
-              </a:lnSpc>
-              <a:buClr>
-                <a:schemeClr val="bg1"/>
-              </a:buClr>
-              <a:buFont typeface="Arial" pitchFamily="34" charset="0"/>
-              <a:buChar char="•"/>
-            </a:pPr>
-            <a:r>
-              <a:rPr lang="en-US" altLang="zh-CN" sz="2700" dirty="0" smtClean="0">
-                <a:solidFill>
-                  <a:schemeClr val="bg1"/>
-                </a:solidFill>
-              </a:rPr>
-              <a:t>Trash the old applications when running the clean or project command.</a:t>
-            </a:r>
-          </a:p>
-          <a:p>
-            <a:pPr marL="342900" lvl="1" indent="-342900">
-              <a:lnSpc>
-                <a:spcPct val="95000"/>
-              </a:lnSpc>
-              <a:buClr>
-                <a:schemeClr val="bg1"/>
-              </a:buClr>
-              <a:buFont typeface="Arial" pitchFamily="34" charset="0"/>
-              <a:buChar char="•"/>
-            </a:pPr>
-            <a:endParaRPr lang="en-US" altLang="zh-CN" sz="2700" dirty="0">
-              <a:solidFill>
-                <a:schemeClr val="bg1"/>
-              </a:solidFill>
-            </a:endParaRPr>
+              <a:t>Sensible Living is the first application of Sensible PHP.</a:t>
+            </a:r>
           </a:p>
         </p:txBody>
       </p:sp>
@@ -5915,13 +5898,8 @@
                   <a:schemeClr val="bg1"/>
                 </a:solidFill>
               </a:rPr>
-              <a:t>Features (in mind)</a:t>
-            </a:r>
-            <a:endParaRPr lang="en-US" altLang="zh-CN" sz="4000" dirty="0" smtClean="0">
-              <a:solidFill>
-                <a:schemeClr val="bg1"/>
-              </a:solidFill>
-            </a:endParaRPr>
+              <a:t>Features (done)</a:t>
+            </a:r>
           </a:p>
         </p:txBody>
       </p:sp>
@@ -5938,7 +5916,7 @@
         <p:spPr/>
         <p:txBody>
           <a:bodyPr vert="horz" lIns="91440" tIns="45720" rIns="91440" bIns="45720" rtlCol="0">
-            <a:normAutofit/>
+            <a:normAutofit fontScale="85000" lnSpcReduction="10000"/>
           </a:bodyPr>
           <a:lstStyle/>
           <a:p>
@@ -5958,7 +5936,7 @@
                   <a:schemeClr val="bg1"/>
                 </a:solidFill>
               </a:rPr>
-              <a:t>Form Generation and validations</a:t>
+              <a:t>By using our management script, it's pretty easy to initialize the project, create applications and sync with database.</a:t>
             </a:r>
           </a:p>
           <a:p>
@@ -5978,7 +5956,7 @@
                   <a:schemeClr val="bg1"/>
                 </a:solidFill>
               </a:rPr>
-              <a:t>Automatic admin interface</a:t>
+              <a:t>We focus on adhering to the DRY principle, so it's easy to modify the models, and write controllers, additional database logics and views.</a:t>
             </a:r>
           </a:p>
           <a:p>
@@ -5998,7 +5976,7 @@
                   <a:schemeClr val="bg1"/>
                 </a:solidFill>
               </a:rPr>
-              <a:t>Template system</a:t>
+              <a:t>Flexible in coding, reuse and deployment.</a:t>
             </a:r>
           </a:p>
           <a:p>
@@ -6018,7 +5996,23 @@
                   <a:schemeClr val="bg1"/>
                 </a:solidFill>
               </a:rPr>
-              <a:t>Cache system</a:t>
+              <a:t>Easy to handle static media files, like </a:t>
+            </a:r>
+            <a:r>
+              <a:rPr lang="en-US" altLang="zh-CN" sz="2700" dirty="0" err="1" smtClean="0">
+                <a:solidFill>
+                  <a:schemeClr val="bg1"/>
+                </a:solidFill>
+              </a:rPr>
+              <a:t>Javascript</a:t>
+            </a:r>
+            <a:r>
+              <a:rPr lang="en-US" altLang="zh-CN" sz="2700" dirty="0" smtClean="0">
+                <a:solidFill>
+                  <a:schemeClr val="bg1"/>
+                </a:solidFill>
+              </a:rPr>
+              <a:t>, cascade style sheet, images, audios and videos.</a:t>
             </a:r>
           </a:p>
           <a:p>
@@ -6038,33 +6032,61 @@
                   <a:schemeClr val="bg1"/>
                 </a:solidFill>
               </a:rPr>
-              <a:t>Error </a:t>
-            </a:r>
+              <a:t>Easy for modification and extension as we adhere OCP principle.</a:t>
+            </a:r>
+          </a:p>
+          <a:p>
+            <a:pPr marL="342900" lvl="1" indent="-342900">
+              <a:lnSpc>
+                <a:spcPct val="95000"/>
+              </a:lnSpc>
+              <a:buClr>
+                <a:schemeClr val="bg1"/>
+              </a:buClr>
+              <a:buFont typeface="Arial" pitchFamily="34" charset="0"/>
+              <a:buChar char="•"/>
+            </a:pPr>
             <a:r>
               <a:rPr lang="en-US" altLang="zh-CN" sz="2700" dirty="0" smtClean="0">
                 <a:solidFill>
                   <a:schemeClr val="bg1"/>
                 </a:solidFill>
               </a:rPr>
-              <a:t>notification </a:t>
-            </a:r>
+              <a:t>No worry on URL address, simply use the application name and the action name, user can get the result.</a:t>
+            </a:r>
+          </a:p>
+          <a:p>
+            <a:pPr marL="342900" lvl="1" indent="-342900">
+              <a:lnSpc>
+                <a:spcPct val="95000"/>
+              </a:lnSpc>
+              <a:buClr>
+                <a:schemeClr val="bg1"/>
+              </a:buClr>
+              <a:buFont typeface="Arial" pitchFamily="34" charset="0"/>
+              <a:buChar char="•"/>
+            </a:pPr>
             <a:r>
               <a:rPr lang="en-US" altLang="zh-CN" sz="2700" dirty="0" smtClean="0">
                 <a:solidFill>
                   <a:schemeClr val="bg1"/>
                 </a:solidFill>
               </a:rPr>
-              <a:t>email to the </a:t>
-            </a:r>
-            <a:r>
-              <a:rPr lang="en-US" altLang="zh-CN" sz="2700" dirty="0" smtClean="0">
-                <a:solidFill>
-                  <a:schemeClr val="bg1"/>
-                </a:solidFill>
-              </a:rPr>
-              <a:t>admin</a:t>
-            </a:r>
-            <a:endParaRPr lang="en-US" altLang="zh-CN" sz="2700" dirty="0" smtClean="0">
+              <a:t>Trash the old applications when running the clean or project command.</a:t>
+            </a:r>
+          </a:p>
+          <a:p>
+            <a:pPr marL="342900" lvl="1" indent="-342900">
+              <a:lnSpc>
+                <a:spcPct val="95000"/>
+              </a:lnSpc>
+              <a:buClr>
+                <a:schemeClr val="bg1"/>
+              </a:buClr>
+              <a:buFont typeface="Arial" pitchFamily="34" charset="0"/>
+              <a:buChar char="•"/>
+            </a:pPr>
+            <a:endParaRPr lang="en-US" altLang="zh-CN" sz="2700" dirty="0">
               <a:solidFill>
                 <a:schemeClr val="bg1"/>
               </a:solidFill>
@@ -6107,9 +6129,9 @@
       </p:grpSpPr>
       <p:sp>
         <p:nvSpPr>
-          <p:cNvPr id="2" name="Title 1"/>
-          <p:cNvSpPr>
-            <a:spLocks noGrp="1"/>
+          <p:cNvPr id="4097" name="Rectangle 1"/>
+          <p:cNvSpPr>
+            <a:spLocks noGrp="1" noChangeArrowheads="1"/>
           </p:cNvSpPr>
           <p:nvPr>
             <p:ph type="title"/>
@@ -6133,39 +6155,129 @@
                   <a:schemeClr val="bg1"/>
                 </a:solidFill>
               </a:rPr>
-              <a:t>Class Diagram</a:t>
-            </a:r>
-            <a:endParaRPr lang="zh-CN" altLang="en-US" sz="4000" dirty="0">
-              <a:solidFill>
+              <a:t>Features (in mind)</a:t>
+            </a:r>
+          </a:p>
+        </p:txBody>
+      </p:sp>
+      <p:sp>
+        <p:nvSpPr>
+          <p:cNvPr id="4098" name="Rectangle 2"/>
+          <p:cNvSpPr>
+            <a:spLocks noGrp="1" noChangeArrowheads="1"/>
+          </p:cNvSpPr>
+          <p:nvPr>
+            <p:ph idx="1"/>
+          </p:nvPr>
+        </p:nvSpPr>
+        <p:spPr/>
+        <p:txBody>
+          <a:bodyPr vert="horz" lIns="91440" tIns="45720" rIns="91440" bIns="45720" rtlCol="0">
+            <a:normAutofit/>
+          </a:bodyPr>
+          <a:lstStyle/>
+          <a:p>
+            <a:pPr marL="342900" lvl="1" indent="-342900">
+              <a:lnSpc>
+                <a:spcPct val="95000"/>
+              </a:lnSpc>
+              <a:buClr>
                 <a:schemeClr val="bg1"/>
-              </a:solidFill>
-            </a:endParaRPr>
-          </a:p>
-        </p:txBody>
-      </p:sp>
-      <p:pic>
-        <p:nvPicPr>
-          <p:cNvPr id="4" name="Content Placeholder 3" descr="class_diagram.jpg"/>
-          <p:cNvPicPr>
-            <a:picLocks noGrp="1" noChangeAspect="1"/>
-          </p:cNvPicPr>
-          <p:nvPr>
-            <p:ph idx="1"/>
-          </p:nvPr>
-        </p:nvPicPr>
-        <p:blipFill>
-          <a:blip r:embed="rId2" cstate="print"/>
-          <a:stretch>
-            <a:fillRect/>
-          </a:stretch>
-        </p:blipFill>
-        <p:spPr>
-          <a:xfrm>
-            <a:off x="457200" y="2440621"/>
-            <a:ext cx="8229600" cy="2845120"/>
-          </a:xfrm>
-        </p:spPr>
-      </p:pic>
+              </a:buClr>
+              <a:buFont typeface="Arial" pitchFamily="34" charset="0"/>
+              <a:buChar char="•"/>
+            </a:pPr>
+            <a:r>
+              <a:rPr lang="en-US" altLang="zh-CN" sz="2700" dirty="0" smtClean="0">
+                <a:solidFill>
+                  <a:schemeClr val="bg1"/>
+                </a:solidFill>
+              </a:rPr>
+              <a:t>Form Generation and validations</a:t>
+            </a:r>
+          </a:p>
+          <a:p>
+            <a:pPr marL="342900" lvl="1" indent="-342900">
+              <a:lnSpc>
+                <a:spcPct val="95000"/>
+              </a:lnSpc>
+              <a:buClr>
+                <a:schemeClr val="bg1"/>
+              </a:buClr>
+              <a:buFont typeface="Arial" pitchFamily="34" charset="0"/>
+              <a:buChar char="•"/>
+            </a:pPr>
+            <a:r>
+              <a:rPr lang="en-US" altLang="zh-CN" sz="2700" dirty="0" smtClean="0">
+                <a:solidFill>
+                  <a:schemeClr val="bg1"/>
+                </a:solidFill>
+              </a:rPr>
+              <a:t>Automatic admin interface</a:t>
+            </a:r>
+          </a:p>
+          <a:p>
+            <a:pPr marL="342900" lvl="1" indent="-342900">
+              <a:lnSpc>
+                <a:spcPct val="95000"/>
+              </a:lnSpc>
+              <a:buClr>
+                <a:schemeClr val="bg1"/>
+              </a:buClr>
+              <a:buFont typeface="Arial" pitchFamily="34" charset="0"/>
+              <a:buChar char="•"/>
+            </a:pPr>
+            <a:r>
+              <a:rPr lang="en-US" altLang="zh-CN" sz="2700" dirty="0" smtClean="0">
+                <a:solidFill>
+                  <a:schemeClr val="bg1"/>
+                </a:solidFill>
+              </a:rPr>
+              <a:t>Template system</a:t>
+            </a:r>
+          </a:p>
+          <a:p>
+            <a:pPr marL="342900" lvl="1" indent="-342900">
+              <a:lnSpc>
+                <a:spcPct val="95000"/>
+              </a:lnSpc>
+              <a:buClr>
+                <a:schemeClr val="bg1"/>
+              </a:buClr>
+              <a:buFont typeface="Arial" pitchFamily="34" charset="0"/>
+              <a:buChar char="•"/>
+            </a:pPr>
+            <a:r>
+              <a:rPr lang="en-US" altLang="zh-CN" sz="2700" dirty="0" smtClean="0">
+                <a:solidFill>
+                  <a:schemeClr val="bg1"/>
+                </a:solidFill>
+              </a:rPr>
+              <a:t>Cache system</a:t>
+            </a:r>
+          </a:p>
+          <a:p>
+            <a:pPr marL="342900" lvl="1" indent="-342900">
+              <a:lnSpc>
+                <a:spcPct val="95000"/>
+              </a:lnSpc>
+              <a:buClr>
+                <a:schemeClr val="bg1"/>
+              </a:buClr>
+              <a:buFont typeface="Arial" pitchFamily="34" charset="0"/>
+              <a:buChar char="•"/>
+            </a:pPr>
+            <a:r>
+              <a:rPr lang="en-US" altLang="zh-CN" sz="2700" dirty="0" smtClean="0">
+                <a:solidFill>
+                  <a:schemeClr val="bg1"/>
+                </a:solidFill>
+              </a:rPr>
+              <a:t>Error notification email to the admin</a:t>
+            </a:r>
+          </a:p>
+        </p:txBody>
+      </p:sp>
     </p:spTree>
   </p:cSld>
   <p:clrMapOvr>
@@ -6227,7 +6339,7 @@
                   <a:schemeClr val="bg1"/>
                 </a:solidFill>
               </a:rPr>
-              <a:t>Action Flow Diagram</a:t>
+              <a:t>Class Diagram</a:t>
             </a:r>
             <a:endParaRPr lang="zh-CN" altLang="en-US" sz="4000" dirty="0">
               <a:solidFill>
@@ -6239,37 +6351,25 @@
       </p:sp>
       <p:pic>
         <p:nvPicPr>
-          <p:cNvPr id="1026" name="Picture 2"/>
+          <p:cNvPr id="4" name="Content Placeholder 3" descr="class_diagram.jpg"/>
           <p:cNvPicPr>
-            <a:picLocks noGrp="1" noChangeAspect="1" noChangeArrowheads="1"/>
+            <a:picLocks noGrp="1" noChangeAspect="1"/>
           </p:cNvPicPr>
           <p:nvPr>
             <p:ph idx="1"/>
           </p:nvPr>
         </p:nvPicPr>
         <p:blipFill>
-          <a:blip r:embed="rId2"/>
-          <a:srcRect/>
+          <a:blip r:embed="rId2" cstate="print"/>
           <a:stretch>
             <a:fillRect/>
           </a:stretch>
         </p:blipFill>
-        <p:spPr bwMode="auto">
+        <p:spPr>
           <a:xfrm>
-            <a:off x="609600" y="1676400"/>
-            <a:ext cx="7963963" cy="4414044"/>
+            <a:off x="457200" y="2440621"/>
+            <a:ext cx="8229600" cy="2845120"/>
           </a:xfrm>
-          <a:prstGeom prst="rect">
-            <a:avLst/>
-          </a:prstGeom>
-          <a:noFill/>
-          <a:ln w="9525">
-            <a:noFill/>
-            <a:miter lim="800000"/>
-            <a:headEnd/>
-            <a:tailEnd/>
-          </a:ln>
-          <a:effectLst/>
         </p:spPr>
       </p:pic>
     </p:spTree>
@@ -6277,13 +6377,6 @@
   <p:clrMapOvr>
     <a:masterClrMapping/>
   </p:clrMapOvr>
-  <p:timing>
-    <p:tnLst>
-      <p:par>
-        <p:cTn id="1" dur="indefinite" restart="never" nodeType="tmRoot"/>
-      </p:par>
-    </p:tnLst>
-  </p:timing>
 </p:sld>
 </file>
 

</xml_diff>

<commit_message>
Add question and thank you page.
</commit_message>
<xml_diff>
--- a/docs/FinalProjectPresentation.pptx
+++ b/docs/FinalProjectPresentation.pptx
@@ -28,6 +28,8 @@
     <p:sldId id="292" r:id="rId22"/>
     <p:sldId id="293" r:id="rId23"/>
     <p:sldId id="262" r:id="rId24"/>
+    <p:sldId id="299" r:id="rId25"/>
+    <p:sldId id="300" r:id="rId26"/>
   </p:sldIdLst>
   <p:sldSz cx="9144000" cy="6858000" type="screen4x3"/>
   <p:notesSz cx="6858000" cy="9144000"/>
@@ -5245,6 +5247,140 @@
 </p:sld>
 </file>
 
+<file path=ppt/slides/slide24.xml><?xml version="1.0" encoding="utf-8"?>
+<p:sld xmlns:a="http://schemas.openxmlformats.org/drawingml/2006/main" xmlns:r="http://schemas.openxmlformats.org/officeDocument/2006/relationships" xmlns:p="http://schemas.openxmlformats.org/presentationml/2006/main">
+  <p:cSld>
+    <p:spTree>
+      <p:nvGrpSpPr>
+        <p:cNvPr id="1" name=""/>
+        <p:cNvGrpSpPr/>
+        <p:nvPr/>
+      </p:nvGrpSpPr>
+      <p:grpSpPr>
+        <a:xfrm>
+          <a:off x="0" y="0"/>
+          <a:ext cx="0" cy="0"/>
+          <a:chOff x="0" y="0"/>
+          <a:chExt cx="0" cy="0"/>
+        </a:xfrm>
+      </p:grpSpPr>
+      <p:sp>
+        <p:nvSpPr>
+          <p:cNvPr id="2" name="Title 1"/>
+          <p:cNvSpPr>
+            <a:spLocks noGrp="1"/>
+          </p:cNvSpPr>
+          <p:nvPr>
+            <p:ph type="title"/>
+          </p:nvPr>
+        </p:nvSpPr>
+        <p:spPr/>
+        <p:txBody>
+          <a:bodyPr/>
+          <a:lstStyle/>
+          <a:p>
+            <a:r>
+              <a:rPr lang="en-US" altLang="zh-CN" dirty="0" smtClean="0"/>
+              <a:t>Question?</a:t>
+            </a:r>
+            <a:endParaRPr lang="zh-CN" altLang="en-US" dirty="0"/>
+          </a:p>
+        </p:txBody>
+      </p:sp>
+      <p:sp>
+        <p:nvSpPr>
+          <p:cNvPr id="3" name="Content Placeholder 2"/>
+          <p:cNvSpPr>
+            <a:spLocks noGrp="1"/>
+          </p:cNvSpPr>
+          <p:nvPr>
+            <p:ph idx="1"/>
+          </p:nvPr>
+        </p:nvSpPr>
+        <p:spPr/>
+        <p:txBody>
+          <a:bodyPr/>
+          <a:lstStyle/>
+          <a:p>
+            <a:endParaRPr lang="zh-CN" altLang="en-US"/>
+          </a:p>
+        </p:txBody>
+      </p:sp>
+    </p:spTree>
+  </p:cSld>
+  <p:clrMapOvr>
+    <a:masterClrMapping/>
+  </p:clrMapOvr>
+</p:sld>
+</file>
+
+<file path=ppt/slides/slide25.xml><?xml version="1.0" encoding="utf-8"?>
+<p:sld xmlns:a="http://schemas.openxmlformats.org/drawingml/2006/main" xmlns:r="http://schemas.openxmlformats.org/officeDocument/2006/relationships" xmlns:p="http://schemas.openxmlformats.org/presentationml/2006/main">
+  <p:cSld>
+    <p:spTree>
+      <p:nvGrpSpPr>
+        <p:cNvPr id="1" name=""/>
+        <p:cNvGrpSpPr/>
+        <p:nvPr/>
+      </p:nvGrpSpPr>
+      <p:grpSpPr>
+        <a:xfrm>
+          <a:off x="0" y="0"/>
+          <a:ext cx="0" cy="0"/>
+          <a:chOff x="0" y="0"/>
+          <a:chExt cx="0" cy="0"/>
+        </a:xfrm>
+      </p:grpSpPr>
+      <p:sp>
+        <p:nvSpPr>
+          <p:cNvPr id="2" name="Title 1"/>
+          <p:cNvSpPr>
+            <a:spLocks noGrp="1"/>
+          </p:cNvSpPr>
+          <p:nvPr>
+            <p:ph type="title"/>
+          </p:nvPr>
+        </p:nvSpPr>
+        <p:spPr/>
+        <p:txBody>
+          <a:bodyPr/>
+          <a:lstStyle/>
+          <a:p>
+            <a:r>
+              <a:rPr lang="en-US" altLang="zh-CN" smtClean="0"/>
+              <a:t>Thank you!</a:t>
+            </a:r>
+            <a:endParaRPr lang="zh-CN" altLang="en-US"/>
+          </a:p>
+        </p:txBody>
+      </p:sp>
+      <p:sp>
+        <p:nvSpPr>
+          <p:cNvPr id="3" name="Content Placeholder 2"/>
+          <p:cNvSpPr>
+            <a:spLocks noGrp="1"/>
+          </p:cNvSpPr>
+          <p:nvPr>
+            <p:ph idx="1"/>
+          </p:nvPr>
+        </p:nvSpPr>
+        <p:spPr/>
+        <p:txBody>
+          <a:bodyPr/>
+          <a:lstStyle/>
+          <a:p>
+            <a:endParaRPr lang="zh-CN" altLang="en-US"/>
+          </a:p>
+        </p:txBody>
+      </p:sp>
+    </p:spTree>
+  </p:cSld>
+  <p:clrMapOvr>
+    <a:masterClrMapping/>
+  </p:clrMapOvr>
+</p:sld>
+</file>
+
 <file path=ppt/slides/slide3.xml><?xml version="1.0" encoding="utf-8"?>
 <p:sld xmlns:a="http://schemas.openxmlformats.org/drawingml/2006/main" xmlns:r="http://schemas.openxmlformats.org/officeDocument/2006/relationships" xmlns:p="http://schemas.openxmlformats.org/presentationml/2006/main">
   <p:cSld>
@@ -6076,15 +6212,7 @@
                   <a:schemeClr val="bg1"/>
                 </a:solidFill>
               </a:rPr>
-              <a:t>or </a:t>
-            </a:r>
-            <a:r>
-              <a:rPr lang="en-US" altLang="zh-CN" sz="2700" smtClean="0">
-                <a:solidFill>
-                  <a:schemeClr val="bg1"/>
-                </a:solidFill>
-              </a:rPr>
-              <a:t>init project </a:t>
+              <a:t>or init project </a:t>
             </a:r>
             <a:r>
               <a:rPr lang="en-US" altLang="zh-CN" sz="2700" dirty="0" smtClean="0">
@@ -6303,6 +6431,13 @@
   <p:clrMapOvr>
     <a:masterClrMapping/>
   </p:clrMapOvr>
+  <p:timing>
+    <p:tnLst>
+      <p:par>
+        <p:cTn id="1" dur="indefinite" restart="never" nodeType="tmRoot"/>
+      </p:par>
+    </p:tnLst>
+  </p:timing>
 </p:sld>
 </file>
 
@@ -6397,6 +6532,13 @@
   <p:clrMapOvr>
     <a:masterClrMapping/>
   </p:clrMapOvr>
+  <p:timing>
+    <p:tnLst>
+      <p:par>
+        <p:cTn id="1" dur="indefinite" restart="never" nodeType="tmRoot"/>
+      </p:par>
+    </p:tnLst>
+  </p:timing>
 </p:sld>
 </file>
 

</xml_diff>

<commit_message>
Edited ppt for spelling errors
</commit_message>
<xml_diff>
--- a/docs/FinalProjectPresentation.pptx
+++ b/docs/FinalProjectPresentation.pptx
@@ -4982,15 +4982,23 @@
                   <a:schemeClr val="bg1"/>
                 </a:solidFill>
               </a:rPr>
-              <a:t>Test code coverage and other </a:t>
-            </a:r>
-            <a:r>
-              <a:rPr lang="en-US" altLang="zh-CN" sz="3200" dirty="0" smtClean="0">
-                <a:solidFill>
-                  <a:schemeClr val="bg1"/>
-                </a:solidFill>
-              </a:rPr>
-              <a:t>matrices</a:t>
+              <a:t>Test code coverage and </a:t>
+            </a:r>
+            <a:r>
+              <a:rPr lang="en-US" altLang="zh-CN" sz="3200">
+                <a:solidFill>
+                  <a:schemeClr val="bg1"/>
+                </a:solidFill>
+              </a:rPr>
+              <a:t>other </a:t>
+            </a:r>
+            <a:r>
+              <a:rPr lang="en-US" altLang="zh-CN" sz="3200" smtClean="0">
+                <a:solidFill>
+                  <a:schemeClr val="bg1"/>
+                </a:solidFill>
+              </a:rPr>
+              <a:t>metrics</a:t>
             </a:r>
             <a:endParaRPr lang="en-US" altLang="zh-CN" sz="3200" dirty="0">
               <a:solidFill>
@@ -5281,7 +5289,7 @@
           <a:p>
             <a:r>
               <a:rPr lang="en-US" altLang="zh-CN" dirty="0" smtClean="0"/>
-              <a:t>Question?</a:t>
+              <a:t>Questions?</a:t>
             </a:r>
             <a:endParaRPr lang="zh-CN" altLang="en-US" dirty="0"/>
           </a:p>

</xml_diff>